<commit_message>
Updates and Ammends Spanish Presentation
</commit_message>
<xml_diff>
--- a/Clasificador Cancerígeno por Imagenes.pptx
+++ b/Clasificador Cancerígeno por Imagenes.pptx
@@ -14,7 +14,9 @@
     <p:sldId id="262" r:id="rId8"/>
     <p:sldId id="263" r:id="rId9"/>
     <p:sldId id="264" r:id="rId10"/>
-    <p:sldId id="265" r:id="rId11"/>
+    <p:sldId id="268" r:id="rId11"/>
+    <p:sldId id="265" r:id="rId12"/>
+    <p:sldId id="267" r:id="rId13"/>
   </p:sldIdLst>
   <p:sldSz cx="12192000" cy="6858000"/>
   <p:notesSz cx="6858000" cy="9144000"/>
@@ -1787,7 +1789,7 @@
           <a:p>
             <a:fld id="{8F72BA41-EC5B-4197-BCC8-0FD2E523CD7A}" type="datetimeFigureOut">
               <a:rPr lang="en-US" smtClean="0"/>
-              <a:t>10/26/2022</a:t>
+              <a:t>10/28/2022</a:t>
             </a:fld>
             <a:endParaRPr lang="en-US"/>
           </a:p>
@@ -1990,7 +1992,7 @@
           <a:p>
             <a:fld id="{8F72BA41-EC5B-4197-BCC8-0FD2E523CD7A}" type="datetimeFigureOut">
               <a:rPr lang="en-US" smtClean="0"/>
-              <a:t>10/26/2022</a:t>
+              <a:t>10/28/2022</a:t>
             </a:fld>
             <a:endParaRPr lang="en-US"/>
           </a:p>
@@ -3711,7 +3713,7 @@
           <a:p>
             <a:fld id="{8F72BA41-EC5B-4197-BCC8-0FD2E523CD7A}" type="datetimeFigureOut">
               <a:rPr lang="en-US" smtClean="0"/>
-              <a:t>10/26/2022</a:t>
+              <a:t>10/28/2022</a:t>
             </a:fld>
             <a:endParaRPr lang="en-US"/>
           </a:p>
@@ -3910,7 +3912,7 @@
           <a:p>
             <a:fld id="{8F72BA41-EC5B-4197-BCC8-0FD2E523CD7A}" type="datetimeFigureOut">
               <a:rPr lang="en-US" smtClean="0"/>
-              <a:t>10/26/2022</a:t>
+              <a:t>10/28/2022</a:t>
             </a:fld>
             <a:endParaRPr lang="en-US"/>
           </a:p>
@@ -5700,7 +5702,7 @@
           <a:p>
             <a:fld id="{8F72BA41-EC5B-4197-BCC8-0FD2E523CD7A}" type="datetimeFigureOut">
               <a:rPr lang="en-US" smtClean="0"/>
-              <a:t>10/26/2022</a:t>
+              <a:t>10/28/2022</a:t>
             </a:fld>
             <a:endParaRPr lang="en-US"/>
           </a:p>
@@ -5973,7 +5975,7 @@
           <a:p>
             <a:fld id="{8F72BA41-EC5B-4197-BCC8-0FD2E523CD7A}" type="datetimeFigureOut">
               <a:rPr lang="en-US" smtClean="0"/>
-              <a:t>10/26/2022</a:t>
+              <a:t>10/28/2022</a:t>
             </a:fld>
             <a:endParaRPr lang="en-US"/>
           </a:p>
@@ -6393,7 +6395,7 @@
           <a:p>
             <a:fld id="{8F72BA41-EC5B-4197-BCC8-0FD2E523CD7A}" type="datetimeFigureOut">
               <a:rPr lang="en-US" smtClean="0"/>
-              <a:t>10/26/2022</a:t>
+              <a:t>10/28/2022</a:t>
             </a:fld>
             <a:endParaRPr lang="en-US"/>
           </a:p>
@@ -6549,7 +6551,7 @@
           <a:p>
             <a:fld id="{8F72BA41-EC5B-4197-BCC8-0FD2E523CD7A}" type="datetimeFigureOut">
               <a:rPr lang="en-US" smtClean="0"/>
-              <a:t>10/26/2022</a:t>
+              <a:t>10/28/2022</a:t>
             </a:fld>
             <a:endParaRPr lang="en-US"/>
           </a:p>
@@ -8117,7 +8119,7 @@
           <a:p>
             <a:fld id="{8F72BA41-EC5B-4197-BCC8-0FD2E523CD7A}" type="datetimeFigureOut">
               <a:rPr lang="en-US" smtClean="0"/>
-              <a:t>10/26/2022</a:t>
+              <a:t>10/28/2022</a:t>
             </a:fld>
             <a:endParaRPr lang="en-US"/>
           </a:p>
@@ -9968,7 +9970,7 @@
           <a:p>
             <a:fld id="{8F72BA41-EC5B-4197-BCC8-0FD2E523CD7A}" type="datetimeFigureOut">
               <a:rPr lang="en-US" smtClean="0"/>
-              <a:t>10/26/2022</a:t>
+              <a:t>10/28/2022</a:t>
             </a:fld>
             <a:endParaRPr lang="en-US"/>
           </a:p>
@@ -11781,7 +11783,7 @@
           <a:p>
             <a:fld id="{8F72BA41-EC5B-4197-BCC8-0FD2E523CD7A}" type="datetimeFigureOut">
               <a:rPr lang="en-US" smtClean="0"/>
-              <a:t>10/26/2022</a:t>
+              <a:t>10/28/2022</a:t>
             </a:fld>
             <a:endParaRPr lang="en-US"/>
           </a:p>
@@ -13475,7 +13477,7 @@
             <a:fld id="{8F72BA41-EC5B-4197-BCC8-0FD2E523CD7A}" type="datetimeFigureOut">
               <a:rPr lang="en-US" smtClean="0"/>
               <a:pPr/>
-              <a:t>10/26/2022</a:t>
+              <a:t>10/28/2022</a:t>
             </a:fld>
             <a:endParaRPr lang="en-US" dirty="0"/>
           </a:p>
@@ -16355,6 +16357,413 @@
         </p:nvSpPr>
         <p:spPr>
           <a:xfrm>
+            <a:off x="-22827" y="0"/>
+            <a:ext cx="6643087" cy="676505"/>
+          </a:xfrm>
+        </p:spPr>
+        <p:txBody>
+          <a:bodyPr vert="horz" lIns="91440" tIns="45720" rIns="91440" bIns="45720" rtlCol="0" anchor="b">
+            <a:normAutofit/>
+          </a:bodyPr>
+          <a:lstStyle/>
+          <a:p>
+            <a:pPr>
+              <a:lnSpc>
+                <a:spcPct val="90000"/>
+              </a:lnSpc>
+            </a:pPr>
+            <a:r>
+              <a:rPr lang="es-AR" sz="4200" dirty="0"/>
+              <a:t>Resultados QCNN</a:t>
+            </a:r>
+            <a:endParaRPr lang="en-US" sz="4200" dirty="0"/>
+          </a:p>
+        </p:txBody>
+      </p:sp>
+      <p:sp>
+        <p:nvSpPr>
+          <p:cNvPr id="3" name="Subtitle 2">
+            <a:extLst>
+              <a:ext uri="{FF2B5EF4-FFF2-40B4-BE49-F238E27FC236}">
+                <a16:creationId xmlns:a16="http://schemas.microsoft.com/office/drawing/2014/main" id="{3C8A4DBB-6EAD-3D67-4D30-E9E85D184E0F}"/>
+              </a:ext>
+            </a:extLst>
+          </p:cNvPr>
+          <p:cNvSpPr txBox="1">
+            <a:spLocks/>
+          </p:cNvSpPr>
+          <p:nvPr/>
+        </p:nvSpPr>
+        <p:spPr>
+          <a:xfrm>
+            <a:off x="199916" y="6391414"/>
+            <a:ext cx="5633922" cy="658680"/>
+          </a:xfrm>
+          <a:prstGeom prst="rect">
+            <a:avLst/>
+          </a:prstGeom>
+        </p:spPr>
+        <p:txBody>
+          <a:bodyPr vert="horz" lIns="91440" tIns="45720" rIns="91440" bIns="45720" rtlCol="0">
+            <a:normAutofit fontScale="85000" lnSpcReduction="10000"/>
+          </a:bodyPr>
+          <a:lstStyle>
+            <a:lvl1pPr marL="0" indent="0" algn="l" defTabSz="914400" rtl="0" eaLnBrk="1" latinLnBrk="0" hangingPunct="1">
+              <a:lnSpc>
+                <a:spcPct val="110000"/>
+              </a:lnSpc>
+              <a:spcBef>
+                <a:spcPts val="1000"/>
+              </a:spcBef>
+              <a:buClr>
+                <a:schemeClr val="tx2">
+                  <a:lumMod val="50000"/>
+                  <a:lumOff val="50000"/>
+                </a:schemeClr>
+              </a:buClr>
+              <a:buSzPct val="75000"/>
+              <a:buFont typeface="Wingdings" panose="05000000000000000000" pitchFamily="2" charset="2"/>
+              <a:buNone/>
+              <a:defRPr sz="2400" kern="1200">
+                <a:solidFill>
+                  <a:schemeClr val="tx2"/>
+                </a:solidFill>
+                <a:latin typeface="+mn-lt"/>
+                <a:ea typeface="+mn-ea"/>
+                <a:cs typeface="+mn-cs"/>
+              </a:defRPr>
+            </a:lvl1pPr>
+            <a:lvl2pPr marL="457200" indent="0" algn="ctr" defTabSz="914400" rtl="0" eaLnBrk="1" latinLnBrk="0" hangingPunct="1">
+              <a:lnSpc>
+                <a:spcPct val="110000"/>
+              </a:lnSpc>
+              <a:spcBef>
+                <a:spcPts val="500"/>
+              </a:spcBef>
+              <a:buClr>
+                <a:schemeClr val="tx2">
+                  <a:lumMod val="50000"/>
+                  <a:lumOff val="50000"/>
+                </a:schemeClr>
+              </a:buClr>
+              <a:buSzPct val="75000"/>
+              <a:buFont typeface="Wingdings" panose="05000000000000000000" pitchFamily="2" charset="2"/>
+              <a:buNone/>
+              <a:defRPr sz="2000" kern="1200">
+                <a:solidFill>
+                  <a:schemeClr val="tx2"/>
+                </a:solidFill>
+                <a:latin typeface="+mn-lt"/>
+                <a:ea typeface="+mn-ea"/>
+                <a:cs typeface="+mn-cs"/>
+              </a:defRPr>
+            </a:lvl2pPr>
+            <a:lvl3pPr marL="914400" indent="0" algn="ctr" defTabSz="914400" rtl="0" eaLnBrk="1" latinLnBrk="0" hangingPunct="1">
+              <a:lnSpc>
+                <a:spcPct val="110000"/>
+              </a:lnSpc>
+              <a:spcBef>
+                <a:spcPts val="500"/>
+              </a:spcBef>
+              <a:buClr>
+                <a:schemeClr val="tx2">
+                  <a:lumMod val="50000"/>
+                  <a:lumOff val="50000"/>
+                </a:schemeClr>
+              </a:buClr>
+              <a:buSzPct val="75000"/>
+              <a:buFont typeface="Wingdings" panose="05000000000000000000" pitchFamily="2" charset="2"/>
+              <a:buNone/>
+              <a:defRPr sz="1800" kern="1200">
+                <a:solidFill>
+                  <a:schemeClr val="tx2"/>
+                </a:solidFill>
+                <a:latin typeface="+mn-lt"/>
+                <a:ea typeface="+mn-ea"/>
+                <a:cs typeface="+mn-cs"/>
+              </a:defRPr>
+            </a:lvl3pPr>
+            <a:lvl4pPr marL="1371600" indent="0" algn="ctr" defTabSz="914400" rtl="0" eaLnBrk="1" latinLnBrk="0" hangingPunct="1">
+              <a:lnSpc>
+                <a:spcPct val="110000"/>
+              </a:lnSpc>
+              <a:spcBef>
+                <a:spcPts val="500"/>
+              </a:spcBef>
+              <a:buClr>
+                <a:schemeClr val="tx2">
+                  <a:lumMod val="50000"/>
+                  <a:lumOff val="50000"/>
+                </a:schemeClr>
+              </a:buClr>
+              <a:buSzPct val="75000"/>
+              <a:buFont typeface="Wingdings" panose="05000000000000000000" pitchFamily="2" charset="2"/>
+              <a:buNone/>
+              <a:defRPr sz="1600" kern="1200">
+                <a:solidFill>
+                  <a:schemeClr val="tx2"/>
+                </a:solidFill>
+                <a:latin typeface="+mn-lt"/>
+                <a:ea typeface="+mn-ea"/>
+                <a:cs typeface="+mn-cs"/>
+              </a:defRPr>
+            </a:lvl4pPr>
+            <a:lvl5pPr marL="1828800" indent="0" algn="ctr" defTabSz="914400" rtl="0" eaLnBrk="1" latinLnBrk="0" hangingPunct="1">
+              <a:lnSpc>
+                <a:spcPct val="110000"/>
+              </a:lnSpc>
+              <a:spcBef>
+                <a:spcPts val="500"/>
+              </a:spcBef>
+              <a:buClr>
+                <a:schemeClr val="tx2">
+                  <a:lumMod val="50000"/>
+                  <a:lumOff val="50000"/>
+                </a:schemeClr>
+              </a:buClr>
+              <a:buSzPct val="75000"/>
+              <a:buFont typeface="Wingdings" panose="05000000000000000000" pitchFamily="2" charset="2"/>
+              <a:buNone/>
+              <a:defRPr sz="1600" kern="1200">
+                <a:solidFill>
+                  <a:schemeClr val="tx2"/>
+                </a:solidFill>
+                <a:latin typeface="+mn-lt"/>
+                <a:ea typeface="+mn-ea"/>
+                <a:cs typeface="+mn-cs"/>
+              </a:defRPr>
+            </a:lvl5pPr>
+            <a:lvl6pPr marL="2286000" indent="0" algn="ctr" defTabSz="914400" rtl="0" eaLnBrk="1" latinLnBrk="0" hangingPunct="1">
+              <a:lnSpc>
+                <a:spcPct val="90000"/>
+              </a:lnSpc>
+              <a:spcBef>
+                <a:spcPts val="500"/>
+              </a:spcBef>
+              <a:buFont typeface="Arial" panose="020B0604020202020204" pitchFamily="34" charset="0"/>
+              <a:buNone/>
+              <a:defRPr sz="1600" kern="1200">
+                <a:solidFill>
+                  <a:schemeClr val="tx1"/>
+                </a:solidFill>
+                <a:latin typeface="+mn-lt"/>
+                <a:ea typeface="+mn-ea"/>
+                <a:cs typeface="+mn-cs"/>
+              </a:defRPr>
+            </a:lvl6pPr>
+            <a:lvl7pPr marL="2743200" indent="0" algn="ctr" defTabSz="914400" rtl="0" eaLnBrk="1" latinLnBrk="0" hangingPunct="1">
+              <a:lnSpc>
+                <a:spcPct val="90000"/>
+              </a:lnSpc>
+              <a:spcBef>
+                <a:spcPts val="500"/>
+              </a:spcBef>
+              <a:buFont typeface="Arial" panose="020B0604020202020204" pitchFamily="34" charset="0"/>
+              <a:buNone/>
+              <a:defRPr sz="1600" kern="1200">
+                <a:solidFill>
+                  <a:schemeClr val="tx1"/>
+                </a:solidFill>
+                <a:latin typeface="+mn-lt"/>
+                <a:ea typeface="+mn-ea"/>
+                <a:cs typeface="+mn-cs"/>
+              </a:defRPr>
+            </a:lvl7pPr>
+            <a:lvl8pPr marL="3200400" indent="0" algn="ctr" defTabSz="914400" rtl="0" eaLnBrk="1" latinLnBrk="0" hangingPunct="1">
+              <a:lnSpc>
+                <a:spcPct val="90000"/>
+              </a:lnSpc>
+              <a:spcBef>
+                <a:spcPts val="500"/>
+              </a:spcBef>
+              <a:buFont typeface="Arial" panose="020B0604020202020204" pitchFamily="34" charset="0"/>
+              <a:buNone/>
+              <a:defRPr sz="1600" kern="1200">
+                <a:solidFill>
+                  <a:schemeClr val="tx1"/>
+                </a:solidFill>
+                <a:latin typeface="+mn-lt"/>
+                <a:ea typeface="+mn-ea"/>
+                <a:cs typeface="+mn-cs"/>
+              </a:defRPr>
+            </a:lvl8pPr>
+            <a:lvl9pPr marL="3657600" indent="0" algn="ctr" defTabSz="914400" rtl="0" eaLnBrk="1" latinLnBrk="0" hangingPunct="1">
+              <a:lnSpc>
+                <a:spcPct val="90000"/>
+              </a:lnSpc>
+              <a:spcBef>
+                <a:spcPts val="500"/>
+              </a:spcBef>
+              <a:buFont typeface="Arial" panose="020B0604020202020204" pitchFamily="34" charset="0"/>
+              <a:buNone/>
+              <a:defRPr sz="1600" kern="1200">
+                <a:solidFill>
+                  <a:schemeClr val="tx1"/>
+                </a:solidFill>
+                <a:latin typeface="+mn-lt"/>
+                <a:ea typeface="+mn-ea"/>
+                <a:cs typeface="+mn-cs"/>
+              </a:defRPr>
+            </a:lvl9pPr>
+          </a:lstStyle>
+          <a:p>
+            <a:r>
+              <a:rPr lang="es-AR" dirty="0"/>
+              <a:t>Machine </a:t>
+            </a:r>
+            <a:r>
+              <a:rPr lang="es-AR" dirty="0" err="1"/>
+              <a:t>Learning</a:t>
+            </a:r>
+            <a:r>
+              <a:rPr lang="es-AR" dirty="0"/>
+              <a:t> &amp; Quantum Deep </a:t>
+            </a:r>
+            <a:r>
+              <a:rPr lang="es-AR" dirty="0" err="1"/>
+              <a:t>Learning</a:t>
+            </a:r>
+            <a:endParaRPr lang="en-US" dirty="0"/>
+          </a:p>
+        </p:txBody>
+      </p:sp>
+      <p:pic>
+        <p:nvPicPr>
+          <p:cNvPr id="12" name="Picture 11">
+            <a:extLst>
+              <a:ext uri="{FF2B5EF4-FFF2-40B4-BE49-F238E27FC236}">
+                <a16:creationId xmlns:a16="http://schemas.microsoft.com/office/drawing/2014/main" id="{E3DBC794-0BBA-CFFC-7F20-477B10E709C5}"/>
+              </a:ext>
+            </a:extLst>
+          </p:cNvPr>
+          <p:cNvPicPr>
+            <a:picLocks noChangeAspect="1"/>
+          </p:cNvPicPr>
+          <p:nvPr/>
+        </p:nvPicPr>
+        <p:blipFill>
+          <a:blip r:embed="rId3"/>
+          <a:stretch>
+            <a:fillRect/>
+          </a:stretch>
+        </p:blipFill>
+        <p:spPr>
+          <a:xfrm>
+            <a:off x="22847" y="702259"/>
+            <a:ext cx="4365862" cy="2855787"/>
+          </a:xfrm>
+          <a:prstGeom prst="rect">
+            <a:avLst/>
+          </a:prstGeom>
+        </p:spPr>
+      </p:pic>
+      <p:pic>
+        <p:nvPicPr>
+          <p:cNvPr id="7" name="Picture 6">
+            <a:extLst>
+              <a:ext uri="{FF2B5EF4-FFF2-40B4-BE49-F238E27FC236}">
+                <a16:creationId xmlns:a16="http://schemas.microsoft.com/office/drawing/2014/main" id="{E339B1F5-2C3F-8E03-1E8F-EF6091359270}"/>
+              </a:ext>
+            </a:extLst>
+          </p:cNvPr>
+          <p:cNvPicPr>
+            <a:picLocks noChangeAspect="1"/>
+          </p:cNvPicPr>
+          <p:nvPr/>
+        </p:nvPicPr>
+        <p:blipFill>
+          <a:blip r:embed="rId4"/>
+          <a:stretch>
+            <a:fillRect/>
+          </a:stretch>
+        </p:blipFill>
+        <p:spPr>
+          <a:xfrm>
+            <a:off x="392717" y="3667248"/>
+            <a:ext cx="3722830" cy="2614964"/>
+          </a:xfrm>
+          <a:prstGeom prst="rect">
+            <a:avLst/>
+          </a:prstGeom>
+        </p:spPr>
+      </p:pic>
+    </p:spTree>
+    <p:extLst>
+      <p:ext uri="{BB962C8B-B14F-4D97-AF65-F5344CB8AC3E}">
+        <p14:creationId xmlns:p14="http://schemas.microsoft.com/office/powerpoint/2010/main" val="4076337594"/>
+      </p:ext>
+    </p:extLst>
+  </p:cSld>
+  <p:clrMapOvr>
+    <a:masterClrMapping/>
+  </p:clrMapOvr>
+</p:sld>
+</file>
+
+<file path=ppt/slides/slide11.xml><?xml version="1.0" encoding="utf-8"?>
+<p:sld xmlns:a="http://schemas.openxmlformats.org/drawingml/2006/main" xmlns:r="http://schemas.openxmlformats.org/officeDocument/2006/relationships" xmlns:p="http://schemas.openxmlformats.org/presentationml/2006/main">
+  <p:cSld>
+    <p:spTree>
+      <p:nvGrpSpPr>
+        <p:cNvPr id="1" name=""/>
+        <p:cNvGrpSpPr/>
+        <p:nvPr/>
+      </p:nvGrpSpPr>
+      <p:grpSpPr>
+        <a:xfrm>
+          <a:off x="0" y="0"/>
+          <a:ext cx="0" cy="0"/>
+          <a:chOff x="0" y="0"/>
+          <a:chExt cx="0" cy="0"/>
+        </a:xfrm>
+      </p:grpSpPr>
+      <p:pic>
+        <p:nvPicPr>
+          <p:cNvPr id="4" name="Picture 3" descr="Chart, scatter chart&#10;&#10;Description automatically generated">
+            <a:extLst>
+              <a:ext uri="{FF2B5EF4-FFF2-40B4-BE49-F238E27FC236}">
+                <a16:creationId xmlns:a16="http://schemas.microsoft.com/office/drawing/2014/main" id="{228AFBCD-4B87-EA18-7D28-8B102269C8C6}"/>
+              </a:ext>
+            </a:extLst>
+          </p:cNvPr>
+          <p:cNvPicPr>
+            <a:picLocks noChangeAspect="1"/>
+          </p:cNvPicPr>
+          <p:nvPr/>
+        </p:nvPicPr>
+        <p:blipFill rotWithShape="1">
+          <a:blip r:embed="rId2"/>
+          <a:srcRect t="5973" b="19027"/>
+          <a:stretch/>
+        </p:blipFill>
+        <p:spPr>
+          <a:xfrm>
+            <a:off x="-22827" y="3413"/>
+            <a:ext cx="12191980" cy="6857989"/>
+          </a:xfrm>
+          <a:prstGeom prst="rect">
+            <a:avLst/>
+          </a:prstGeom>
+        </p:spPr>
+      </p:pic>
+      <p:sp>
+        <p:nvSpPr>
+          <p:cNvPr id="2" name="Title 1">
+            <a:extLst>
+              <a:ext uri="{FF2B5EF4-FFF2-40B4-BE49-F238E27FC236}">
+                <a16:creationId xmlns:a16="http://schemas.microsoft.com/office/drawing/2014/main" id="{EB6A064A-D868-272C-A067-DD7A50F22CEB}"/>
+              </a:ext>
+            </a:extLst>
+          </p:cNvPr>
+          <p:cNvSpPr>
+            <a:spLocks noGrp="1"/>
+          </p:cNvSpPr>
+          <p:nvPr>
+            <p:ph type="ctrTitle"/>
+          </p:nvPr>
+        </p:nvSpPr>
+        <p:spPr>
+          <a:xfrm>
             <a:off x="421673" y="96842"/>
             <a:ext cx="3771867" cy="676505"/>
           </a:xfrm>
@@ -16645,7 +17054,7 @@
         <p:spPr>
           <a:xfrm>
             <a:off x="421672" y="799130"/>
-            <a:ext cx="7000240" cy="2585323"/>
+            <a:ext cx="7000240" cy="4801314"/>
           </a:xfrm>
           <a:prstGeom prst="rect">
             <a:avLst/>
@@ -16658,27 +17067,23 @@
           </a:bodyPr>
           <a:lstStyle/>
           <a:p>
+            <a:pPr marL="285750" indent="-285750">
+              <a:buFontTx/>
+              <a:buChar char="-"/>
+            </a:pPr>
             <a:r>
               <a:rPr lang="es-ES" b="0" dirty="0">
                 <a:effectLst/>
                 <a:latin typeface="Consolas" panose="020B0609020204030204" pitchFamily="49" charset="0"/>
               </a:rPr>
-              <a:t>- La red neuronal híbrida tiene menor precisión que el perceptrón. Recordemos que la entrada al perceptrón es una matriz que representa a las imágenes en escala </a:t>
+              <a:t>La red neuronal híbrida tiene menor precisión que el perceptrón. Recordemos que la entrada al perceptrón es una matriz que representa a las imágenes en escala de grises mientras que la entrada la red neuronal es un tensor [3, 260, 260]</a:t>
             </a:r>
-            <a:r>
-              <a:rPr lang="es-ES" b="0">
-                <a:effectLst/>
-                <a:latin typeface="Consolas" panose="020B0609020204030204" pitchFamily="49" charset="0"/>
-              </a:rPr>
-              <a:t>de grises </a:t>
-            </a:r>
-            <a:r>
-              <a:rPr lang="es-ES" b="0" dirty="0">
-                <a:effectLst/>
-                <a:latin typeface="Consolas" panose="020B0609020204030204" pitchFamily="49" charset="0"/>
-              </a:rPr>
-              <a:t>mientras que la entrada la red neuronal es un tensor [3, 260, 260]</a:t>
-            </a:r>
+          </a:p>
+          <a:p>
+            <a:endParaRPr lang="es-ES" b="0" dirty="0">
+              <a:effectLst/>
+              <a:latin typeface="Consolas" panose="020B0609020204030204" pitchFamily="49" charset="0"/>
+            </a:endParaRPr>
           </a:p>
           <a:p>
             <a:pPr marL="285750" indent="-285750">
@@ -16690,7 +17095,7 @@
                 <a:effectLst/>
                 <a:latin typeface="Consolas" panose="020B0609020204030204" pitchFamily="49" charset="0"/>
               </a:rPr>
-              <a:t>Es necesario optimizar </a:t>
+              <a:t>Es posible optimizar </a:t>
             </a:r>
             <a:r>
               <a:rPr lang="es-ES" b="0" dirty="0" err="1">
@@ -16706,6 +17111,44 @@
               </a:rPr>
               <a:t> y arquitectura de la red neuronal convolucional.</a:t>
             </a:r>
+          </a:p>
+          <a:p>
+            <a:endParaRPr lang="es-ES" b="0" dirty="0">
+              <a:effectLst/>
+              <a:latin typeface="Consolas" panose="020B0609020204030204" pitchFamily="49" charset="0"/>
+            </a:endParaRPr>
+          </a:p>
+          <a:p>
+            <a:r>
+              <a:rPr lang="en-US" dirty="0">
+                <a:latin typeface="Consolas" panose="020B0609020204030204" pitchFamily="49" charset="0"/>
+              </a:rPr>
+              <a:t>- </a:t>
+            </a:r>
+            <a:r>
+              <a:rPr lang="es-ES" b="0" dirty="0">
+                <a:effectLst/>
+                <a:latin typeface="Consolas" panose="020B0609020204030204" pitchFamily="49" charset="0"/>
+              </a:rPr>
+              <a:t>El Perceptrón al vectorizar la imagen pierde información sobre la misma, aunque se pueda reconstruir. La red neuronal trabaja con la información completa de la </a:t>
+            </a:r>
+            <a:r>
+              <a:rPr lang="es-ES" b="0" dirty="0" err="1">
+                <a:effectLst/>
+                <a:latin typeface="Consolas" panose="020B0609020204030204" pitchFamily="49" charset="0"/>
+              </a:rPr>
+              <a:t>imágen</a:t>
+            </a:r>
+            <a:endParaRPr lang="es-ES" b="0" dirty="0">
+              <a:effectLst/>
+              <a:latin typeface="Consolas" panose="020B0609020204030204" pitchFamily="49" charset="0"/>
+            </a:endParaRPr>
+          </a:p>
+          <a:p>
+            <a:endParaRPr lang="es-ES" b="0" dirty="0">
+              <a:effectLst/>
+              <a:latin typeface="Consolas" panose="020B0609020204030204" pitchFamily="49" charset="0"/>
+            </a:endParaRPr>
           </a:p>
           <a:p>
             <a:pPr marL="285750" indent="-285750">
@@ -16734,7 +17177,28 @@
               <a:rPr lang="es-AR" dirty="0">
                 <a:latin typeface="Consolas" panose="020B0609020204030204" pitchFamily="49" charset="0"/>
               </a:rPr>
-              <a:t> en el circuito. Se podría mejorar el circuito.</a:t>
+              <a:t> en el circuito. </a:t>
+            </a:r>
+          </a:p>
+          <a:p>
+            <a:pPr marL="285750" indent="-285750">
+              <a:buFontTx/>
+              <a:buChar char="-"/>
+            </a:pPr>
+            <a:endParaRPr lang="es-AR" dirty="0">
+              <a:latin typeface="Consolas" panose="020B0609020204030204" pitchFamily="49" charset="0"/>
+            </a:endParaRPr>
+          </a:p>
+          <a:p>
+            <a:pPr marL="285750" indent="-285750">
+              <a:buFontTx/>
+              <a:buChar char="-"/>
+            </a:pPr>
+            <a:r>
+              <a:rPr lang="es-AR" dirty="0">
+                <a:latin typeface="Consolas" panose="020B0609020204030204" pitchFamily="49" charset="0"/>
+              </a:rPr>
+              <a:t>Se podría mejorar el circuito con más capas.</a:t>
             </a:r>
             <a:endParaRPr lang="es-ES" b="0" dirty="0">
               <a:effectLst/>
@@ -16743,6 +17207,65 @@
           </a:p>
         </p:txBody>
       </p:sp>
+    </p:spTree>
+    <p:extLst>
+      <p:ext uri="{BB962C8B-B14F-4D97-AF65-F5344CB8AC3E}">
+        <p14:creationId xmlns:p14="http://schemas.microsoft.com/office/powerpoint/2010/main" val="3780240518"/>
+      </p:ext>
+    </p:extLst>
+  </p:cSld>
+  <p:clrMapOvr>
+    <a:masterClrMapping/>
+  </p:clrMapOvr>
+</p:sld>
+</file>
+
+<file path=ppt/slides/slide12.xml><?xml version="1.0" encoding="utf-8"?>
+<p:sld xmlns:a="http://schemas.openxmlformats.org/drawingml/2006/main" xmlns:r="http://schemas.openxmlformats.org/officeDocument/2006/relationships" xmlns:p="http://schemas.openxmlformats.org/presentationml/2006/main">
+  <p:cSld>
+    <p:spTree>
+      <p:nvGrpSpPr>
+        <p:cNvPr id="1" name=""/>
+        <p:cNvGrpSpPr/>
+        <p:nvPr/>
+      </p:nvGrpSpPr>
+      <p:grpSpPr>
+        <a:xfrm>
+          <a:off x="0" y="0"/>
+          <a:ext cx="0" cy="0"/>
+          <a:chOff x="0" y="0"/>
+          <a:chExt cx="0" cy="0"/>
+        </a:xfrm>
+      </p:grpSpPr>
+      <p:pic>
+        <p:nvPicPr>
+          <p:cNvPr id="4" name="Picture 3" descr="Chart, scatter chart&#10;&#10;Description automatically generated">
+            <a:extLst>
+              <a:ext uri="{FF2B5EF4-FFF2-40B4-BE49-F238E27FC236}">
+                <a16:creationId xmlns:a16="http://schemas.microsoft.com/office/drawing/2014/main" id="{228AFBCD-4B87-EA18-7D28-8B102269C8C6}"/>
+              </a:ext>
+            </a:extLst>
+          </p:cNvPr>
+          <p:cNvPicPr>
+            <a:picLocks noChangeAspect="1"/>
+          </p:cNvPicPr>
+          <p:nvPr/>
+        </p:nvPicPr>
+        <p:blipFill rotWithShape="1">
+          <a:blip r:embed="rId2"/>
+          <a:srcRect t="5973" b="19027"/>
+          <a:stretch/>
+        </p:blipFill>
+        <p:spPr>
+          <a:xfrm>
+            <a:off x="-22827" y="3413"/>
+            <a:ext cx="12191980" cy="6857989"/>
+          </a:xfrm>
+          <a:prstGeom prst="rect">
+            <a:avLst/>
+          </a:prstGeom>
+        </p:spPr>
+      </p:pic>
       <p:sp>
         <p:nvSpPr>
           <p:cNvPr id="7" name="Title 1">
@@ -16759,7 +17282,7 @@
         </p:nvSpPr>
         <p:spPr>
           <a:xfrm>
-            <a:off x="421672" y="3410236"/>
+            <a:off x="0" y="46737"/>
             <a:ext cx="3771867" cy="676505"/>
           </a:xfrm>
           <a:prstGeom prst="rect">
@@ -16817,8 +17340,8 @@
         </p:nvSpPr>
         <p:spPr>
           <a:xfrm>
-            <a:off x="294640" y="4156702"/>
-            <a:ext cx="6116320" cy="2662267"/>
+            <a:off x="199915" y="982323"/>
+            <a:ext cx="8635859" cy="3477875"/>
           </a:xfrm>
           <a:prstGeom prst="rect">
             <a:avLst/>
@@ -16835,49 +17358,58 @@
               <a:buAutoNum type="arabicPeriod"/>
             </a:pPr>
             <a:r>
-              <a:rPr lang="en-US" sz="1300" b="0" dirty="0">
+              <a:rPr lang="en-US" sz="1600" b="0" dirty="0">
                 <a:effectLst/>
                 <a:latin typeface="Consolas" panose="020B0609020204030204" pitchFamily="49" charset="0"/>
               </a:rPr>
               <a:t>Hybrid quantum-classical Neural Networks with </a:t>
             </a:r>
             <a:r>
-              <a:rPr lang="en-US" sz="1300" b="0" dirty="0" err="1">
+              <a:rPr lang="en-US" sz="1600" b="0" dirty="0" err="1">
                 <a:effectLst/>
                 <a:latin typeface="Consolas" panose="020B0609020204030204" pitchFamily="49" charset="0"/>
               </a:rPr>
               <a:t>PyTorch</a:t>
             </a:r>
             <a:r>
-              <a:rPr lang="en-US" sz="1300" b="0" dirty="0">
+              <a:rPr lang="en-US" sz="1600" b="0" dirty="0">
                 <a:effectLst/>
                 <a:latin typeface="Consolas" panose="020B0609020204030204" pitchFamily="49" charset="0"/>
               </a:rPr>
               <a:t> and </a:t>
             </a:r>
             <a:r>
-              <a:rPr lang="en-US" sz="1300" b="0" dirty="0" err="1">
+              <a:rPr lang="en-US" sz="1600" b="0" dirty="0" err="1">
                 <a:effectLst/>
                 <a:latin typeface="Consolas" panose="020B0609020204030204" pitchFamily="49" charset="0"/>
               </a:rPr>
               <a:t>Qiskit</a:t>
             </a:r>
             <a:r>
-              <a:rPr lang="en-US" sz="1300" b="0" dirty="0">
+              <a:rPr lang="en-US" sz="1600" b="0" dirty="0">
                 <a:effectLst/>
                 <a:latin typeface="Consolas" panose="020B0609020204030204" pitchFamily="49" charset="0"/>
               </a:rPr>
               <a:t>: </a:t>
             </a:r>
             <a:r>
-              <a:rPr lang="en-US" sz="1300" b="0" dirty="0">
+              <a:rPr lang="en-US" sz="1600" b="0" dirty="0">
                 <a:effectLst/>
                 <a:latin typeface="Consolas" panose="020B0609020204030204" pitchFamily="49" charset="0"/>
                 <a:hlinkClick r:id="rId3"/>
               </a:rPr>
               <a:t>https://qiskit.org/textbook/ch-machine-learning/machine-learning-qiskit-pytorch.html</a:t>
             </a:r>
-            <a:endParaRPr lang="en-US" sz="1300" b="0" dirty="0">
+            <a:endParaRPr lang="en-US" sz="1600" b="0" dirty="0">
+              <a:effectLst/>
+              <a:latin typeface="Consolas" panose="020B0609020204030204" pitchFamily="49" charset="0"/>
+            </a:endParaRPr>
+          </a:p>
+          <a:p>
+            <a:pPr marL="228600" indent="-228600">
+              <a:buAutoNum type="arabicPeriod"/>
+            </a:pPr>
+            <a:endParaRPr lang="en-US" sz="1600" b="0" dirty="0">
               <a:effectLst/>
               <a:latin typeface="Consolas" panose="020B0609020204030204" pitchFamily="49" charset="0"/>
             </a:endParaRPr>
@@ -16888,21 +17420,31 @@
               <a:buAutoNum type="arabicPeriod"/>
             </a:pPr>
             <a:r>
-              <a:rPr lang="en-US" sz="1300" b="0" dirty="0">
+              <a:rPr lang="en-US" sz="1600" b="0" dirty="0">
                 <a:effectLst/>
                 <a:latin typeface="Consolas" panose="020B0609020204030204" pitchFamily="49" charset="0"/>
               </a:rPr>
               <a:t>Torch Connector and Hybrid QNNs: </a:t>
             </a:r>
             <a:r>
-              <a:rPr lang="en-US" sz="1300" b="0" dirty="0">
+              <a:rPr lang="en-US" sz="1600" b="0" dirty="0">
                 <a:effectLst/>
                 <a:latin typeface="Consolas" panose="020B0609020204030204" pitchFamily="49" charset="0"/>
                 <a:hlinkClick r:id="rId4"/>
               </a:rPr>
               <a:t>https://qiskit.org/documentation/machine-learning/tutorials/05_torch_connector.html</a:t>
             </a:r>
-            <a:endParaRPr lang="en-US" sz="1300" b="0" dirty="0">
+            <a:endParaRPr lang="en-US" sz="1600" b="0" dirty="0">
+              <a:effectLst/>
+              <a:latin typeface="Consolas" panose="020B0609020204030204" pitchFamily="49" charset="0"/>
+            </a:endParaRPr>
+          </a:p>
+          <a:p>
+            <a:pPr marL="228600" indent="-228600">
+              <a:buFontTx/>
+              <a:buAutoNum type="arabicPeriod"/>
+            </a:pPr>
+            <a:endParaRPr lang="en-US" sz="1600" b="0" dirty="0">
               <a:effectLst/>
               <a:latin typeface="Consolas" panose="020B0609020204030204" pitchFamily="49" charset="0"/>
             </a:endParaRPr>
@@ -16913,90 +17455,47 @@
               <a:buAutoNum type="arabicPeriod"/>
             </a:pPr>
             <a:r>
-              <a:rPr lang="en-US" sz="1300" b="0" dirty="0" err="1">
+              <a:rPr lang="en-US" sz="1600" b="0" dirty="0">
                 <a:effectLst/>
                 <a:latin typeface="Consolas" panose="020B0609020204030204" pitchFamily="49" charset="0"/>
               </a:rPr>
-              <a:t>Clasificador</a:t>
+              <a:t>Esophagus Cancer Classifier : </a:t>
             </a:r>
             <a:r>
-              <a:rPr lang="en-US" sz="1300" b="0" dirty="0">
-                <a:effectLst/>
-                <a:latin typeface="Consolas" panose="020B0609020204030204" pitchFamily="49" charset="0"/>
-              </a:rPr>
-              <a:t> de </a:t>
-            </a:r>
-            <a:r>
-              <a:rPr lang="en-US" sz="1300" b="0" dirty="0" err="1">
-                <a:effectLst/>
-                <a:latin typeface="Consolas" panose="020B0609020204030204" pitchFamily="49" charset="0"/>
-              </a:rPr>
-              <a:t>Cáncer</a:t>
-            </a:r>
-            <a:r>
-              <a:rPr lang="en-US" sz="1300" b="0" dirty="0">
-                <a:effectLst/>
-                <a:latin typeface="Consolas" panose="020B0609020204030204" pitchFamily="49" charset="0"/>
-              </a:rPr>
-              <a:t> de </a:t>
-            </a:r>
-            <a:r>
-              <a:rPr lang="en-US" sz="1300" b="0" dirty="0" err="1">
-                <a:effectLst/>
-                <a:latin typeface="Consolas" panose="020B0609020204030204" pitchFamily="49" charset="0"/>
-              </a:rPr>
-              <a:t>Esófago</a:t>
-            </a:r>
-            <a:r>
-              <a:rPr lang="en-US" sz="1300" b="0" dirty="0">
-                <a:effectLst/>
-                <a:latin typeface="Consolas" panose="020B0609020204030204" pitchFamily="49" charset="0"/>
-              </a:rPr>
-              <a:t>: </a:t>
-            </a:r>
-            <a:r>
-              <a:rPr lang="en-US" sz="1300" b="0" dirty="0">
+              <a:rPr lang="en-US" sz="1600" b="0" dirty="0">
                 <a:effectLst/>
                 <a:latin typeface="Consolas" panose="020B0609020204030204" pitchFamily="49" charset="0"/>
                 <a:hlinkClick r:id="rId5"/>
               </a:rPr>
               <a:t>https://github.com/AnIsAsPe/ClassificadorCancerEsofago</a:t>
             </a:r>
-            <a:endParaRPr lang="en-US" sz="1300" dirty="0">
+            <a:endParaRPr lang="en-US" sz="1600" b="0" dirty="0">
+              <a:effectLst/>
+              <a:latin typeface="Consolas" panose="020B0609020204030204" pitchFamily="49" charset="0"/>
+            </a:endParaRPr>
+          </a:p>
+          <a:p>
+            <a:endParaRPr lang="en-US" sz="1600" dirty="0">
               <a:latin typeface="Consolas" panose="020B0609020204030204" pitchFamily="49" charset="0"/>
             </a:endParaRPr>
           </a:p>
           <a:p>
             <a:r>
-              <a:rPr lang="en-US" sz="1300" b="0" dirty="0">
+              <a:rPr lang="en-US" sz="1600" b="0" dirty="0">
                 <a:effectLst/>
                 <a:latin typeface="Consolas" panose="020B0609020204030204" pitchFamily="49" charset="0"/>
               </a:rPr>
-              <a:t>4.Clases </a:t>
+              <a:t>4. Machine Learning for the Working Analyst - Colegio </a:t>
             </a:r>
             <a:r>
-              <a:rPr lang="en-US" sz="1300" b="0" dirty="0" err="1">
-                <a:effectLst/>
-                <a:latin typeface="Consolas" panose="020B0609020204030204" pitchFamily="49" charset="0"/>
-              </a:rPr>
-              <a:t>Teóricas</a:t>
-            </a:r>
-            <a:r>
-              <a:rPr lang="en-US" sz="1300" b="0" dirty="0">
-                <a:effectLst/>
-                <a:latin typeface="Consolas" panose="020B0609020204030204" pitchFamily="49" charset="0"/>
-              </a:rPr>
-              <a:t> Colegio </a:t>
-            </a:r>
-            <a:r>
-              <a:rPr lang="en-US" sz="1300" b="0" dirty="0" err="1">
+              <a:rPr lang="en-US" sz="1600" b="0" dirty="0" err="1">
                 <a:effectLst/>
                 <a:latin typeface="Consolas" panose="020B0609020204030204" pitchFamily="49" charset="0"/>
               </a:rPr>
               <a:t>Bourbaki</a:t>
             </a:r>
             <a:r>
-              <a:rPr lang="en-US" sz="1300" b="0" dirty="0">
+              <a:rPr lang="en-US" sz="1600" b="0" dirty="0">
                 <a:effectLst/>
                 <a:latin typeface="Consolas" panose="020B0609020204030204" pitchFamily="49" charset="0"/>
               </a:rPr>
@@ -17004,39 +17503,38 @@
             </a:r>
           </a:p>
           <a:p>
+            <a:pPr marL="285750" indent="-285750">
+              <a:buFontTx/>
+              <a:buChar char="-"/>
+            </a:pPr>
             <a:r>
-              <a:rPr lang="en-US" sz="1300" b="0" dirty="0">
+              <a:rPr lang="en-US" sz="1600" b="0" dirty="0">
                 <a:effectLst/>
                 <a:latin typeface="Consolas" panose="020B0609020204030204" pitchFamily="49" charset="0"/>
+                <a:hlinkClick r:id="rId6"/>
               </a:rPr>
-              <a:t>- https://www.colegio-bourbaki.com/</a:t>
+              <a:t>https://www.colegio-bourbaki.com</a:t>
             </a:r>
+            <a:endParaRPr lang="en-US" sz="1600" b="0" dirty="0">
+              <a:effectLst/>
+              <a:latin typeface="Consolas" panose="020B0609020204030204" pitchFamily="49" charset="0"/>
+            </a:endParaRPr>
           </a:p>
           <a:p>
             <a:r>
-              <a:rPr lang="en-US" sz="1300" b="0" dirty="0">
+              <a:rPr lang="en-US" sz="1600" b="0" dirty="0">
                 <a:effectLst/>
                 <a:latin typeface="Consolas" panose="020B0609020204030204" pitchFamily="49" charset="0"/>
               </a:rPr>
               <a:t>- LinkedIn: Colegio </a:t>
             </a:r>
             <a:r>
-              <a:rPr lang="en-US" sz="1300" b="0" dirty="0" err="1">
+              <a:rPr lang="en-US" sz="1600" b="0">
                 <a:effectLst/>
                 <a:latin typeface="Consolas" panose="020B0609020204030204" pitchFamily="49" charset="0"/>
               </a:rPr>
               <a:t>Bourbaki</a:t>
             </a:r>
-            <a:endParaRPr lang="en-US" sz="1300" b="0" dirty="0">
-              <a:effectLst/>
-              <a:latin typeface="Consolas" panose="020B0609020204030204" pitchFamily="49" charset="0"/>
-            </a:endParaRPr>
-          </a:p>
-          <a:p>
-            <a:pPr marL="228600" indent="-228600">
-              <a:buFontTx/>
-              <a:buAutoNum type="arabicPeriod"/>
-            </a:pPr>
             <a:endParaRPr lang="en-US" sz="1200" b="0" dirty="0">
               <a:effectLst/>
               <a:latin typeface="Consolas" panose="020B0609020204030204" pitchFamily="49" charset="0"/>
@@ -17053,10 +17551,257 @@
           </a:p>
         </p:txBody>
       </p:sp>
+      <p:sp>
+        <p:nvSpPr>
+          <p:cNvPr id="10" name="Subtitle 2">
+            <a:extLst>
+              <a:ext uri="{FF2B5EF4-FFF2-40B4-BE49-F238E27FC236}">
+                <a16:creationId xmlns:a16="http://schemas.microsoft.com/office/drawing/2014/main" id="{A25DEED2-BDD4-3032-1075-E9194C9605D7}"/>
+              </a:ext>
+            </a:extLst>
+          </p:cNvPr>
+          <p:cNvSpPr txBox="1">
+            <a:spLocks/>
+          </p:cNvSpPr>
+          <p:nvPr/>
+        </p:nvSpPr>
+        <p:spPr>
+          <a:xfrm>
+            <a:off x="199916" y="6391414"/>
+            <a:ext cx="5633922" cy="658680"/>
+          </a:xfrm>
+          <a:prstGeom prst="rect">
+            <a:avLst/>
+          </a:prstGeom>
+        </p:spPr>
+        <p:txBody>
+          <a:bodyPr vert="horz" lIns="91440" tIns="45720" rIns="91440" bIns="45720" rtlCol="0">
+            <a:normAutofit fontScale="85000" lnSpcReduction="10000"/>
+          </a:bodyPr>
+          <a:lstStyle>
+            <a:lvl1pPr marL="0" indent="0" algn="l" defTabSz="914400" rtl="0" eaLnBrk="1" latinLnBrk="0" hangingPunct="1">
+              <a:lnSpc>
+                <a:spcPct val="110000"/>
+              </a:lnSpc>
+              <a:spcBef>
+                <a:spcPts val="1000"/>
+              </a:spcBef>
+              <a:buClr>
+                <a:schemeClr val="tx2">
+                  <a:lumMod val="50000"/>
+                  <a:lumOff val="50000"/>
+                </a:schemeClr>
+              </a:buClr>
+              <a:buSzPct val="75000"/>
+              <a:buFont typeface="Wingdings" panose="05000000000000000000" pitchFamily="2" charset="2"/>
+              <a:buNone/>
+              <a:defRPr sz="2400" kern="1200">
+                <a:solidFill>
+                  <a:schemeClr val="tx2"/>
+                </a:solidFill>
+                <a:latin typeface="+mn-lt"/>
+                <a:ea typeface="+mn-ea"/>
+                <a:cs typeface="+mn-cs"/>
+              </a:defRPr>
+            </a:lvl1pPr>
+            <a:lvl2pPr marL="457200" indent="0" algn="ctr" defTabSz="914400" rtl="0" eaLnBrk="1" latinLnBrk="0" hangingPunct="1">
+              <a:lnSpc>
+                <a:spcPct val="110000"/>
+              </a:lnSpc>
+              <a:spcBef>
+                <a:spcPts val="500"/>
+              </a:spcBef>
+              <a:buClr>
+                <a:schemeClr val="tx2">
+                  <a:lumMod val="50000"/>
+                  <a:lumOff val="50000"/>
+                </a:schemeClr>
+              </a:buClr>
+              <a:buSzPct val="75000"/>
+              <a:buFont typeface="Wingdings" panose="05000000000000000000" pitchFamily="2" charset="2"/>
+              <a:buNone/>
+              <a:defRPr sz="2000" kern="1200">
+                <a:solidFill>
+                  <a:schemeClr val="tx2"/>
+                </a:solidFill>
+                <a:latin typeface="+mn-lt"/>
+                <a:ea typeface="+mn-ea"/>
+                <a:cs typeface="+mn-cs"/>
+              </a:defRPr>
+            </a:lvl2pPr>
+            <a:lvl3pPr marL="914400" indent="0" algn="ctr" defTabSz="914400" rtl="0" eaLnBrk="1" latinLnBrk="0" hangingPunct="1">
+              <a:lnSpc>
+                <a:spcPct val="110000"/>
+              </a:lnSpc>
+              <a:spcBef>
+                <a:spcPts val="500"/>
+              </a:spcBef>
+              <a:buClr>
+                <a:schemeClr val="tx2">
+                  <a:lumMod val="50000"/>
+                  <a:lumOff val="50000"/>
+                </a:schemeClr>
+              </a:buClr>
+              <a:buSzPct val="75000"/>
+              <a:buFont typeface="Wingdings" panose="05000000000000000000" pitchFamily="2" charset="2"/>
+              <a:buNone/>
+              <a:defRPr sz="1800" kern="1200">
+                <a:solidFill>
+                  <a:schemeClr val="tx2"/>
+                </a:solidFill>
+                <a:latin typeface="+mn-lt"/>
+                <a:ea typeface="+mn-ea"/>
+                <a:cs typeface="+mn-cs"/>
+              </a:defRPr>
+            </a:lvl3pPr>
+            <a:lvl4pPr marL="1371600" indent="0" algn="ctr" defTabSz="914400" rtl="0" eaLnBrk="1" latinLnBrk="0" hangingPunct="1">
+              <a:lnSpc>
+                <a:spcPct val="110000"/>
+              </a:lnSpc>
+              <a:spcBef>
+                <a:spcPts val="500"/>
+              </a:spcBef>
+              <a:buClr>
+                <a:schemeClr val="tx2">
+                  <a:lumMod val="50000"/>
+                  <a:lumOff val="50000"/>
+                </a:schemeClr>
+              </a:buClr>
+              <a:buSzPct val="75000"/>
+              <a:buFont typeface="Wingdings" panose="05000000000000000000" pitchFamily="2" charset="2"/>
+              <a:buNone/>
+              <a:defRPr sz="1600" kern="1200">
+                <a:solidFill>
+                  <a:schemeClr val="tx2"/>
+                </a:solidFill>
+                <a:latin typeface="+mn-lt"/>
+                <a:ea typeface="+mn-ea"/>
+                <a:cs typeface="+mn-cs"/>
+              </a:defRPr>
+            </a:lvl4pPr>
+            <a:lvl5pPr marL="1828800" indent="0" algn="ctr" defTabSz="914400" rtl="0" eaLnBrk="1" latinLnBrk="0" hangingPunct="1">
+              <a:lnSpc>
+                <a:spcPct val="110000"/>
+              </a:lnSpc>
+              <a:spcBef>
+                <a:spcPts val="500"/>
+              </a:spcBef>
+              <a:buClr>
+                <a:schemeClr val="tx2">
+                  <a:lumMod val="50000"/>
+                  <a:lumOff val="50000"/>
+                </a:schemeClr>
+              </a:buClr>
+              <a:buSzPct val="75000"/>
+              <a:buFont typeface="Wingdings" panose="05000000000000000000" pitchFamily="2" charset="2"/>
+              <a:buNone/>
+              <a:defRPr sz="1600" kern="1200">
+                <a:solidFill>
+                  <a:schemeClr val="tx2"/>
+                </a:solidFill>
+                <a:latin typeface="+mn-lt"/>
+                <a:ea typeface="+mn-ea"/>
+                <a:cs typeface="+mn-cs"/>
+              </a:defRPr>
+            </a:lvl5pPr>
+            <a:lvl6pPr marL="2286000" indent="0" algn="ctr" defTabSz="914400" rtl="0" eaLnBrk="1" latinLnBrk="0" hangingPunct="1">
+              <a:lnSpc>
+                <a:spcPct val="90000"/>
+              </a:lnSpc>
+              <a:spcBef>
+                <a:spcPts val="500"/>
+              </a:spcBef>
+              <a:buFont typeface="Arial" panose="020B0604020202020204" pitchFamily="34" charset="0"/>
+              <a:buNone/>
+              <a:defRPr sz="1600" kern="1200">
+                <a:solidFill>
+                  <a:schemeClr val="tx1"/>
+                </a:solidFill>
+                <a:latin typeface="+mn-lt"/>
+                <a:ea typeface="+mn-ea"/>
+                <a:cs typeface="+mn-cs"/>
+              </a:defRPr>
+            </a:lvl6pPr>
+            <a:lvl7pPr marL="2743200" indent="0" algn="ctr" defTabSz="914400" rtl="0" eaLnBrk="1" latinLnBrk="0" hangingPunct="1">
+              <a:lnSpc>
+                <a:spcPct val="90000"/>
+              </a:lnSpc>
+              <a:spcBef>
+                <a:spcPts val="500"/>
+              </a:spcBef>
+              <a:buFont typeface="Arial" panose="020B0604020202020204" pitchFamily="34" charset="0"/>
+              <a:buNone/>
+              <a:defRPr sz="1600" kern="1200">
+                <a:solidFill>
+                  <a:schemeClr val="tx1"/>
+                </a:solidFill>
+                <a:latin typeface="+mn-lt"/>
+                <a:ea typeface="+mn-ea"/>
+                <a:cs typeface="+mn-cs"/>
+              </a:defRPr>
+            </a:lvl7pPr>
+            <a:lvl8pPr marL="3200400" indent="0" algn="ctr" defTabSz="914400" rtl="0" eaLnBrk="1" latinLnBrk="0" hangingPunct="1">
+              <a:lnSpc>
+                <a:spcPct val="90000"/>
+              </a:lnSpc>
+              <a:spcBef>
+                <a:spcPts val="500"/>
+              </a:spcBef>
+              <a:buFont typeface="Arial" panose="020B0604020202020204" pitchFamily="34" charset="0"/>
+              <a:buNone/>
+              <a:defRPr sz="1600" kern="1200">
+                <a:solidFill>
+                  <a:schemeClr val="tx1"/>
+                </a:solidFill>
+                <a:latin typeface="+mn-lt"/>
+                <a:ea typeface="+mn-ea"/>
+                <a:cs typeface="+mn-cs"/>
+              </a:defRPr>
+            </a:lvl8pPr>
+            <a:lvl9pPr marL="3657600" indent="0" algn="ctr" defTabSz="914400" rtl="0" eaLnBrk="1" latinLnBrk="0" hangingPunct="1">
+              <a:lnSpc>
+                <a:spcPct val="90000"/>
+              </a:lnSpc>
+              <a:spcBef>
+                <a:spcPts val="500"/>
+              </a:spcBef>
+              <a:buFont typeface="Arial" panose="020B0604020202020204" pitchFamily="34" charset="0"/>
+              <a:buNone/>
+              <a:defRPr sz="1600" kern="1200">
+                <a:solidFill>
+                  <a:schemeClr val="tx1"/>
+                </a:solidFill>
+                <a:latin typeface="+mn-lt"/>
+                <a:ea typeface="+mn-ea"/>
+                <a:cs typeface="+mn-cs"/>
+              </a:defRPr>
+            </a:lvl9pPr>
+          </a:lstStyle>
+          <a:p>
+            <a:r>
+              <a:rPr lang="es-AR" dirty="0"/>
+              <a:t>Machine </a:t>
+            </a:r>
+            <a:r>
+              <a:rPr lang="es-AR" dirty="0" err="1"/>
+              <a:t>Learning</a:t>
+            </a:r>
+            <a:r>
+              <a:rPr lang="es-AR" dirty="0"/>
+              <a:t> &amp; Quantum Deep </a:t>
+            </a:r>
+            <a:r>
+              <a:rPr lang="es-AR" dirty="0" err="1"/>
+              <a:t>Learning</a:t>
+            </a:r>
+            <a:endParaRPr lang="en-US" dirty="0"/>
+          </a:p>
+        </p:txBody>
+      </p:sp>
     </p:spTree>
     <p:extLst>
       <p:ext uri="{BB962C8B-B14F-4D97-AF65-F5344CB8AC3E}">
-        <p14:creationId xmlns:p14="http://schemas.microsoft.com/office/powerpoint/2010/main" val="3780240518"/>
+        <p14:creationId xmlns:p14="http://schemas.microsoft.com/office/powerpoint/2010/main" val="186052472"/>
       </p:ext>
     </p:extLst>
   </p:cSld>
@@ -22576,7 +23321,7 @@
               <a:rPr lang="en-US" dirty="0">
                 <a:latin typeface="Consolas" panose="020B0609020204030204" pitchFamily="49" charset="0"/>
               </a:rPr>
-              <a:t>3545 </a:t>
+              <a:t>3291 </a:t>
             </a:r>
             <a:r>
               <a:rPr lang="en-US" dirty="0" err="1">
@@ -22612,7 +23357,7 @@
               <a:rPr lang="en-US" dirty="0">
                 <a:latin typeface="Consolas" panose="020B0609020204030204" pitchFamily="49" charset="0"/>
               </a:rPr>
-              <a:t>1518 </a:t>
+              <a:t>1772 </a:t>
             </a:r>
             <a:r>
               <a:rPr lang="en-US" dirty="0" err="1">
@@ -22644,7 +23389,7 @@
         </p:nvSpPr>
         <p:spPr>
           <a:xfrm>
-            <a:off x="199916" y="1949846"/>
+            <a:off x="199916" y="4270869"/>
             <a:ext cx="6197600" cy="646331"/>
           </a:xfrm>
           <a:prstGeom prst="rect">
@@ -22663,7 +23408,20 @@
                 <a:effectLst/>
                 <a:latin typeface="Consolas" panose="020B0609020204030204" pitchFamily="49" charset="0"/>
               </a:rPr>
-              <a:t>Precisión conjunto entrenamiento: 70.97%</a:t>
+              <a:t>Precisión conjunto entrenamiento: </a:t>
+            </a:r>
+            <a:r>
+              <a:rPr lang="es-ES" dirty="0">
+                <a:latin typeface="Consolas" panose="020B0609020204030204" pitchFamily="49" charset="0"/>
+              </a:rPr>
+              <a:t>99.82</a:t>
+            </a:r>
+            <a:r>
+              <a:rPr lang="es-ES" b="0" i="0" dirty="0">
+                <a:effectLst/>
+                <a:latin typeface="Consolas" panose="020B0609020204030204" pitchFamily="49" charset="0"/>
+              </a:rPr>
+              <a:t>%</a:t>
             </a:r>
           </a:p>
           <a:p>
@@ -22672,17 +23430,83 @@
                 <a:effectLst/>
                 <a:latin typeface="Consolas" panose="020B0609020204030204" pitchFamily="49" charset="0"/>
               </a:rPr>
-              <a:t>Precisión conjunto prueba: 70.97%</a:t>
+              <a:t>Precisión conjunto prueba: </a:t>
             </a:r>
+            <a:r>
+              <a:rPr lang="es-ES" dirty="0">
+                <a:latin typeface="Consolas" panose="020B0609020204030204" pitchFamily="49" charset="0"/>
+              </a:rPr>
+              <a:t>98.8</a:t>
+            </a:r>
+            <a:r>
+              <a:rPr lang="es-ES" b="0" i="0" dirty="0">
+                <a:effectLst/>
+                <a:latin typeface="Consolas" panose="020B0609020204030204" pitchFamily="49" charset="0"/>
+              </a:rPr>
+              <a:t>%</a:t>
+            </a:r>
+          </a:p>
+        </p:txBody>
+      </p:sp>
+      <p:sp>
+        <p:nvSpPr>
+          <p:cNvPr id="3" name="TextBox 2">
+            <a:extLst>
+              <a:ext uri="{FF2B5EF4-FFF2-40B4-BE49-F238E27FC236}">
+                <a16:creationId xmlns:a16="http://schemas.microsoft.com/office/drawing/2014/main" id="{A6E6325C-D4E9-2412-641B-732F153ECEE6}"/>
+              </a:ext>
+            </a:extLst>
+          </p:cNvPr>
+          <p:cNvSpPr txBox="1"/>
+          <p:nvPr/>
+        </p:nvSpPr>
+        <p:spPr>
+          <a:xfrm>
+            <a:off x="199916" y="2205006"/>
+            <a:ext cx="6197600" cy="369332"/>
+          </a:xfrm>
+          <a:prstGeom prst="rect">
+            <a:avLst/>
+          </a:prstGeom>
+          <a:noFill/>
+        </p:spPr>
+        <p:txBody>
+          <a:bodyPr wrap="square">
+            <a:spAutoFit/>
+          </a:bodyPr>
+          <a:lstStyle/>
+          <a:p>
+            <a:r>
+              <a:rPr lang="es-ES" b="0" i="0" dirty="0" err="1">
+                <a:effectLst/>
+                <a:latin typeface="Consolas" panose="020B0609020204030204" pitchFamily="49" charset="0"/>
+              </a:rPr>
+              <a:t>Predicted</a:t>
+            </a:r>
+            <a:r>
+              <a:rPr lang="es-ES" b="0" i="0" dirty="0">
+                <a:effectLst/>
+                <a:latin typeface="Consolas" panose="020B0609020204030204" pitchFamily="49" charset="0"/>
+              </a:rPr>
+              <a:t> Output</a:t>
+            </a:r>
+            <a:r>
+              <a:rPr lang="en-US" b="0" i="0" dirty="0">
+                <a:effectLst/>
+                <a:latin typeface="Consolas" panose="020B0609020204030204" pitchFamily="49" charset="0"/>
+              </a:rPr>
+              <a:t>:</a:t>
+            </a:r>
+            <a:endParaRPr lang="en-US" dirty="0"/>
           </a:p>
         </p:txBody>
       </p:sp>
       <p:pic>
         <p:nvPicPr>
-          <p:cNvPr id="9" name="Picture 8">
+          <p:cNvPr id="6" name="Picture 5">
             <a:extLst>
               <a:ext uri="{FF2B5EF4-FFF2-40B4-BE49-F238E27FC236}">
-                <a16:creationId xmlns:a16="http://schemas.microsoft.com/office/drawing/2014/main" id="{E6C9936D-87F4-E1F2-5DCA-687817EBA168}"/>
+                <a16:creationId xmlns:a16="http://schemas.microsoft.com/office/drawing/2014/main" id="{AC3A6F07-D578-F41F-749F-71A59D53F90F}"/>
               </a:ext>
             </a:extLst>
           </p:cNvPr>
@@ -22699,8 +23523,8 @@
         </p:blipFill>
         <p:spPr>
           <a:xfrm>
-            <a:off x="342156" y="2717926"/>
-            <a:ext cx="4907280" cy="3552666"/>
+            <a:off x="199916" y="2642865"/>
+            <a:ext cx="5476875" cy="1076325"/>
           </a:xfrm>
           <a:prstGeom prst="rect">
             <a:avLst/>

</xml_diff>

<commit_message>
Ammends and Updates Spanish Presentation
</commit_message>
<xml_diff>
--- a/Clasificador Cancerígeno por Imagenes.pptx
+++ b/Clasificador Cancerígeno por Imagenes.pptx
@@ -13,10 +13,13 @@
     <p:sldId id="261" r:id="rId7"/>
     <p:sldId id="262" r:id="rId8"/>
     <p:sldId id="263" r:id="rId9"/>
-    <p:sldId id="264" r:id="rId10"/>
-    <p:sldId id="268" r:id="rId11"/>
-    <p:sldId id="265" r:id="rId12"/>
-    <p:sldId id="267" r:id="rId13"/>
+    <p:sldId id="269" r:id="rId10"/>
+    <p:sldId id="270" r:id="rId11"/>
+    <p:sldId id="266" r:id="rId12"/>
+    <p:sldId id="264" r:id="rId13"/>
+    <p:sldId id="268" r:id="rId14"/>
+    <p:sldId id="265" r:id="rId15"/>
+    <p:sldId id="267" r:id="rId16"/>
   </p:sldIdLst>
   <p:sldSz cx="12192000" cy="6858000"/>
   <p:notesSz cx="6858000" cy="9144000"/>
@@ -1789,7 +1792,7 @@
           <a:p>
             <a:fld id="{8F72BA41-EC5B-4197-BCC8-0FD2E523CD7A}" type="datetimeFigureOut">
               <a:rPr lang="en-US" smtClean="0"/>
-              <a:t>10/28/2022</a:t>
+              <a:t>11/4/2022</a:t>
             </a:fld>
             <a:endParaRPr lang="en-US"/>
           </a:p>
@@ -1992,7 +1995,7 @@
           <a:p>
             <a:fld id="{8F72BA41-EC5B-4197-BCC8-0FD2E523CD7A}" type="datetimeFigureOut">
               <a:rPr lang="en-US" smtClean="0"/>
-              <a:t>10/28/2022</a:t>
+              <a:t>11/4/2022</a:t>
             </a:fld>
             <a:endParaRPr lang="en-US"/>
           </a:p>
@@ -3713,7 +3716,7 @@
           <a:p>
             <a:fld id="{8F72BA41-EC5B-4197-BCC8-0FD2E523CD7A}" type="datetimeFigureOut">
               <a:rPr lang="en-US" smtClean="0"/>
-              <a:t>10/28/2022</a:t>
+              <a:t>11/4/2022</a:t>
             </a:fld>
             <a:endParaRPr lang="en-US"/>
           </a:p>
@@ -3912,7 +3915,7 @@
           <a:p>
             <a:fld id="{8F72BA41-EC5B-4197-BCC8-0FD2E523CD7A}" type="datetimeFigureOut">
               <a:rPr lang="en-US" smtClean="0"/>
-              <a:t>10/28/2022</a:t>
+              <a:t>11/4/2022</a:t>
             </a:fld>
             <a:endParaRPr lang="en-US"/>
           </a:p>
@@ -5702,7 +5705,7 @@
           <a:p>
             <a:fld id="{8F72BA41-EC5B-4197-BCC8-0FD2E523CD7A}" type="datetimeFigureOut">
               <a:rPr lang="en-US" smtClean="0"/>
-              <a:t>10/28/2022</a:t>
+              <a:t>11/4/2022</a:t>
             </a:fld>
             <a:endParaRPr lang="en-US"/>
           </a:p>
@@ -5975,7 +5978,7 @@
           <a:p>
             <a:fld id="{8F72BA41-EC5B-4197-BCC8-0FD2E523CD7A}" type="datetimeFigureOut">
               <a:rPr lang="en-US" smtClean="0"/>
-              <a:t>10/28/2022</a:t>
+              <a:t>11/4/2022</a:t>
             </a:fld>
             <a:endParaRPr lang="en-US"/>
           </a:p>
@@ -6395,7 +6398,7 @@
           <a:p>
             <a:fld id="{8F72BA41-EC5B-4197-BCC8-0FD2E523CD7A}" type="datetimeFigureOut">
               <a:rPr lang="en-US" smtClean="0"/>
-              <a:t>10/28/2022</a:t>
+              <a:t>11/4/2022</a:t>
             </a:fld>
             <a:endParaRPr lang="en-US"/>
           </a:p>
@@ -6551,7 +6554,7 @@
           <a:p>
             <a:fld id="{8F72BA41-EC5B-4197-BCC8-0FD2E523CD7A}" type="datetimeFigureOut">
               <a:rPr lang="en-US" smtClean="0"/>
-              <a:t>10/28/2022</a:t>
+              <a:t>11/4/2022</a:t>
             </a:fld>
             <a:endParaRPr lang="en-US"/>
           </a:p>
@@ -8119,7 +8122,7 @@
           <a:p>
             <a:fld id="{8F72BA41-EC5B-4197-BCC8-0FD2E523CD7A}" type="datetimeFigureOut">
               <a:rPr lang="en-US" smtClean="0"/>
-              <a:t>10/28/2022</a:t>
+              <a:t>11/4/2022</a:t>
             </a:fld>
             <a:endParaRPr lang="en-US"/>
           </a:p>
@@ -9970,7 +9973,7 @@
           <a:p>
             <a:fld id="{8F72BA41-EC5B-4197-BCC8-0FD2E523CD7A}" type="datetimeFigureOut">
               <a:rPr lang="en-US" smtClean="0"/>
-              <a:t>10/28/2022</a:t>
+              <a:t>11/4/2022</a:t>
             </a:fld>
             <a:endParaRPr lang="en-US"/>
           </a:p>
@@ -11783,7 +11786,7 @@
           <a:p>
             <a:fld id="{8F72BA41-EC5B-4197-BCC8-0FD2E523CD7A}" type="datetimeFigureOut">
               <a:rPr lang="en-US" smtClean="0"/>
-              <a:t>10/28/2022</a:t>
+              <a:t>11/4/2022</a:t>
             </a:fld>
             <a:endParaRPr lang="en-US"/>
           </a:p>
@@ -13477,7 +13480,7 @@
             <a:fld id="{8F72BA41-EC5B-4197-BCC8-0FD2E523CD7A}" type="datetimeFigureOut">
               <a:rPr lang="en-US" smtClean="0"/>
               <a:pPr/>
-              <a:t>10/28/2022</a:t>
+              <a:t>11/4/2022</a:t>
             </a:fld>
             <a:endParaRPr lang="en-US" dirty="0"/>
           </a:p>
@@ -16357,6 +16360,1902 @@
         </p:nvSpPr>
         <p:spPr>
           <a:xfrm>
+            <a:off x="375920" y="90593"/>
+            <a:ext cx="8361680" cy="676505"/>
+          </a:xfrm>
+        </p:spPr>
+        <p:txBody>
+          <a:bodyPr vert="horz" lIns="91440" tIns="45720" rIns="91440" bIns="45720" rtlCol="0" anchor="b">
+            <a:normAutofit fontScale="90000"/>
+          </a:bodyPr>
+          <a:lstStyle/>
+          <a:p>
+            <a:pPr>
+              <a:lnSpc>
+                <a:spcPct val="90000"/>
+              </a:lnSpc>
+            </a:pPr>
+            <a:r>
+              <a:rPr lang="es-AR" sz="4200" dirty="0"/>
+              <a:t>Chequeo Entrelazamiento Cuántico</a:t>
+            </a:r>
+            <a:endParaRPr lang="en-US" sz="4200" dirty="0"/>
+          </a:p>
+        </p:txBody>
+      </p:sp>
+      <p:sp>
+        <p:nvSpPr>
+          <p:cNvPr id="3" name="Subtitle 2">
+            <a:extLst>
+              <a:ext uri="{FF2B5EF4-FFF2-40B4-BE49-F238E27FC236}">
+                <a16:creationId xmlns:a16="http://schemas.microsoft.com/office/drawing/2014/main" id="{73CA6260-6C0F-D08C-E398-A7B28E978324}"/>
+              </a:ext>
+            </a:extLst>
+          </p:cNvPr>
+          <p:cNvSpPr txBox="1">
+            <a:spLocks/>
+          </p:cNvSpPr>
+          <p:nvPr/>
+        </p:nvSpPr>
+        <p:spPr>
+          <a:xfrm>
+            <a:off x="421673" y="6349415"/>
+            <a:ext cx="5633922" cy="658680"/>
+          </a:xfrm>
+          <a:prstGeom prst="rect">
+            <a:avLst/>
+          </a:prstGeom>
+        </p:spPr>
+        <p:txBody>
+          <a:bodyPr vert="horz" lIns="91440" tIns="45720" rIns="91440" bIns="45720" rtlCol="0">
+            <a:normAutofit fontScale="85000" lnSpcReduction="10000"/>
+          </a:bodyPr>
+          <a:lstStyle>
+            <a:lvl1pPr marL="0" indent="0" algn="l" defTabSz="914400" rtl="0" eaLnBrk="1" latinLnBrk="0" hangingPunct="1">
+              <a:lnSpc>
+                <a:spcPct val="110000"/>
+              </a:lnSpc>
+              <a:spcBef>
+                <a:spcPts val="1000"/>
+              </a:spcBef>
+              <a:buClr>
+                <a:schemeClr val="tx2">
+                  <a:lumMod val="50000"/>
+                  <a:lumOff val="50000"/>
+                </a:schemeClr>
+              </a:buClr>
+              <a:buSzPct val="75000"/>
+              <a:buFont typeface="Wingdings" panose="05000000000000000000" pitchFamily="2" charset="2"/>
+              <a:buNone/>
+              <a:defRPr sz="2400" kern="1200">
+                <a:solidFill>
+                  <a:schemeClr val="tx2"/>
+                </a:solidFill>
+                <a:latin typeface="+mn-lt"/>
+                <a:ea typeface="+mn-ea"/>
+                <a:cs typeface="+mn-cs"/>
+              </a:defRPr>
+            </a:lvl1pPr>
+            <a:lvl2pPr marL="457200" indent="0" algn="ctr" defTabSz="914400" rtl="0" eaLnBrk="1" latinLnBrk="0" hangingPunct="1">
+              <a:lnSpc>
+                <a:spcPct val="110000"/>
+              </a:lnSpc>
+              <a:spcBef>
+                <a:spcPts val="500"/>
+              </a:spcBef>
+              <a:buClr>
+                <a:schemeClr val="tx2">
+                  <a:lumMod val="50000"/>
+                  <a:lumOff val="50000"/>
+                </a:schemeClr>
+              </a:buClr>
+              <a:buSzPct val="75000"/>
+              <a:buFont typeface="Wingdings" panose="05000000000000000000" pitchFamily="2" charset="2"/>
+              <a:buNone/>
+              <a:defRPr sz="2000" kern="1200">
+                <a:solidFill>
+                  <a:schemeClr val="tx2"/>
+                </a:solidFill>
+                <a:latin typeface="+mn-lt"/>
+                <a:ea typeface="+mn-ea"/>
+                <a:cs typeface="+mn-cs"/>
+              </a:defRPr>
+            </a:lvl2pPr>
+            <a:lvl3pPr marL="914400" indent="0" algn="ctr" defTabSz="914400" rtl="0" eaLnBrk="1" latinLnBrk="0" hangingPunct="1">
+              <a:lnSpc>
+                <a:spcPct val="110000"/>
+              </a:lnSpc>
+              <a:spcBef>
+                <a:spcPts val="500"/>
+              </a:spcBef>
+              <a:buClr>
+                <a:schemeClr val="tx2">
+                  <a:lumMod val="50000"/>
+                  <a:lumOff val="50000"/>
+                </a:schemeClr>
+              </a:buClr>
+              <a:buSzPct val="75000"/>
+              <a:buFont typeface="Wingdings" panose="05000000000000000000" pitchFamily="2" charset="2"/>
+              <a:buNone/>
+              <a:defRPr sz="1800" kern="1200">
+                <a:solidFill>
+                  <a:schemeClr val="tx2"/>
+                </a:solidFill>
+                <a:latin typeface="+mn-lt"/>
+                <a:ea typeface="+mn-ea"/>
+                <a:cs typeface="+mn-cs"/>
+              </a:defRPr>
+            </a:lvl3pPr>
+            <a:lvl4pPr marL="1371600" indent="0" algn="ctr" defTabSz="914400" rtl="0" eaLnBrk="1" latinLnBrk="0" hangingPunct="1">
+              <a:lnSpc>
+                <a:spcPct val="110000"/>
+              </a:lnSpc>
+              <a:spcBef>
+                <a:spcPts val="500"/>
+              </a:spcBef>
+              <a:buClr>
+                <a:schemeClr val="tx2">
+                  <a:lumMod val="50000"/>
+                  <a:lumOff val="50000"/>
+                </a:schemeClr>
+              </a:buClr>
+              <a:buSzPct val="75000"/>
+              <a:buFont typeface="Wingdings" panose="05000000000000000000" pitchFamily="2" charset="2"/>
+              <a:buNone/>
+              <a:defRPr sz="1600" kern="1200">
+                <a:solidFill>
+                  <a:schemeClr val="tx2"/>
+                </a:solidFill>
+                <a:latin typeface="+mn-lt"/>
+                <a:ea typeface="+mn-ea"/>
+                <a:cs typeface="+mn-cs"/>
+              </a:defRPr>
+            </a:lvl4pPr>
+            <a:lvl5pPr marL="1828800" indent="0" algn="ctr" defTabSz="914400" rtl="0" eaLnBrk="1" latinLnBrk="0" hangingPunct="1">
+              <a:lnSpc>
+                <a:spcPct val="110000"/>
+              </a:lnSpc>
+              <a:spcBef>
+                <a:spcPts val="500"/>
+              </a:spcBef>
+              <a:buClr>
+                <a:schemeClr val="tx2">
+                  <a:lumMod val="50000"/>
+                  <a:lumOff val="50000"/>
+                </a:schemeClr>
+              </a:buClr>
+              <a:buSzPct val="75000"/>
+              <a:buFont typeface="Wingdings" panose="05000000000000000000" pitchFamily="2" charset="2"/>
+              <a:buNone/>
+              <a:defRPr sz="1600" kern="1200">
+                <a:solidFill>
+                  <a:schemeClr val="tx2"/>
+                </a:solidFill>
+                <a:latin typeface="+mn-lt"/>
+                <a:ea typeface="+mn-ea"/>
+                <a:cs typeface="+mn-cs"/>
+              </a:defRPr>
+            </a:lvl5pPr>
+            <a:lvl6pPr marL="2286000" indent="0" algn="ctr" defTabSz="914400" rtl="0" eaLnBrk="1" latinLnBrk="0" hangingPunct="1">
+              <a:lnSpc>
+                <a:spcPct val="90000"/>
+              </a:lnSpc>
+              <a:spcBef>
+                <a:spcPts val="500"/>
+              </a:spcBef>
+              <a:buFont typeface="Arial" panose="020B0604020202020204" pitchFamily="34" charset="0"/>
+              <a:buNone/>
+              <a:defRPr sz="1600" kern="1200">
+                <a:solidFill>
+                  <a:schemeClr val="tx1"/>
+                </a:solidFill>
+                <a:latin typeface="+mn-lt"/>
+                <a:ea typeface="+mn-ea"/>
+                <a:cs typeface="+mn-cs"/>
+              </a:defRPr>
+            </a:lvl6pPr>
+            <a:lvl7pPr marL="2743200" indent="0" algn="ctr" defTabSz="914400" rtl="0" eaLnBrk="1" latinLnBrk="0" hangingPunct="1">
+              <a:lnSpc>
+                <a:spcPct val="90000"/>
+              </a:lnSpc>
+              <a:spcBef>
+                <a:spcPts val="500"/>
+              </a:spcBef>
+              <a:buFont typeface="Arial" panose="020B0604020202020204" pitchFamily="34" charset="0"/>
+              <a:buNone/>
+              <a:defRPr sz="1600" kern="1200">
+                <a:solidFill>
+                  <a:schemeClr val="tx1"/>
+                </a:solidFill>
+                <a:latin typeface="+mn-lt"/>
+                <a:ea typeface="+mn-ea"/>
+                <a:cs typeface="+mn-cs"/>
+              </a:defRPr>
+            </a:lvl7pPr>
+            <a:lvl8pPr marL="3200400" indent="0" algn="ctr" defTabSz="914400" rtl="0" eaLnBrk="1" latinLnBrk="0" hangingPunct="1">
+              <a:lnSpc>
+                <a:spcPct val="90000"/>
+              </a:lnSpc>
+              <a:spcBef>
+                <a:spcPts val="500"/>
+              </a:spcBef>
+              <a:buFont typeface="Arial" panose="020B0604020202020204" pitchFamily="34" charset="0"/>
+              <a:buNone/>
+              <a:defRPr sz="1600" kern="1200">
+                <a:solidFill>
+                  <a:schemeClr val="tx1"/>
+                </a:solidFill>
+                <a:latin typeface="+mn-lt"/>
+                <a:ea typeface="+mn-ea"/>
+                <a:cs typeface="+mn-cs"/>
+              </a:defRPr>
+            </a:lvl8pPr>
+            <a:lvl9pPr marL="3657600" indent="0" algn="ctr" defTabSz="914400" rtl="0" eaLnBrk="1" latinLnBrk="0" hangingPunct="1">
+              <a:lnSpc>
+                <a:spcPct val="90000"/>
+              </a:lnSpc>
+              <a:spcBef>
+                <a:spcPts val="500"/>
+              </a:spcBef>
+              <a:buFont typeface="Arial" panose="020B0604020202020204" pitchFamily="34" charset="0"/>
+              <a:buNone/>
+              <a:defRPr sz="1600" kern="1200">
+                <a:solidFill>
+                  <a:schemeClr val="tx1"/>
+                </a:solidFill>
+                <a:latin typeface="+mn-lt"/>
+                <a:ea typeface="+mn-ea"/>
+                <a:cs typeface="+mn-cs"/>
+              </a:defRPr>
+            </a:lvl9pPr>
+          </a:lstStyle>
+          <a:p>
+            <a:r>
+              <a:rPr lang="es-AR" dirty="0"/>
+              <a:t>Machine </a:t>
+            </a:r>
+            <a:r>
+              <a:rPr lang="es-AR" dirty="0" err="1"/>
+              <a:t>Learning</a:t>
+            </a:r>
+            <a:r>
+              <a:rPr lang="es-AR" dirty="0"/>
+              <a:t> &amp; Quantum Deep </a:t>
+            </a:r>
+            <a:r>
+              <a:rPr lang="es-AR" dirty="0" err="1"/>
+              <a:t>Learning</a:t>
+            </a:r>
+            <a:endParaRPr lang="en-US" dirty="0"/>
+          </a:p>
+        </p:txBody>
+      </p:sp>
+      <p:pic>
+        <p:nvPicPr>
+          <p:cNvPr id="7" name="Picture 6">
+            <a:extLst>
+              <a:ext uri="{FF2B5EF4-FFF2-40B4-BE49-F238E27FC236}">
+                <a16:creationId xmlns:a16="http://schemas.microsoft.com/office/drawing/2014/main" id="{ECE12BBD-AAA1-8946-34FA-5C0EBAD61BC7}"/>
+              </a:ext>
+            </a:extLst>
+          </p:cNvPr>
+          <p:cNvPicPr>
+            <a:picLocks noChangeAspect="1"/>
+          </p:cNvPicPr>
+          <p:nvPr/>
+        </p:nvPicPr>
+        <p:blipFill>
+          <a:blip r:embed="rId3"/>
+          <a:stretch>
+            <a:fillRect/>
+          </a:stretch>
+        </p:blipFill>
+        <p:spPr>
+          <a:xfrm>
+            <a:off x="543218" y="1427418"/>
+            <a:ext cx="5512378" cy="2960729"/>
+          </a:xfrm>
+          <a:prstGeom prst="rect">
+            <a:avLst/>
+          </a:prstGeom>
+        </p:spPr>
+      </p:pic>
+      <p:sp>
+        <p:nvSpPr>
+          <p:cNvPr id="8" name="Subtitle 2">
+            <a:extLst>
+              <a:ext uri="{FF2B5EF4-FFF2-40B4-BE49-F238E27FC236}">
+                <a16:creationId xmlns:a16="http://schemas.microsoft.com/office/drawing/2014/main" id="{F2A5A464-317D-2A0E-E40D-0F0E7EFDBDB7}"/>
+              </a:ext>
+            </a:extLst>
+          </p:cNvPr>
+          <p:cNvSpPr txBox="1">
+            <a:spLocks/>
+          </p:cNvSpPr>
+          <p:nvPr/>
+        </p:nvSpPr>
+        <p:spPr>
+          <a:xfrm>
+            <a:off x="421672" y="854278"/>
+            <a:ext cx="6263607" cy="658680"/>
+          </a:xfrm>
+          <a:prstGeom prst="rect">
+            <a:avLst/>
+          </a:prstGeom>
+        </p:spPr>
+        <p:txBody>
+          <a:bodyPr vert="horz" lIns="91440" tIns="45720" rIns="91440" bIns="45720" rtlCol="0">
+            <a:normAutofit fontScale="92500"/>
+          </a:bodyPr>
+          <a:lstStyle>
+            <a:lvl1pPr marL="0" indent="0" algn="l" defTabSz="914400" rtl="0" eaLnBrk="1" latinLnBrk="0" hangingPunct="1">
+              <a:lnSpc>
+                <a:spcPct val="110000"/>
+              </a:lnSpc>
+              <a:spcBef>
+                <a:spcPts val="1000"/>
+              </a:spcBef>
+              <a:buClr>
+                <a:schemeClr val="tx2">
+                  <a:lumMod val="50000"/>
+                  <a:lumOff val="50000"/>
+                </a:schemeClr>
+              </a:buClr>
+              <a:buSzPct val="75000"/>
+              <a:buFont typeface="Wingdings" panose="05000000000000000000" pitchFamily="2" charset="2"/>
+              <a:buNone/>
+              <a:defRPr sz="2400" kern="1200">
+                <a:solidFill>
+                  <a:schemeClr val="tx2"/>
+                </a:solidFill>
+                <a:latin typeface="+mn-lt"/>
+                <a:ea typeface="+mn-ea"/>
+                <a:cs typeface="+mn-cs"/>
+              </a:defRPr>
+            </a:lvl1pPr>
+            <a:lvl2pPr marL="457200" indent="0" algn="ctr" defTabSz="914400" rtl="0" eaLnBrk="1" latinLnBrk="0" hangingPunct="1">
+              <a:lnSpc>
+                <a:spcPct val="110000"/>
+              </a:lnSpc>
+              <a:spcBef>
+                <a:spcPts val="500"/>
+              </a:spcBef>
+              <a:buClr>
+                <a:schemeClr val="tx2">
+                  <a:lumMod val="50000"/>
+                  <a:lumOff val="50000"/>
+                </a:schemeClr>
+              </a:buClr>
+              <a:buSzPct val="75000"/>
+              <a:buFont typeface="Wingdings" panose="05000000000000000000" pitchFamily="2" charset="2"/>
+              <a:buNone/>
+              <a:defRPr sz="2000" kern="1200">
+                <a:solidFill>
+                  <a:schemeClr val="tx2"/>
+                </a:solidFill>
+                <a:latin typeface="+mn-lt"/>
+                <a:ea typeface="+mn-ea"/>
+                <a:cs typeface="+mn-cs"/>
+              </a:defRPr>
+            </a:lvl2pPr>
+            <a:lvl3pPr marL="914400" indent="0" algn="ctr" defTabSz="914400" rtl="0" eaLnBrk="1" latinLnBrk="0" hangingPunct="1">
+              <a:lnSpc>
+                <a:spcPct val="110000"/>
+              </a:lnSpc>
+              <a:spcBef>
+                <a:spcPts val="500"/>
+              </a:spcBef>
+              <a:buClr>
+                <a:schemeClr val="tx2">
+                  <a:lumMod val="50000"/>
+                  <a:lumOff val="50000"/>
+                </a:schemeClr>
+              </a:buClr>
+              <a:buSzPct val="75000"/>
+              <a:buFont typeface="Wingdings" panose="05000000000000000000" pitchFamily="2" charset="2"/>
+              <a:buNone/>
+              <a:defRPr sz="1800" kern="1200">
+                <a:solidFill>
+                  <a:schemeClr val="tx2"/>
+                </a:solidFill>
+                <a:latin typeface="+mn-lt"/>
+                <a:ea typeface="+mn-ea"/>
+                <a:cs typeface="+mn-cs"/>
+              </a:defRPr>
+            </a:lvl3pPr>
+            <a:lvl4pPr marL="1371600" indent="0" algn="ctr" defTabSz="914400" rtl="0" eaLnBrk="1" latinLnBrk="0" hangingPunct="1">
+              <a:lnSpc>
+                <a:spcPct val="110000"/>
+              </a:lnSpc>
+              <a:spcBef>
+                <a:spcPts val="500"/>
+              </a:spcBef>
+              <a:buClr>
+                <a:schemeClr val="tx2">
+                  <a:lumMod val="50000"/>
+                  <a:lumOff val="50000"/>
+                </a:schemeClr>
+              </a:buClr>
+              <a:buSzPct val="75000"/>
+              <a:buFont typeface="Wingdings" panose="05000000000000000000" pitchFamily="2" charset="2"/>
+              <a:buNone/>
+              <a:defRPr sz="1600" kern="1200">
+                <a:solidFill>
+                  <a:schemeClr val="tx2"/>
+                </a:solidFill>
+                <a:latin typeface="+mn-lt"/>
+                <a:ea typeface="+mn-ea"/>
+                <a:cs typeface="+mn-cs"/>
+              </a:defRPr>
+            </a:lvl4pPr>
+            <a:lvl5pPr marL="1828800" indent="0" algn="ctr" defTabSz="914400" rtl="0" eaLnBrk="1" latinLnBrk="0" hangingPunct="1">
+              <a:lnSpc>
+                <a:spcPct val="110000"/>
+              </a:lnSpc>
+              <a:spcBef>
+                <a:spcPts val="500"/>
+              </a:spcBef>
+              <a:buClr>
+                <a:schemeClr val="tx2">
+                  <a:lumMod val="50000"/>
+                  <a:lumOff val="50000"/>
+                </a:schemeClr>
+              </a:buClr>
+              <a:buSzPct val="75000"/>
+              <a:buFont typeface="Wingdings" panose="05000000000000000000" pitchFamily="2" charset="2"/>
+              <a:buNone/>
+              <a:defRPr sz="1600" kern="1200">
+                <a:solidFill>
+                  <a:schemeClr val="tx2"/>
+                </a:solidFill>
+                <a:latin typeface="+mn-lt"/>
+                <a:ea typeface="+mn-ea"/>
+                <a:cs typeface="+mn-cs"/>
+              </a:defRPr>
+            </a:lvl5pPr>
+            <a:lvl6pPr marL="2286000" indent="0" algn="ctr" defTabSz="914400" rtl="0" eaLnBrk="1" latinLnBrk="0" hangingPunct="1">
+              <a:lnSpc>
+                <a:spcPct val="90000"/>
+              </a:lnSpc>
+              <a:spcBef>
+                <a:spcPts val="500"/>
+              </a:spcBef>
+              <a:buFont typeface="Arial" panose="020B0604020202020204" pitchFamily="34" charset="0"/>
+              <a:buNone/>
+              <a:defRPr sz="1600" kern="1200">
+                <a:solidFill>
+                  <a:schemeClr val="tx1"/>
+                </a:solidFill>
+                <a:latin typeface="+mn-lt"/>
+                <a:ea typeface="+mn-ea"/>
+                <a:cs typeface="+mn-cs"/>
+              </a:defRPr>
+            </a:lvl6pPr>
+            <a:lvl7pPr marL="2743200" indent="0" algn="ctr" defTabSz="914400" rtl="0" eaLnBrk="1" latinLnBrk="0" hangingPunct="1">
+              <a:lnSpc>
+                <a:spcPct val="90000"/>
+              </a:lnSpc>
+              <a:spcBef>
+                <a:spcPts val="500"/>
+              </a:spcBef>
+              <a:buFont typeface="Arial" panose="020B0604020202020204" pitchFamily="34" charset="0"/>
+              <a:buNone/>
+              <a:defRPr sz="1600" kern="1200">
+                <a:solidFill>
+                  <a:schemeClr val="tx1"/>
+                </a:solidFill>
+                <a:latin typeface="+mn-lt"/>
+                <a:ea typeface="+mn-ea"/>
+                <a:cs typeface="+mn-cs"/>
+              </a:defRPr>
+            </a:lvl7pPr>
+            <a:lvl8pPr marL="3200400" indent="0" algn="ctr" defTabSz="914400" rtl="0" eaLnBrk="1" latinLnBrk="0" hangingPunct="1">
+              <a:lnSpc>
+                <a:spcPct val="90000"/>
+              </a:lnSpc>
+              <a:spcBef>
+                <a:spcPts val="500"/>
+              </a:spcBef>
+              <a:buFont typeface="Arial" panose="020B0604020202020204" pitchFamily="34" charset="0"/>
+              <a:buNone/>
+              <a:defRPr sz="1600" kern="1200">
+                <a:solidFill>
+                  <a:schemeClr val="tx1"/>
+                </a:solidFill>
+                <a:latin typeface="+mn-lt"/>
+                <a:ea typeface="+mn-ea"/>
+                <a:cs typeface="+mn-cs"/>
+              </a:defRPr>
+            </a:lvl8pPr>
+            <a:lvl9pPr marL="3657600" indent="0" algn="ctr" defTabSz="914400" rtl="0" eaLnBrk="1" latinLnBrk="0" hangingPunct="1">
+              <a:lnSpc>
+                <a:spcPct val="90000"/>
+              </a:lnSpc>
+              <a:spcBef>
+                <a:spcPts val="500"/>
+              </a:spcBef>
+              <a:buFont typeface="Arial" panose="020B0604020202020204" pitchFamily="34" charset="0"/>
+              <a:buNone/>
+              <a:defRPr sz="1600" kern="1200">
+                <a:solidFill>
+                  <a:schemeClr val="tx1"/>
+                </a:solidFill>
+                <a:latin typeface="+mn-lt"/>
+                <a:ea typeface="+mn-ea"/>
+                <a:cs typeface="+mn-cs"/>
+              </a:defRPr>
+            </a:lvl9pPr>
+          </a:lstStyle>
+          <a:p>
+            <a:r>
+              <a:rPr lang="es-AR" dirty="0"/>
+              <a:t>Matriz de Densidad para parámetros aleatorios</a:t>
+            </a:r>
+            <a:endParaRPr lang="en-US" dirty="0"/>
+          </a:p>
+        </p:txBody>
+      </p:sp>
+      <p:pic>
+        <p:nvPicPr>
+          <p:cNvPr id="11" name="Picture 10">
+            <a:extLst>
+              <a:ext uri="{FF2B5EF4-FFF2-40B4-BE49-F238E27FC236}">
+                <a16:creationId xmlns:a16="http://schemas.microsoft.com/office/drawing/2014/main" id="{E4BB84F3-C397-B079-EF72-49150E0E5833}"/>
+              </a:ext>
+            </a:extLst>
+          </p:cNvPr>
+          <p:cNvPicPr>
+            <a:picLocks noChangeAspect="1"/>
+          </p:cNvPicPr>
+          <p:nvPr/>
+        </p:nvPicPr>
+        <p:blipFill>
+          <a:blip r:embed="rId4"/>
+          <a:stretch>
+            <a:fillRect/>
+          </a:stretch>
+        </p:blipFill>
+        <p:spPr>
+          <a:xfrm>
+            <a:off x="421672" y="4628239"/>
+            <a:ext cx="11171263" cy="1495634"/>
+          </a:xfrm>
+          <a:prstGeom prst="rect">
+            <a:avLst/>
+          </a:prstGeom>
+        </p:spPr>
+      </p:pic>
+    </p:spTree>
+    <p:extLst>
+      <p:ext uri="{BB962C8B-B14F-4D97-AF65-F5344CB8AC3E}">
+        <p14:creationId xmlns:p14="http://schemas.microsoft.com/office/powerpoint/2010/main" val="934622184"/>
+      </p:ext>
+    </p:extLst>
+  </p:cSld>
+  <p:clrMapOvr>
+    <a:masterClrMapping/>
+  </p:clrMapOvr>
+</p:sld>
+</file>
+
+<file path=ppt/slides/slide11.xml><?xml version="1.0" encoding="utf-8"?>
+<p:sld xmlns:a="http://schemas.openxmlformats.org/drawingml/2006/main" xmlns:r="http://schemas.openxmlformats.org/officeDocument/2006/relationships" xmlns:p="http://schemas.openxmlformats.org/presentationml/2006/main">
+  <p:cSld>
+    <p:spTree>
+      <p:nvGrpSpPr>
+        <p:cNvPr id="1" name=""/>
+        <p:cNvGrpSpPr/>
+        <p:nvPr/>
+      </p:nvGrpSpPr>
+      <p:grpSpPr>
+        <a:xfrm>
+          <a:off x="0" y="0"/>
+          <a:ext cx="0" cy="0"/>
+          <a:chOff x="0" y="0"/>
+          <a:chExt cx="0" cy="0"/>
+        </a:xfrm>
+      </p:grpSpPr>
+      <p:sp>
+        <p:nvSpPr>
+          <p:cNvPr id="2" name="Title 1">
+            <a:extLst>
+              <a:ext uri="{FF2B5EF4-FFF2-40B4-BE49-F238E27FC236}">
+                <a16:creationId xmlns:a16="http://schemas.microsoft.com/office/drawing/2014/main" id="{EB6A064A-D868-272C-A067-DD7A50F22CEB}"/>
+              </a:ext>
+            </a:extLst>
+          </p:cNvPr>
+          <p:cNvSpPr>
+            <a:spLocks noGrp="1"/>
+          </p:cNvSpPr>
+          <p:nvPr>
+            <p:ph type="ctrTitle"/>
+          </p:nvPr>
+        </p:nvSpPr>
+        <p:spPr>
+          <a:xfrm>
+            <a:off x="22847" y="48063"/>
+            <a:ext cx="6643087" cy="676505"/>
+          </a:xfrm>
+        </p:spPr>
+        <p:txBody>
+          <a:bodyPr vert="horz" lIns="91440" tIns="45720" rIns="91440" bIns="45720" rtlCol="0" anchor="b">
+            <a:normAutofit/>
+          </a:bodyPr>
+          <a:lstStyle/>
+          <a:p>
+            <a:pPr>
+              <a:lnSpc>
+                <a:spcPct val="90000"/>
+              </a:lnSpc>
+            </a:pPr>
+            <a:r>
+              <a:rPr lang="es-AR" sz="4200" dirty="0"/>
+              <a:t>Net </a:t>
+            </a:r>
+            <a:r>
+              <a:rPr lang="es-AR" sz="4200" dirty="0" err="1"/>
+              <a:t>Overwiew</a:t>
+            </a:r>
+            <a:endParaRPr lang="en-US" sz="4200" dirty="0"/>
+          </a:p>
+        </p:txBody>
+      </p:sp>
+      <p:sp>
+        <p:nvSpPr>
+          <p:cNvPr id="3" name="Subtitle 2">
+            <a:extLst>
+              <a:ext uri="{FF2B5EF4-FFF2-40B4-BE49-F238E27FC236}">
+                <a16:creationId xmlns:a16="http://schemas.microsoft.com/office/drawing/2014/main" id="{73CA6260-6C0F-D08C-E398-A7B28E978324}"/>
+              </a:ext>
+            </a:extLst>
+          </p:cNvPr>
+          <p:cNvSpPr txBox="1">
+            <a:spLocks/>
+          </p:cNvSpPr>
+          <p:nvPr/>
+        </p:nvSpPr>
+        <p:spPr>
+          <a:xfrm>
+            <a:off x="421673" y="6349415"/>
+            <a:ext cx="5633922" cy="658680"/>
+          </a:xfrm>
+          <a:prstGeom prst="rect">
+            <a:avLst/>
+          </a:prstGeom>
+        </p:spPr>
+        <p:txBody>
+          <a:bodyPr vert="horz" lIns="91440" tIns="45720" rIns="91440" bIns="45720" rtlCol="0">
+            <a:normAutofit fontScale="85000" lnSpcReduction="10000"/>
+          </a:bodyPr>
+          <a:lstStyle>
+            <a:lvl1pPr marL="0" indent="0" algn="l" defTabSz="914400" rtl="0" eaLnBrk="1" latinLnBrk="0" hangingPunct="1">
+              <a:lnSpc>
+                <a:spcPct val="110000"/>
+              </a:lnSpc>
+              <a:spcBef>
+                <a:spcPts val="1000"/>
+              </a:spcBef>
+              <a:buClr>
+                <a:schemeClr val="tx2">
+                  <a:lumMod val="50000"/>
+                  <a:lumOff val="50000"/>
+                </a:schemeClr>
+              </a:buClr>
+              <a:buSzPct val="75000"/>
+              <a:buFont typeface="Wingdings" panose="05000000000000000000" pitchFamily="2" charset="2"/>
+              <a:buNone/>
+              <a:defRPr sz="2400" kern="1200">
+                <a:solidFill>
+                  <a:schemeClr val="tx2"/>
+                </a:solidFill>
+                <a:latin typeface="+mn-lt"/>
+                <a:ea typeface="+mn-ea"/>
+                <a:cs typeface="+mn-cs"/>
+              </a:defRPr>
+            </a:lvl1pPr>
+            <a:lvl2pPr marL="457200" indent="0" algn="ctr" defTabSz="914400" rtl="0" eaLnBrk="1" latinLnBrk="0" hangingPunct="1">
+              <a:lnSpc>
+                <a:spcPct val="110000"/>
+              </a:lnSpc>
+              <a:spcBef>
+                <a:spcPts val="500"/>
+              </a:spcBef>
+              <a:buClr>
+                <a:schemeClr val="tx2">
+                  <a:lumMod val="50000"/>
+                  <a:lumOff val="50000"/>
+                </a:schemeClr>
+              </a:buClr>
+              <a:buSzPct val="75000"/>
+              <a:buFont typeface="Wingdings" panose="05000000000000000000" pitchFamily="2" charset="2"/>
+              <a:buNone/>
+              <a:defRPr sz="2000" kern="1200">
+                <a:solidFill>
+                  <a:schemeClr val="tx2"/>
+                </a:solidFill>
+                <a:latin typeface="+mn-lt"/>
+                <a:ea typeface="+mn-ea"/>
+                <a:cs typeface="+mn-cs"/>
+              </a:defRPr>
+            </a:lvl2pPr>
+            <a:lvl3pPr marL="914400" indent="0" algn="ctr" defTabSz="914400" rtl="0" eaLnBrk="1" latinLnBrk="0" hangingPunct="1">
+              <a:lnSpc>
+                <a:spcPct val="110000"/>
+              </a:lnSpc>
+              <a:spcBef>
+                <a:spcPts val="500"/>
+              </a:spcBef>
+              <a:buClr>
+                <a:schemeClr val="tx2">
+                  <a:lumMod val="50000"/>
+                  <a:lumOff val="50000"/>
+                </a:schemeClr>
+              </a:buClr>
+              <a:buSzPct val="75000"/>
+              <a:buFont typeface="Wingdings" panose="05000000000000000000" pitchFamily="2" charset="2"/>
+              <a:buNone/>
+              <a:defRPr sz="1800" kern="1200">
+                <a:solidFill>
+                  <a:schemeClr val="tx2"/>
+                </a:solidFill>
+                <a:latin typeface="+mn-lt"/>
+                <a:ea typeface="+mn-ea"/>
+                <a:cs typeface="+mn-cs"/>
+              </a:defRPr>
+            </a:lvl3pPr>
+            <a:lvl4pPr marL="1371600" indent="0" algn="ctr" defTabSz="914400" rtl="0" eaLnBrk="1" latinLnBrk="0" hangingPunct="1">
+              <a:lnSpc>
+                <a:spcPct val="110000"/>
+              </a:lnSpc>
+              <a:spcBef>
+                <a:spcPts val="500"/>
+              </a:spcBef>
+              <a:buClr>
+                <a:schemeClr val="tx2">
+                  <a:lumMod val="50000"/>
+                  <a:lumOff val="50000"/>
+                </a:schemeClr>
+              </a:buClr>
+              <a:buSzPct val="75000"/>
+              <a:buFont typeface="Wingdings" panose="05000000000000000000" pitchFamily="2" charset="2"/>
+              <a:buNone/>
+              <a:defRPr sz="1600" kern="1200">
+                <a:solidFill>
+                  <a:schemeClr val="tx2"/>
+                </a:solidFill>
+                <a:latin typeface="+mn-lt"/>
+                <a:ea typeface="+mn-ea"/>
+                <a:cs typeface="+mn-cs"/>
+              </a:defRPr>
+            </a:lvl4pPr>
+            <a:lvl5pPr marL="1828800" indent="0" algn="ctr" defTabSz="914400" rtl="0" eaLnBrk="1" latinLnBrk="0" hangingPunct="1">
+              <a:lnSpc>
+                <a:spcPct val="110000"/>
+              </a:lnSpc>
+              <a:spcBef>
+                <a:spcPts val="500"/>
+              </a:spcBef>
+              <a:buClr>
+                <a:schemeClr val="tx2">
+                  <a:lumMod val="50000"/>
+                  <a:lumOff val="50000"/>
+                </a:schemeClr>
+              </a:buClr>
+              <a:buSzPct val="75000"/>
+              <a:buFont typeface="Wingdings" panose="05000000000000000000" pitchFamily="2" charset="2"/>
+              <a:buNone/>
+              <a:defRPr sz="1600" kern="1200">
+                <a:solidFill>
+                  <a:schemeClr val="tx2"/>
+                </a:solidFill>
+                <a:latin typeface="+mn-lt"/>
+                <a:ea typeface="+mn-ea"/>
+                <a:cs typeface="+mn-cs"/>
+              </a:defRPr>
+            </a:lvl5pPr>
+            <a:lvl6pPr marL="2286000" indent="0" algn="ctr" defTabSz="914400" rtl="0" eaLnBrk="1" latinLnBrk="0" hangingPunct="1">
+              <a:lnSpc>
+                <a:spcPct val="90000"/>
+              </a:lnSpc>
+              <a:spcBef>
+                <a:spcPts val="500"/>
+              </a:spcBef>
+              <a:buFont typeface="Arial" panose="020B0604020202020204" pitchFamily="34" charset="0"/>
+              <a:buNone/>
+              <a:defRPr sz="1600" kern="1200">
+                <a:solidFill>
+                  <a:schemeClr val="tx1"/>
+                </a:solidFill>
+                <a:latin typeface="+mn-lt"/>
+                <a:ea typeface="+mn-ea"/>
+                <a:cs typeface="+mn-cs"/>
+              </a:defRPr>
+            </a:lvl6pPr>
+            <a:lvl7pPr marL="2743200" indent="0" algn="ctr" defTabSz="914400" rtl="0" eaLnBrk="1" latinLnBrk="0" hangingPunct="1">
+              <a:lnSpc>
+                <a:spcPct val="90000"/>
+              </a:lnSpc>
+              <a:spcBef>
+                <a:spcPts val="500"/>
+              </a:spcBef>
+              <a:buFont typeface="Arial" panose="020B0604020202020204" pitchFamily="34" charset="0"/>
+              <a:buNone/>
+              <a:defRPr sz="1600" kern="1200">
+                <a:solidFill>
+                  <a:schemeClr val="tx1"/>
+                </a:solidFill>
+                <a:latin typeface="+mn-lt"/>
+                <a:ea typeface="+mn-ea"/>
+                <a:cs typeface="+mn-cs"/>
+              </a:defRPr>
+            </a:lvl7pPr>
+            <a:lvl8pPr marL="3200400" indent="0" algn="ctr" defTabSz="914400" rtl="0" eaLnBrk="1" latinLnBrk="0" hangingPunct="1">
+              <a:lnSpc>
+                <a:spcPct val="90000"/>
+              </a:lnSpc>
+              <a:spcBef>
+                <a:spcPts val="500"/>
+              </a:spcBef>
+              <a:buFont typeface="Arial" panose="020B0604020202020204" pitchFamily="34" charset="0"/>
+              <a:buNone/>
+              <a:defRPr sz="1600" kern="1200">
+                <a:solidFill>
+                  <a:schemeClr val="tx1"/>
+                </a:solidFill>
+                <a:latin typeface="+mn-lt"/>
+                <a:ea typeface="+mn-ea"/>
+                <a:cs typeface="+mn-cs"/>
+              </a:defRPr>
+            </a:lvl8pPr>
+            <a:lvl9pPr marL="3657600" indent="0" algn="ctr" defTabSz="914400" rtl="0" eaLnBrk="1" latinLnBrk="0" hangingPunct="1">
+              <a:lnSpc>
+                <a:spcPct val="90000"/>
+              </a:lnSpc>
+              <a:spcBef>
+                <a:spcPts val="500"/>
+              </a:spcBef>
+              <a:buFont typeface="Arial" panose="020B0604020202020204" pitchFamily="34" charset="0"/>
+              <a:buNone/>
+              <a:defRPr sz="1600" kern="1200">
+                <a:solidFill>
+                  <a:schemeClr val="tx1"/>
+                </a:solidFill>
+                <a:latin typeface="+mn-lt"/>
+                <a:ea typeface="+mn-ea"/>
+                <a:cs typeface="+mn-cs"/>
+              </a:defRPr>
+            </a:lvl9pPr>
+          </a:lstStyle>
+          <a:p>
+            <a:r>
+              <a:rPr lang="es-AR" dirty="0"/>
+              <a:t>Machine </a:t>
+            </a:r>
+            <a:r>
+              <a:rPr lang="es-AR" dirty="0" err="1"/>
+              <a:t>Learning</a:t>
+            </a:r>
+            <a:r>
+              <a:rPr lang="es-AR" dirty="0"/>
+              <a:t> &amp; Quantum Deep </a:t>
+            </a:r>
+            <a:r>
+              <a:rPr lang="es-AR" dirty="0" err="1"/>
+              <a:t>Learning</a:t>
+            </a:r>
+            <a:endParaRPr lang="en-US" dirty="0"/>
+          </a:p>
+        </p:txBody>
+      </p:sp>
+      <p:sp>
+        <p:nvSpPr>
+          <p:cNvPr id="8" name="TextBox 7">
+            <a:extLst>
+              <a:ext uri="{FF2B5EF4-FFF2-40B4-BE49-F238E27FC236}">
+                <a16:creationId xmlns:a16="http://schemas.microsoft.com/office/drawing/2014/main" id="{05446328-DA1A-2DF1-789C-4977EDF36AD5}"/>
+              </a:ext>
+            </a:extLst>
+          </p:cNvPr>
+          <p:cNvSpPr txBox="1"/>
+          <p:nvPr/>
+        </p:nvSpPr>
+        <p:spPr>
+          <a:xfrm>
+            <a:off x="4916456" y="672458"/>
+            <a:ext cx="7252697" cy="5355312"/>
+          </a:xfrm>
+          <a:prstGeom prst="rect">
+            <a:avLst/>
+          </a:prstGeom>
+          <a:noFill/>
+        </p:spPr>
+        <p:txBody>
+          <a:bodyPr wrap="square" rtlCol="0">
+            <a:spAutoFit/>
+          </a:bodyPr>
+          <a:lstStyle/>
+          <a:p>
+            <a:r>
+              <a:rPr lang="en-US" b="0" i="0" dirty="0">
+                <a:effectLst/>
+                <a:latin typeface="Consolas" panose="020B0609020204030204" pitchFamily="49" charset="0"/>
+              </a:rPr>
+              <a:t>Net( </a:t>
+            </a:r>
+          </a:p>
+          <a:p>
+            <a:r>
+              <a:rPr lang="en-US" b="0" i="0" dirty="0">
+                <a:effectLst/>
+                <a:latin typeface="Consolas" panose="020B0609020204030204" pitchFamily="49" charset="0"/>
+              </a:rPr>
+              <a:t>(conv1): Conv2d(3, 24, </a:t>
+            </a:r>
+            <a:r>
+              <a:rPr lang="en-US" b="0" i="0" dirty="0" err="1">
+                <a:effectLst/>
+                <a:latin typeface="Consolas" panose="020B0609020204030204" pitchFamily="49" charset="0"/>
+              </a:rPr>
+              <a:t>kernel_size</a:t>
+            </a:r>
+            <a:r>
+              <a:rPr lang="en-US" b="0" i="0" dirty="0">
+                <a:effectLst/>
+                <a:latin typeface="Consolas" panose="020B0609020204030204" pitchFamily="49" charset="0"/>
+              </a:rPr>
+              <a:t>=(5, 5), stride=(1, 1))</a:t>
+            </a:r>
+          </a:p>
+          <a:p>
+            <a:endParaRPr lang="en-US" b="0" i="0" dirty="0">
+              <a:effectLst/>
+              <a:latin typeface="Consolas" panose="020B0609020204030204" pitchFamily="49" charset="0"/>
+            </a:endParaRPr>
+          </a:p>
+          <a:p>
+            <a:r>
+              <a:rPr lang="en-US" b="0" i="0" dirty="0">
+                <a:effectLst/>
+                <a:latin typeface="Consolas" panose="020B0609020204030204" pitchFamily="49" charset="0"/>
+              </a:rPr>
+              <a:t>(conv2): Conv2d(24, 48, </a:t>
+            </a:r>
+            <a:r>
+              <a:rPr lang="en-US" b="0" i="0" dirty="0" err="1">
+                <a:effectLst/>
+                <a:latin typeface="Consolas" panose="020B0609020204030204" pitchFamily="49" charset="0"/>
+              </a:rPr>
+              <a:t>kernel_size</a:t>
+            </a:r>
+            <a:r>
+              <a:rPr lang="en-US" b="0" i="0" dirty="0">
+                <a:effectLst/>
+                <a:latin typeface="Consolas" panose="020B0609020204030204" pitchFamily="49" charset="0"/>
+              </a:rPr>
+              <a:t>=(5, 5), stride=(1, 1))</a:t>
+            </a:r>
+          </a:p>
+          <a:p>
+            <a:endParaRPr lang="en-US" b="0" i="0" dirty="0">
+              <a:effectLst/>
+              <a:latin typeface="Consolas" panose="020B0609020204030204" pitchFamily="49" charset="0"/>
+            </a:endParaRPr>
+          </a:p>
+          <a:p>
+            <a:r>
+              <a:rPr lang="en-US" b="0" i="0" dirty="0">
+                <a:effectLst/>
+                <a:latin typeface="Consolas" panose="020B0609020204030204" pitchFamily="49" charset="0"/>
+              </a:rPr>
+              <a:t>(dropout): Dropout2d(p=0.5, </a:t>
+            </a:r>
+            <a:r>
+              <a:rPr lang="en-US" b="0" i="0" dirty="0" err="1">
+                <a:effectLst/>
+                <a:latin typeface="Consolas" panose="020B0609020204030204" pitchFamily="49" charset="0"/>
+              </a:rPr>
+              <a:t>inplace</a:t>
+            </a:r>
+            <a:r>
+              <a:rPr lang="en-US" b="0" i="0" dirty="0">
+                <a:effectLst/>
+                <a:latin typeface="Consolas" panose="020B0609020204030204" pitchFamily="49" charset="0"/>
+              </a:rPr>
+              <a:t>=False)</a:t>
+            </a:r>
+          </a:p>
+          <a:p>
+            <a:endParaRPr lang="en-US" b="0" i="0" dirty="0">
+              <a:effectLst/>
+              <a:latin typeface="Consolas" panose="020B0609020204030204" pitchFamily="49" charset="0"/>
+            </a:endParaRPr>
+          </a:p>
+          <a:p>
+            <a:r>
+              <a:rPr lang="en-US" b="0" i="0" dirty="0">
+                <a:effectLst/>
+                <a:latin typeface="Consolas" panose="020B0609020204030204" pitchFamily="49" charset="0"/>
+              </a:rPr>
+              <a:t>(fc1): Linear(</a:t>
+            </a:r>
+            <a:r>
+              <a:rPr lang="en-US" b="0" i="0" dirty="0" err="1">
+                <a:effectLst/>
+                <a:latin typeface="Consolas" panose="020B0609020204030204" pitchFamily="49" charset="0"/>
+              </a:rPr>
+              <a:t>in_features</a:t>
+            </a:r>
+            <a:r>
+              <a:rPr lang="en-US" b="0" i="0" dirty="0">
+                <a:effectLst/>
+                <a:latin typeface="Consolas" panose="020B0609020204030204" pitchFamily="49" charset="0"/>
+              </a:rPr>
+              <a:t>=184512, </a:t>
+            </a:r>
+            <a:r>
+              <a:rPr lang="en-US" b="0" i="0" dirty="0" err="1">
+                <a:effectLst/>
+                <a:latin typeface="Consolas" panose="020B0609020204030204" pitchFamily="49" charset="0"/>
+              </a:rPr>
+              <a:t>out_features</a:t>
+            </a:r>
+            <a:r>
+              <a:rPr lang="en-US" b="0" i="0" dirty="0">
+                <a:effectLst/>
+                <a:latin typeface="Consolas" panose="020B0609020204030204" pitchFamily="49" charset="0"/>
+              </a:rPr>
+              <a:t>=512, bias=True)</a:t>
+            </a:r>
+          </a:p>
+          <a:p>
+            <a:endParaRPr lang="en-US" b="0" i="0" dirty="0">
+              <a:effectLst/>
+              <a:latin typeface="Consolas" panose="020B0609020204030204" pitchFamily="49" charset="0"/>
+            </a:endParaRPr>
+          </a:p>
+          <a:p>
+            <a:r>
+              <a:rPr lang="en-US" b="0" i="0" dirty="0">
+                <a:effectLst/>
+                <a:latin typeface="Consolas" panose="020B0609020204030204" pitchFamily="49" charset="0"/>
+              </a:rPr>
+              <a:t>(fc2): Linear(</a:t>
+            </a:r>
+            <a:r>
+              <a:rPr lang="en-US" b="0" i="0" dirty="0" err="1">
+                <a:effectLst/>
+                <a:latin typeface="Consolas" panose="020B0609020204030204" pitchFamily="49" charset="0"/>
+              </a:rPr>
+              <a:t>in_features</a:t>
+            </a:r>
+            <a:r>
+              <a:rPr lang="en-US" b="0" i="0" dirty="0">
+                <a:effectLst/>
+                <a:latin typeface="Consolas" panose="020B0609020204030204" pitchFamily="49" charset="0"/>
+              </a:rPr>
+              <a:t>=512, </a:t>
+            </a:r>
+            <a:r>
+              <a:rPr lang="en-US" b="0" i="0" dirty="0" err="1">
+                <a:effectLst/>
+                <a:latin typeface="Consolas" panose="020B0609020204030204" pitchFamily="49" charset="0"/>
+              </a:rPr>
+              <a:t>out_features</a:t>
+            </a:r>
+            <a:r>
+              <a:rPr lang="en-US" b="0" i="0" dirty="0">
+                <a:effectLst/>
+                <a:latin typeface="Consolas" panose="020B0609020204030204" pitchFamily="49" charset="0"/>
+              </a:rPr>
+              <a:t>=2, bias=True) </a:t>
+            </a:r>
+          </a:p>
+          <a:p>
+            <a:endParaRPr lang="en-US" b="0" i="0" dirty="0">
+              <a:effectLst/>
+              <a:latin typeface="Consolas" panose="020B0609020204030204" pitchFamily="49" charset="0"/>
+            </a:endParaRPr>
+          </a:p>
+          <a:p>
+            <a:r>
+              <a:rPr lang="en-US" b="0" i="0" dirty="0">
+                <a:effectLst/>
+                <a:latin typeface="Consolas" panose="020B0609020204030204" pitchFamily="49" charset="0"/>
+              </a:rPr>
+              <a:t>(</a:t>
+            </a:r>
+            <a:r>
+              <a:rPr lang="en-US" b="0" i="0" dirty="0" err="1">
+                <a:effectLst/>
+                <a:latin typeface="Consolas" panose="020B0609020204030204" pitchFamily="49" charset="0"/>
+              </a:rPr>
+              <a:t>qnn</a:t>
+            </a:r>
+            <a:r>
+              <a:rPr lang="en-US" b="0" i="0" dirty="0">
+                <a:effectLst/>
+                <a:latin typeface="Consolas" panose="020B0609020204030204" pitchFamily="49" charset="0"/>
+              </a:rPr>
+              <a:t>): </a:t>
+            </a:r>
+            <a:r>
+              <a:rPr lang="en-US" b="0" i="0" dirty="0" err="1">
+                <a:effectLst/>
+                <a:latin typeface="Consolas" panose="020B0609020204030204" pitchFamily="49" charset="0"/>
+              </a:rPr>
+              <a:t>TorchConnector</a:t>
+            </a:r>
+            <a:r>
+              <a:rPr lang="en-US" b="0" i="0" dirty="0">
+                <a:effectLst/>
+                <a:latin typeface="Consolas" panose="020B0609020204030204" pitchFamily="49" charset="0"/>
+              </a:rPr>
+              <a:t>()</a:t>
+            </a:r>
+          </a:p>
+          <a:p>
+            <a:endParaRPr lang="en-US" dirty="0">
+              <a:latin typeface="Consolas" panose="020B0609020204030204" pitchFamily="49" charset="0"/>
+            </a:endParaRPr>
+          </a:p>
+          <a:p>
+            <a:r>
+              <a:rPr lang="en-US" b="0" i="0" dirty="0">
+                <a:effectLst/>
+                <a:latin typeface="Consolas" panose="020B0609020204030204" pitchFamily="49" charset="0"/>
+              </a:rPr>
+              <a:t>(fc3): Linear(</a:t>
+            </a:r>
+            <a:r>
+              <a:rPr lang="en-US" b="0" i="0" dirty="0" err="1">
+                <a:effectLst/>
+                <a:latin typeface="Consolas" panose="020B0609020204030204" pitchFamily="49" charset="0"/>
+              </a:rPr>
+              <a:t>in_features</a:t>
+            </a:r>
+            <a:r>
+              <a:rPr lang="en-US" b="0" i="0" dirty="0">
+                <a:effectLst/>
+                <a:latin typeface="Consolas" panose="020B0609020204030204" pitchFamily="49" charset="0"/>
+              </a:rPr>
+              <a:t>=1, </a:t>
+            </a:r>
+            <a:r>
+              <a:rPr lang="en-US" b="0" i="0" dirty="0" err="1">
+                <a:effectLst/>
+                <a:latin typeface="Consolas" panose="020B0609020204030204" pitchFamily="49" charset="0"/>
+              </a:rPr>
+              <a:t>out_features</a:t>
+            </a:r>
+            <a:r>
+              <a:rPr lang="en-US" b="0" i="0" dirty="0">
+                <a:effectLst/>
+                <a:latin typeface="Consolas" panose="020B0609020204030204" pitchFamily="49" charset="0"/>
+              </a:rPr>
+              <a:t>=1, bias=True) </a:t>
+            </a:r>
+          </a:p>
+          <a:p>
+            <a:r>
+              <a:rPr lang="en-US" b="0" i="0" dirty="0">
+                <a:effectLst/>
+                <a:latin typeface="Consolas" panose="020B0609020204030204" pitchFamily="49" charset="0"/>
+              </a:rPr>
+              <a:t>)</a:t>
+            </a:r>
+          </a:p>
+        </p:txBody>
+      </p:sp>
+      <p:pic>
+        <p:nvPicPr>
+          <p:cNvPr id="4" name="Picture 3">
+            <a:extLst>
+              <a:ext uri="{FF2B5EF4-FFF2-40B4-BE49-F238E27FC236}">
+                <a16:creationId xmlns:a16="http://schemas.microsoft.com/office/drawing/2014/main" id="{5E142007-C441-D2E0-BA81-2F756D7E5EFF}"/>
+              </a:ext>
+            </a:extLst>
+          </p:cNvPr>
+          <p:cNvPicPr>
+            <a:picLocks noChangeAspect="1"/>
+          </p:cNvPicPr>
+          <p:nvPr/>
+        </p:nvPicPr>
+        <p:blipFill>
+          <a:blip r:embed="rId2"/>
+          <a:stretch>
+            <a:fillRect/>
+          </a:stretch>
+        </p:blipFill>
+        <p:spPr>
+          <a:xfrm>
+            <a:off x="1066996" y="770421"/>
+            <a:ext cx="3179694" cy="5211495"/>
+          </a:xfrm>
+          <a:prstGeom prst="rect">
+            <a:avLst/>
+          </a:prstGeom>
+        </p:spPr>
+      </p:pic>
+    </p:spTree>
+    <p:extLst>
+      <p:ext uri="{BB962C8B-B14F-4D97-AF65-F5344CB8AC3E}">
+        <p14:creationId xmlns:p14="http://schemas.microsoft.com/office/powerpoint/2010/main" val="2922047321"/>
+      </p:ext>
+    </p:extLst>
+  </p:cSld>
+  <p:clrMapOvr>
+    <a:masterClrMapping/>
+  </p:clrMapOvr>
+</p:sld>
+</file>
+
+<file path=ppt/slides/slide12.xml><?xml version="1.0" encoding="utf-8"?>
+<p:sld xmlns:a="http://schemas.openxmlformats.org/drawingml/2006/main" xmlns:r="http://schemas.openxmlformats.org/officeDocument/2006/relationships" xmlns:p="http://schemas.openxmlformats.org/presentationml/2006/main">
+  <p:cSld>
+    <p:spTree>
+      <p:nvGrpSpPr>
+        <p:cNvPr id="1" name=""/>
+        <p:cNvGrpSpPr/>
+        <p:nvPr/>
+      </p:nvGrpSpPr>
+      <p:grpSpPr>
+        <a:xfrm>
+          <a:off x="0" y="0"/>
+          <a:ext cx="0" cy="0"/>
+          <a:chOff x="0" y="0"/>
+          <a:chExt cx="0" cy="0"/>
+        </a:xfrm>
+      </p:grpSpPr>
+      <p:pic>
+        <p:nvPicPr>
+          <p:cNvPr id="4" name="Picture 3" descr="Chart, scatter chart&#10;&#10;Description automatically generated">
+            <a:extLst>
+              <a:ext uri="{FF2B5EF4-FFF2-40B4-BE49-F238E27FC236}">
+                <a16:creationId xmlns:a16="http://schemas.microsoft.com/office/drawing/2014/main" id="{228AFBCD-4B87-EA18-7D28-8B102269C8C6}"/>
+              </a:ext>
+            </a:extLst>
+          </p:cNvPr>
+          <p:cNvPicPr>
+            <a:picLocks noChangeAspect="1"/>
+          </p:cNvPicPr>
+          <p:nvPr/>
+        </p:nvPicPr>
+        <p:blipFill rotWithShape="1">
+          <a:blip r:embed="rId2"/>
+          <a:srcRect t="5973" b="19027"/>
+          <a:stretch/>
+        </p:blipFill>
+        <p:spPr>
+          <a:xfrm>
+            <a:off x="-22827" y="3413"/>
+            <a:ext cx="12191980" cy="6857989"/>
+          </a:xfrm>
+          <a:prstGeom prst="rect">
+            <a:avLst/>
+          </a:prstGeom>
+        </p:spPr>
+      </p:pic>
+      <p:sp>
+        <p:nvSpPr>
+          <p:cNvPr id="2" name="Title 1">
+            <a:extLst>
+              <a:ext uri="{FF2B5EF4-FFF2-40B4-BE49-F238E27FC236}">
+                <a16:creationId xmlns:a16="http://schemas.microsoft.com/office/drawing/2014/main" id="{EB6A064A-D868-272C-A067-DD7A50F22CEB}"/>
+              </a:ext>
+            </a:extLst>
+          </p:cNvPr>
+          <p:cNvSpPr>
+            <a:spLocks noGrp="1"/>
+          </p:cNvSpPr>
+          <p:nvPr>
+            <p:ph type="ctrTitle"/>
+          </p:nvPr>
+        </p:nvSpPr>
+        <p:spPr>
+          <a:xfrm>
+            <a:off x="-22827" y="0"/>
+            <a:ext cx="6643087" cy="676505"/>
+          </a:xfrm>
+        </p:spPr>
+        <p:txBody>
+          <a:bodyPr vert="horz" lIns="91440" tIns="45720" rIns="91440" bIns="45720" rtlCol="0" anchor="b">
+            <a:normAutofit/>
+          </a:bodyPr>
+          <a:lstStyle/>
+          <a:p>
+            <a:pPr>
+              <a:lnSpc>
+                <a:spcPct val="90000"/>
+              </a:lnSpc>
+            </a:pPr>
+            <a:r>
+              <a:rPr lang="es-AR" sz="4200" dirty="0"/>
+              <a:t>Resultados QCNN</a:t>
+            </a:r>
+            <a:endParaRPr lang="en-US" sz="4200" dirty="0"/>
+          </a:p>
+        </p:txBody>
+      </p:sp>
+      <p:sp>
+        <p:nvSpPr>
+          <p:cNvPr id="5" name="Subtitle 2">
+            <a:extLst>
+              <a:ext uri="{FF2B5EF4-FFF2-40B4-BE49-F238E27FC236}">
+                <a16:creationId xmlns:a16="http://schemas.microsoft.com/office/drawing/2014/main" id="{A2972125-BB9D-916B-D4EC-4930A34E0533}"/>
+              </a:ext>
+            </a:extLst>
+          </p:cNvPr>
+          <p:cNvSpPr txBox="1">
+            <a:spLocks/>
+          </p:cNvSpPr>
+          <p:nvPr/>
+        </p:nvSpPr>
+        <p:spPr>
+          <a:xfrm>
+            <a:off x="563152" y="6392341"/>
+            <a:ext cx="4323047" cy="325120"/>
+          </a:xfrm>
+          <a:prstGeom prst="rect">
+            <a:avLst/>
+          </a:prstGeom>
+        </p:spPr>
+        <p:txBody>
+          <a:bodyPr vert="horz" lIns="91440" tIns="45720" rIns="91440" bIns="45720" rtlCol="0">
+            <a:normAutofit/>
+          </a:bodyPr>
+          <a:lstStyle>
+            <a:lvl1pPr marL="0" indent="0" algn="l" defTabSz="914400" rtl="0" eaLnBrk="1" latinLnBrk="0" hangingPunct="1">
+              <a:lnSpc>
+                <a:spcPct val="110000"/>
+              </a:lnSpc>
+              <a:spcBef>
+                <a:spcPts val="1000"/>
+              </a:spcBef>
+              <a:buClr>
+                <a:schemeClr val="tx2">
+                  <a:lumMod val="50000"/>
+                  <a:lumOff val="50000"/>
+                </a:schemeClr>
+              </a:buClr>
+              <a:buSzPct val="75000"/>
+              <a:buFont typeface="Wingdings" panose="05000000000000000000" pitchFamily="2" charset="2"/>
+              <a:buNone/>
+              <a:defRPr sz="2400" kern="1200">
+                <a:solidFill>
+                  <a:schemeClr val="tx2"/>
+                </a:solidFill>
+                <a:latin typeface="+mn-lt"/>
+                <a:ea typeface="+mn-ea"/>
+                <a:cs typeface="+mn-cs"/>
+              </a:defRPr>
+            </a:lvl1pPr>
+            <a:lvl2pPr marL="457200" indent="0" algn="ctr" defTabSz="914400" rtl="0" eaLnBrk="1" latinLnBrk="0" hangingPunct="1">
+              <a:lnSpc>
+                <a:spcPct val="110000"/>
+              </a:lnSpc>
+              <a:spcBef>
+                <a:spcPts val="500"/>
+              </a:spcBef>
+              <a:buClr>
+                <a:schemeClr val="tx2">
+                  <a:lumMod val="50000"/>
+                  <a:lumOff val="50000"/>
+                </a:schemeClr>
+              </a:buClr>
+              <a:buSzPct val="75000"/>
+              <a:buFont typeface="Wingdings" panose="05000000000000000000" pitchFamily="2" charset="2"/>
+              <a:buNone/>
+              <a:defRPr sz="2000" kern="1200">
+                <a:solidFill>
+                  <a:schemeClr val="tx2"/>
+                </a:solidFill>
+                <a:latin typeface="+mn-lt"/>
+                <a:ea typeface="+mn-ea"/>
+                <a:cs typeface="+mn-cs"/>
+              </a:defRPr>
+            </a:lvl2pPr>
+            <a:lvl3pPr marL="914400" indent="0" algn="ctr" defTabSz="914400" rtl="0" eaLnBrk="1" latinLnBrk="0" hangingPunct="1">
+              <a:lnSpc>
+                <a:spcPct val="110000"/>
+              </a:lnSpc>
+              <a:spcBef>
+                <a:spcPts val="500"/>
+              </a:spcBef>
+              <a:buClr>
+                <a:schemeClr val="tx2">
+                  <a:lumMod val="50000"/>
+                  <a:lumOff val="50000"/>
+                </a:schemeClr>
+              </a:buClr>
+              <a:buSzPct val="75000"/>
+              <a:buFont typeface="Wingdings" panose="05000000000000000000" pitchFamily="2" charset="2"/>
+              <a:buNone/>
+              <a:defRPr sz="1800" kern="1200">
+                <a:solidFill>
+                  <a:schemeClr val="tx2"/>
+                </a:solidFill>
+                <a:latin typeface="+mn-lt"/>
+                <a:ea typeface="+mn-ea"/>
+                <a:cs typeface="+mn-cs"/>
+              </a:defRPr>
+            </a:lvl3pPr>
+            <a:lvl4pPr marL="1371600" indent="0" algn="ctr" defTabSz="914400" rtl="0" eaLnBrk="1" latinLnBrk="0" hangingPunct="1">
+              <a:lnSpc>
+                <a:spcPct val="110000"/>
+              </a:lnSpc>
+              <a:spcBef>
+                <a:spcPts val="500"/>
+              </a:spcBef>
+              <a:buClr>
+                <a:schemeClr val="tx2">
+                  <a:lumMod val="50000"/>
+                  <a:lumOff val="50000"/>
+                </a:schemeClr>
+              </a:buClr>
+              <a:buSzPct val="75000"/>
+              <a:buFont typeface="Wingdings" panose="05000000000000000000" pitchFamily="2" charset="2"/>
+              <a:buNone/>
+              <a:defRPr sz="1600" kern="1200">
+                <a:solidFill>
+                  <a:schemeClr val="tx2"/>
+                </a:solidFill>
+                <a:latin typeface="+mn-lt"/>
+                <a:ea typeface="+mn-ea"/>
+                <a:cs typeface="+mn-cs"/>
+              </a:defRPr>
+            </a:lvl4pPr>
+            <a:lvl5pPr marL="1828800" indent="0" algn="ctr" defTabSz="914400" rtl="0" eaLnBrk="1" latinLnBrk="0" hangingPunct="1">
+              <a:lnSpc>
+                <a:spcPct val="110000"/>
+              </a:lnSpc>
+              <a:spcBef>
+                <a:spcPts val="500"/>
+              </a:spcBef>
+              <a:buClr>
+                <a:schemeClr val="tx2">
+                  <a:lumMod val="50000"/>
+                  <a:lumOff val="50000"/>
+                </a:schemeClr>
+              </a:buClr>
+              <a:buSzPct val="75000"/>
+              <a:buFont typeface="Wingdings" panose="05000000000000000000" pitchFamily="2" charset="2"/>
+              <a:buNone/>
+              <a:defRPr sz="1600" kern="1200">
+                <a:solidFill>
+                  <a:schemeClr val="tx2"/>
+                </a:solidFill>
+                <a:latin typeface="+mn-lt"/>
+                <a:ea typeface="+mn-ea"/>
+                <a:cs typeface="+mn-cs"/>
+              </a:defRPr>
+            </a:lvl5pPr>
+            <a:lvl6pPr marL="2286000" indent="0" algn="ctr" defTabSz="914400" rtl="0" eaLnBrk="1" latinLnBrk="0" hangingPunct="1">
+              <a:lnSpc>
+                <a:spcPct val="90000"/>
+              </a:lnSpc>
+              <a:spcBef>
+                <a:spcPts val="500"/>
+              </a:spcBef>
+              <a:buFont typeface="Arial" panose="020B0604020202020204" pitchFamily="34" charset="0"/>
+              <a:buNone/>
+              <a:defRPr sz="1600" kern="1200">
+                <a:solidFill>
+                  <a:schemeClr val="tx1"/>
+                </a:solidFill>
+                <a:latin typeface="+mn-lt"/>
+                <a:ea typeface="+mn-ea"/>
+                <a:cs typeface="+mn-cs"/>
+              </a:defRPr>
+            </a:lvl6pPr>
+            <a:lvl7pPr marL="2743200" indent="0" algn="ctr" defTabSz="914400" rtl="0" eaLnBrk="1" latinLnBrk="0" hangingPunct="1">
+              <a:lnSpc>
+                <a:spcPct val="90000"/>
+              </a:lnSpc>
+              <a:spcBef>
+                <a:spcPts val="500"/>
+              </a:spcBef>
+              <a:buFont typeface="Arial" panose="020B0604020202020204" pitchFamily="34" charset="0"/>
+              <a:buNone/>
+              <a:defRPr sz="1600" kern="1200">
+                <a:solidFill>
+                  <a:schemeClr val="tx1"/>
+                </a:solidFill>
+                <a:latin typeface="+mn-lt"/>
+                <a:ea typeface="+mn-ea"/>
+                <a:cs typeface="+mn-cs"/>
+              </a:defRPr>
+            </a:lvl7pPr>
+            <a:lvl8pPr marL="3200400" indent="0" algn="ctr" defTabSz="914400" rtl="0" eaLnBrk="1" latinLnBrk="0" hangingPunct="1">
+              <a:lnSpc>
+                <a:spcPct val="90000"/>
+              </a:lnSpc>
+              <a:spcBef>
+                <a:spcPts val="500"/>
+              </a:spcBef>
+              <a:buFont typeface="Arial" panose="020B0604020202020204" pitchFamily="34" charset="0"/>
+              <a:buNone/>
+              <a:defRPr sz="1600" kern="1200">
+                <a:solidFill>
+                  <a:schemeClr val="tx1"/>
+                </a:solidFill>
+                <a:latin typeface="+mn-lt"/>
+                <a:ea typeface="+mn-ea"/>
+                <a:cs typeface="+mn-cs"/>
+              </a:defRPr>
+            </a:lvl8pPr>
+            <a:lvl9pPr marL="3657600" indent="0" algn="ctr" defTabSz="914400" rtl="0" eaLnBrk="1" latinLnBrk="0" hangingPunct="1">
+              <a:lnSpc>
+                <a:spcPct val="90000"/>
+              </a:lnSpc>
+              <a:spcBef>
+                <a:spcPts val="500"/>
+              </a:spcBef>
+              <a:buFont typeface="Arial" panose="020B0604020202020204" pitchFamily="34" charset="0"/>
+              <a:buNone/>
+              <a:defRPr sz="1600" kern="1200">
+                <a:solidFill>
+                  <a:schemeClr val="tx1"/>
+                </a:solidFill>
+                <a:latin typeface="+mn-lt"/>
+                <a:ea typeface="+mn-ea"/>
+                <a:cs typeface="+mn-cs"/>
+              </a:defRPr>
+            </a:lvl9pPr>
+          </a:lstStyle>
+          <a:p>
+            <a:pPr>
+              <a:lnSpc>
+                <a:spcPct val="100000"/>
+              </a:lnSpc>
+            </a:pPr>
+            <a:r>
+              <a:rPr lang="es-AR" sz="1500" dirty="0"/>
+              <a:t>Machine </a:t>
+            </a:r>
+            <a:r>
+              <a:rPr lang="es-AR" sz="1500" dirty="0" err="1"/>
+              <a:t>Learning</a:t>
+            </a:r>
+            <a:r>
+              <a:rPr lang="es-AR" sz="1500" dirty="0"/>
+              <a:t> &amp; Quantum Machine </a:t>
+            </a:r>
+            <a:r>
+              <a:rPr lang="es-AR" sz="1500" dirty="0" err="1"/>
+              <a:t>Learning</a:t>
+            </a:r>
+            <a:endParaRPr lang="en-US" sz="1500" dirty="0"/>
+          </a:p>
+        </p:txBody>
+      </p:sp>
+      <p:sp>
+        <p:nvSpPr>
+          <p:cNvPr id="8" name="TextBox 7">
+            <a:extLst>
+              <a:ext uri="{FF2B5EF4-FFF2-40B4-BE49-F238E27FC236}">
+                <a16:creationId xmlns:a16="http://schemas.microsoft.com/office/drawing/2014/main" id="{559363E2-45A2-F53A-3515-66D6F8AC1017}"/>
+              </a:ext>
+            </a:extLst>
+          </p:cNvPr>
+          <p:cNvSpPr txBox="1"/>
+          <p:nvPr/>
+        </p:nvSpPr>
+        <p:spPr>
+          <a:xfrm>
+            <a:off x="199916" y="720555"/>
+            <a:ext cx="6197600" cy="1200329"/>
+          </a:xfrm>
+          <a:prstGeom prst="rect">
+            <a:avLst/>
+          </a:prstGeom>
+          <a:noFill/>
+        </p:spPr>
+        <p:txBody>
+          <a:bodyPr wrap="square">
+            <a:spAutoFit/>
+          </a:bodyPr>
+          <a:lstStyle/>
+          <a:p>
+            <a:r>
+              <a:rPr lang="en-US" b="0" i="0" dirty="0">
+                <a:effectLst/>
+                <a:latin typeface="Consolas" panose="020B0609020204030204" pitchFamily="49" charset="0"/>
+              </a:rPr>
+              <a:t>Training set:</a:t>
+            </a:r>
+          </a:p>
+          <a:p>
+            <a:r>
+              <a:rPr lang="en-US" dirty="0">
+                <a:latin typeface="Consolas" panose="020B0609020204030204" pitchFamily="49" charset="0"/>
+              </a:rPr>
+              <a:t>3291 </a:t>
+            </a:r>
+            <a:r>
+              <a:rPr lang="en-US" dirty="0" err="1">
+                <a:latin typeface="Consolas" panose="020B0609020204030204" pitchFamily="49" charset="0"/>
+              </a:rPr>
+              <a:t>imágenes</a:t>
+            </a:r>
+            <a:r>
+              <a:rPr lang="en-US" dirty="0">
+                <a:latin typeface="Consolas" panose="020B0609020204030204" pitchFamily="49" charset="0"/>
+              </a:rPr>
+              <a:t>. Tensor de entrada [3, 260, 260]</a:t>
+            </a:r>
+            <a:r>
+              <a:rPr lang="en-US" b="0" i="0" dirty="0">
+                <a:effectLst/>
+                <a:latin typeface="Consolas" panose="020B0609020204030204" pitchFamily="49" charset="0"/>
+              </a:rPr>
+              <a:t> </a:t>
+            </a:r>
+          </a:p>
+          <a:p>
+            <a:r>
+              <a:rPr lang="en-US" b="0" i="0" dirty="0">
+                <a:effectLst/>
+                <a:latin typeface="Consolas" panose="020B0609020204030204" pitchFamily="49" charset="0"/>
+              </a:rPr>
+              <a:t>Test set: </a:t>
+            </a:r>
+          </a:p>
+          <a:p>
+            <a:r>
+              <a:rPr lang="en-US" dirty="0">
+                <a:latin typeface="Consolas" panose="020B0609020204030204" pitchFamily="49" charset="0"/>
+              </a:rPr>
+              <a:t>1772 </a:t>
+            </a:r>
+            <a:r>
+              <a:rPr lang="en-US" dirty="0" err="1">
+                <a:latin typeface="Consolas" panose="020B0609020204030204" pitchFamily="49" charset="0"/>
+              </a:rPr>
+              <a:t>imágenes</a:t>
+            </a:r>
+            <a:r>
+              <a:rPr lang="en-US" dirty="0">
+                <a:latin typeface="Consolas" panose="020B0609020204030204" pitchFamily="49" charset="0"/>
+              </a:rPr>
+              <a:t>. Tensor de entrada [3, 260, 260]</a:t>
+            </a:r>
+            <a:endParaRPr lang="en-US" dirty="0"/>
+          </a:p>
+        </p:txBody>
+      </p:sp>
+      <p:sp>
+        <p:nvSpPr>
+          <p:cNvPr id="10" name="TextBox 9">
+            <a:extLst>
+              <a:ext uri="{FF2B5EF4-FFF2-40B4-BE49-F238E27FC236}">
+                <a16:creationId xmlns:a16="http://schemas.microsoft.com/office/drawing/2014/main" id="{4B055D39-1EC5-B688-0285-8870F6F340AD}"/>
+              </a:ext>
+            </a:extLst>
+          </p:cNvPr>
+          <p:cNvSpPr txBox="1"/>
+          <p:nvPr/>
+        </p:nvSpPr>
+        <p:spPr>
+          <a:xfrm>
+            <a:off x="199916" y="4270869"/>
+            <a:ext cx="6197600" cy="646331"/>
+          </a:xfrm>
+          <a:prstGeom prst="rect">
+            <a:avLst/>
+          </a:prstGeom>
+          <a:noFill/>
+        </p:spPr>
+        <p:txBody>
+          <a:bodyPr wrap="square">
+            <a:spAutoFit/>
+          </a:bodyPr>
+          <a:lstStyle/>
+          <a:p>
+            <a:r>
+              <a:rPr lang="es-ES" b="0" i="0" dirty="0">
+                <a:effectLst/>
+                <a:latin typeface="Consolas" panose="020B0609020204030204" pitchFamily="49" charset="0"/>
+              </a:rPr>
+              <a:t>Precisión conjunto entrenamiento: </a:t>
+            </a:r>
+            <a:r>
+              <a:rPr lang="es-ES" dirty="0">
+                <a:latin typeface="Consolas" panose="020B0609020204030204" pitchFamily="49" charset="0"/>
+              </a:rPr>
+              <a:t>99.82</a:t>
+            </a:r>
+            <a:r>
+              <a:rPr lang="es-ES" b="0" i="0" dirty="0">
+                <a:effectLst/>
+                <a:latin typeface="Consolas" panose="020B0609020204030204" pitchFamily="49" charset="0"/>
+              </a:rPr>
+              <a:t>%</a:t>
+            </a:r>
+          </a:p>
+          <a:p>
+            <a:r>
+              <a:rPr lang="es-ES" b="0" i="0" dirty="0">
+                <a:effectLst/>
+                <a:latin typeface="Consolas" panose="020B0609020204030204" pitchFamily="49" charset="0"/>
+              </a:rPr>
+              <a:t>Precisión conjunto prueba: </a:t>
+            </a:r>
+            <a:r>
+              <a:rPr lang="es-ES" dirty="0">
+                <a:latin typeface="Consolas" panose="020B0609020204030204" pitchFamily="49" charset="0"/>
+              </a:rPr>
+              <a:t>98.8</a:t>
+            </a:r>
+            <a:r>
+              <a:rPr lang="es-ES" b="0" i="0" dirty="0">
+                <a:effectLst/>
+                <a:latin typeface="Consolas" panose="020B0609020204030204" pitchFamily="49" charset="0"/>
+              </a:rPr>
+              <a:t>%</a:t>
+            </a:r>
+          </a:p>
+        </p:txBody>
+      </p:sp>
+      <p:sp>
+        <p:nvSpPr>
+          <p:cNvPr id="3" name="TextBox 2">
+            <a:extLst>
+              <a:ext uri="{FF2B5EF4-FFF2-40B4-BE49-F238E27FC236}">
+                <a16:creationId xmlns:a16="http://schemas.microsoft.com/office/drawing/2014/main" id="{A6E6325C-D4E9-2412-641B-732F153ECEE6}"/>
+              </a:ext>
+            </a:extLst>
+          </p:cNvPr>
+          <p:cNvSpPr txBox="1"/>
+          <p:nvPr/>
+        </p:nvSpPr>
+        <p:spPr>
+          <a:xfrm>
+            <a:off x="199916" y="2205006"/>
+            <a:ext cx="6197600" cy="369332"/>
+          </a:xfrm>
+          <a:prstGeom prst="rect">
+            <a:avLst/>
+          </a:prstGeom>
+          <a:noFill/>
+        </p:spPr>
+        <p:txBody>
+          <a:bodyPr wrap="square">
+            <a:spAutoFit/>
+          </a:bodyPr>
+          <a:lstStyle/>
+          <a:p>
+            <a:r>
+              <a:rPr lang="es-ES" b="0" i="0" dirty="0" err="1">
+                <a:effectLst/>
+                <a:latin typeface="Consolas" panose="020B0609020204030204" pitchFamily="49" charset="0"/>
+              </a:rPr>
+              <a:t>Predicted</a:t>
+            </a:r>
+            <a:r>
+              <a:rPr lang="es-ES" b="0" i="0" dirty="0">
+                <a:effectLst/>
+                <a:latin typeface="Consolas" panose="020B0609020204030204" pitchFamily="49" charset="0"/>
+              </a:rPr>
+              <a:t> Output</a:t>
+            </a:r>
+            <a:r>
+              <a:rPr lang="en-US" b="0" i="0" dirty="0">
+                <a:effectLst/>
+                <a:latin typeface="Consolas" panose="020B0609020204030204" pitchFamily="49" charset="0"/>
+              </a:rPr>
+              <a:t>:</a:t>
+            </a:r>
+            <a:endParaRPr lang="en-US" dirty="0"/>
+          </a:p>
+        </p:txBody>
+      </p:sp>
+      <p:pic>
+        <p:nvPicPr>
+          <p:cNvPr id="6" name="Picture 5">
+            <a:extLst>
+              <a:ext uri="{FF2B5EF4-FFF2-40B4-BE49-F238E27FC236}">
+                <a16:creationId xmlns:a16="http://schemas.microsoft.com/office/drawing/2014/main" id="{AC3A6F07-D578-F41F-749F-71A59D53F90F}"/>
+              </a:ext>
+            </a:extLst>
+          </p:cNvPr>
+          <p:cNvPicPr>
+            <a:picLocks noChangeAspect="1"/>
+          </p:cNvPicPr>
+          <p:nvPr/>
+        </p:nvPicPr>
+        <p:blipFill>
+          <a:blip r:embed="rId3"/>
+          <a:stretch>
+            <a:fillRect/>
+          </a:stretch>
+        </p:blipFill>
+        <p:spPr>
+          <a:xfrm>
+            <a:off x="199916" y="2642865"/>
+            <a:ext cx="5476875" cy="1076325"/>
+          </a:xfrm>
+          <a:prstGeom prst="rect">
+            <a:avLst/>
+          </a:prstGeom>
+        </p:spPr>
+      </p:pic>
+    </p:spTree>
+    <p:extLst>
+      <p:ext uri="{BB962C8B-B14F-4D97-AF65-F5344CB8AC3E}">
+        <p14:creationId xmlns:p14="http://schemas.microsoft.com/office/powerpoint/2010/main" val="582208953"/>
+      </p:ext>
+    </p:extLst>
+  </p:cSld>
+  <p:clrMapOvr>
+    <a:masterClrMapping/>
+  </p:clrMapOvr>
+</p:sld>
+</file>
+
+<file path=ppt/slides/slide13.xml><?xml version="1.0" encoding="utf-8"?>
+<p:sld xmlns:a="http://schemas.openxmlformats.org/drawingml/2006/main" xmlns:r="http://schemas.openxmlformats.org/officeDocument/2006/relationships" xmlns:p="http://schemas.openxmlformats.org/presentationml/2006/main">
+  <p:cSld>
+    <p:spTree>
+      <p:nvGrpSpPr>
+        <p:cNvPr id="1" name=""/>
+        <p:cNvGrpSpPr/>
+        <p:nvPr/>
+      </p:nvGrpSpPr>
+      <p:grpSpPr>
+        <a:xfrm>
+          <a:off x="0" y="0"/>
+          <a:ext cx="0" cy="0"/>
+          <a:chOff x="0" y="0"/>
+          <a:chExt cx="0" cy="0"/>
+        </a:xfrm>
+      </p:grpSpPr>
+      <p:pic>
+        <p:nvPicPr>
+          <p:cNvPr id="4" name="Picture 3" descr="Chart, scatter chart&#10;&#10;Description automatically generated">
+            <a:extLst>
+              <a:ext uri="{FF2B5EF4-FFF2-40B4-BE49-F238E27FC236}">
+                <a16:creationId xmlns:a16="http://schemas.microsoft.com/office/drawing/2014/main" id="{228AFBCD-4B87-EA18-7D28-8B102269C8C6}"/>
+              </a:ext>
+            </a:extLst>
+          </p:cNvPr>
+          <p:cNvPicPr>
+            <a:picLocks noChangeAspect="1"/>
+          </p:cNvPicPr>
+          <p:nvPr/>
+        </p:nvPicPr>
+        <p:blipFill rotWithShape="1">
+          <a:blip r:embed="rId2"/>
+          <a:srcRect t="5973" b="19027"/>
+          <a:stretch/>
+        </p:blipFill>
+        <p:spPr>
+          <a:xfrm>
+            <a:off x="-22827" y="3413"/>
+            <a:ext cx="12191980" cy="6857989"/>
+          </a:xfrm>
+          <a:prstGeom prst="rect">
+            <a:avLst/>
+          </a:prstGeom>
+        </p:spPr>
+      </p:pic>
+      <p:sp>
+        <p:nvSpPr>
+          <p:cNvPr id="2" name="Title 1">
+            <a:extLst>
+              <a:ext uri="{FF2B5EF4-FFF2-40B4-BE49-F238E27FC236}">
+                <a16:creationId xmlns:a16="http://schemas.microsoft.com/office/drawing/2014/main" id="{EB6A064A-D868-272C-A067-DD7A50F22CEB}"/>
+              </a:ext>
+            </a:extLst>
+          </p:cNvPr>
+          <p:cNvSpPr>
+            <a:spLocks noGrp="1"/>
+          </p:cNvSpPr>
+          <p:nvPr>
+            <p:ph type="ctrTitle"/>
+          </p:nvPr>
+        </p:nvSpPr>
+        <p:spPr>
+          <a:xfrm>
             <a:off x="-22827" y="0"/>
             <a:ext cx="6643087" cy="676505"/>
           </a:xfrm>
@@ -16629,10 +18528,10 @@
       </p:sp>
       <p:pic>
         <p:nvPicPr>
-          <p:cNvPr id="12" name="Picture 11">
+          <p:cNvPr id="5" name="Picture 4">
             <a:extLst>
               <a:ext uri="{FF2B5EF4-FFF2-40B4-BE49-F238E27FC236}">
-                <a16:creationId xmlns:a16="http://schemas.microsoft.com/office/drawing/2014/main" id="{E3DBC794-0BBA-CFFC-7F20-477B10E709C5}"/>
+                <a16:creationId xmlns:a16="http://schemas.microsoft.com/office/drawing/2014/main" id="{FE73D9AF-04E8-02FC-1E8F-C57B577C2223}"/>
               </a:ext>
             </a:extLst>
           </p:cNvPr>
@@ -16649,8 +18548,8 @@
         </p:blipFill>
         <p:spPr>
           <a:xfrm>
-            <a:off x="22847" y="702259"/>
-            <a:ext cx="4365862" cy="2855787"/>
+            <a:off x="741141" y="737281"/>
+            <a:ext cx="4048125" cy="2647950"/>
           </a:xfrm>
           <a:prstGeom prst="rect">
             <a:avLst/>
@@ -16659,10 +18558,10 @@
       </p:pic>
       <p:pic>
         <p:nvPicPr>
-          <p:cNvPr id="7" name="Picture 6">
+          <p:cNvPr id="6" name="Picture 5">
             <a:extLst>
               <a:ext uri="{FF2B5EF4-FFF2-40B4-BE49-F238E27FC236}">
-                <a16:creationId xmlns:a16="http://schemas.microsoft.com/office/drawing/2014/main" id="{E339B1F5-2C3F-8E03-1E8F-EF6091359270}"/>
+                <a16:creationId xmlns:a16="http://schemas.microsoft.com/office/drawing/2014/main" id="{3A452A87-9617-72AD-EA8B-8FED835B7669}"/>
               </a:ext>
             </a:extLst>
           </p:cNvPr>
@@ -16679,8 +18578,8 @@
         </p:blipFill>
         <p:spPr>
           <a:xfrm>
-            <a:off x="392717" y="3667248"/>
-            <a:ext cx="3722830" cy="2614964"/>
+            <a:off x="880309" y="3554772"/>
+            <a:ext cx="3769791" cy="2647950"/>
           </a:xfrm>
           <a:prstGeom prst="rect">
             <a:avLst/>
@@ -16700,7 +18599,7 @@
 </p:sld>
 </file>
 
-<file path=ppt/slides/slide11.xml><?xml version="1.0" encoding="utf-8"?>
+<file path=ppt/slides/slide14.xml><?xml version="1.0" encoding="utf-8"?>
 <p:sld xmlns:a="http://schemas.openxmlformats.org/drawingml/2006/main" xmlns:r="http://schemas.openxmlformats.org/officeDocument/2006/relationships" xmlns:p="http://schemas.openxmlformats.org/presentationml/2006/main">
   <p:cSld>
     <p:spTree>
@@ -17139,45 +19038,11 @@
               </a:rPr>
               <a:t>imágen</a:t>
             </a:r>
-            <a:endParaRPr lang="es-ES" b="0" dirty="0">
-              <a:effectLst/>
-              <a:latin typeface="Consolas" panose="020B0609020204030204" pitchFamily="49" charset="0"/>
-            </a:endParaRPr>
-          </a:p>
-          <a:p>
-            <a:endParaRPr lang="es-ES" b="0" dirty="0">
-              <a:effectLst/>
-              <a:latin typeface="Consolas" panose="020B0609020204030204" pitchFamily="49" charset="0"/>
-            </a:endParaRPr>
-          </a:p>
-          <a:p>
-            <a:pPr marL="285750" indent="-285750">
-              <a:buFontTx/>
-              <a:buChar char="-"/>
-            </a:pPr>
-            <a:r>
-              <a:rPr lang="es-ES" dirty="0">
-                <a:latin typeface="Consolas" panose="020B0609020204030204" pitchFamily="49" charset="0"/>
-              </a:rPr>
-              <a:t>No hay entrelazamiento </a:t>
-            </a:r>
-            <a:r>
-              <a:rPr lang="es-ES" dirty="0" err="1">
-                <a:latin typeface="Consolas" panose="020B0609020204030204" pitchFamily="49" charset="0"/>
-              </a:rPr>
-              <a:t>cu</a:t>
-            </a:r>
-            <a:r>
-              <a:rPr lang="es-AR" dirty="0" err="1">
-                <a:latin typeface="Consolas" panose="020B0609020204030204" pitchFamily="49" charset="0"/>
-              </a:rPr>
-              <a:t>ántico</a:t>
-            </a:r>
             <a:r>
               <a:rPr lang="es-AR" dirty="0">
                 <a:latin typeface="Consolas" panose="020B0609020204030204" pitchFamily="49" charset="0"/>
               </a:rPr>
-              <a:t> en el circuito. </a:t>
+              <a:t> </a:t>
             </a:r>
           </a:p>
           <a:p>
@@ -17199,6 +19064,34 @@
                 <a:latin typeface="Consolas" panose="020B0609020204030204" pitchFamily="49" charset="0"/>
               </a:rPr>
               <a:t>Se podría mejorar el circuito con más capas.</a:t>
+            </a:r>
+          </a:p>
+          <a:p>
+            <a:pPr marL="285750" indent="-285750">
+              <a:buFontTx/>
+              <a:buChar char="-"/>
+            </a:pPr>
+            <a:endParaRPr lang="es-AR" b="0" dirty="0">
+              <a:effectLst/>
+              <a:latin typeface="Consolas" panose="020B0609020204030204" pitchFamily="49" charset="0"/>
+            </a:endParaRPr>
+          </a:p>
+          <a:p>
+            <a:pPr marL="285750" indent="-285750">
+              <a:buFontTx/>
+              <a:buChar char="-"/>
+            </a:pPr>
+            <a:r>
+              <a:rPr lang="es-AR" dirty="0">
+                <a:latin typeface="Consolas" panose="020B0609020204030204" pitchFamily="49" charset="0"/>
+              </a:rPr>
+              <a:t>El fin del modelo </a:t>
+            </a:r>
+            <a:r>
+              <a:rPr lang="es-AR">
+                <a:latin typeface="Consolas" panose="020B0609020204030204" pitchFamily="49" charset="0"/>
+              </a:rPr>
+              <a:t>es educativo</a:t>
             </a:r>
             <a:endParaRPr lang="es-ES" b="0" dirty="0">
               <a:effectLst/>
@@ -17220,7 +19113,7 @@
 </p:sld>
 </file>
 
-<file path=ppt/slides/slide12.xml><?xml version="1.0" encoding="utf-8"?>
+<file path=ppt/slides/slide15.xml><?xml version="1.0" encoding="utf-8"?>
 <p:sld xmlns:a="http://schemas.openxmlformats.org/drawingml/2006/main" xmlns:r="http://schemas.openxmlformats.org/officeDocument/2006/relationships" xmlns:p="http://schemas.openxmlformats.org/presentationml/2006/main">
   <p:cSld>
     <p:spTree>
@@ -17341,7 +19234,7 @@
         <p:spPr>
           <a:xfrm>
             <a:off x="199915" y="982323"/>
-            <a:ext cx="8635859" cy="3477875"/>
+            <a:ext cx="8635859" cy="5447645"/>
           </a:xfrm>
           <a:prstGeom prst="rect">
             <a:avLst/>
@@ -17444,6 +19337,88 @@
               <a:buFontTx/>
               <a:buAutoNum type="arabicPeriod"/>
             </a:pPr>
+            <a:endParaRPr lang="en-US" sz="1600" dirty="0">
+              <a:latin typeface="Consolas" panose="020B0609020204030204" pitchFamily="49" charset="0"/>
+            </a:endParaRPr>
+          </a:p>
+          <a:p>
+            <a:pPr marL="228600" indent="-228600">
+              <a:buFontTx/>
+              <a:buAutoNum type="arabicPeriod"/>
+            </a:pPr>
+            <a:r>
+              <a:rPr lang="en-US" sz="1600" b="0" dirty="0">
+                <a:solidFill>
+                  <a:schemeClr val="tx1">
+                    <a:lumMod val="95000"/>
+                    <a:lumOff val="5000"/>
+                  </a:schemeClr>
+                </a:solidFill>
+                <a:effectLst/>
+                <a:latin typeface="Consolas" panose="020B0609020204030204" pitchFamily="49" charset="0"/>
+              </a:rPr>
+              <a:t>The Quantum Convolution Neural Network: </a:t>
+            </a:r>
+            <a:r>
+              <a:rPr lang="en-US" sz="1600" b="0" dirty="0">
+                <a:solidFill>
+                  <a:schemeClr val="tx1">
+                    <a:lumMod val="95000"/>
+                    <a:lumOff val="5000"/>
+                  </a:schemeClr>
+                </a:solidFill>
+                <a:effectLst/>
+                <a:latin typeface="Consolas" panose="020B0609020204030204" pitchFamily="49" charset="0"/>
+                <a:hlinkClick r:id="rId5"/>
+              </a:rPr>
+              <a:t>https://qiskit.org/documentation/machine-learning/tutorials/11_quantum_convolutional_neural_networks.html</a:t>
+            </a:r>
+            <a:endParaRPr lang="en-US" sz="1600" b="0" dirty="0">
+              <a:solidFill>
+                <a:schemeClr val="tx1">
+                  <a:lumMod val="95000"/>
+                  <a:lumOff val="5000"/>
+                </a:schemeClr>
+              </a:solidFill>
+              <a:effectLst/>
+              <a:latin typeface="Consolas" panose="020B0609020204030204" pitchFamily="49" charset="0"/>
+            </a:endParaRPr>
+          </a:p>
+          <a:p>
+            <a:pPr marL="228600" indent="-228600">
+              <a:buFontTx/>
+              <a:buAutoNum type="arabicPeriod"/>
+            </a:pPr>
+            <a:endParaRPr lang="en-US" sz="1600" dirty="0">
+              <a:solidFill>
+                <a:schemeClr val="tx1">
+                  <a:lumMod val="95000"/>
+                  <a:lumOff val="5000"/>
+                </a:schemeClr>
+              </a:solidFill>
+              <a:latin typeface="Consolas" panose="020B0609020204030204" pitchFamily="49" charset="0"/>
+            </a:endParaRPr>
+          </a:p>
+          <a:p>
+            <a:pPr marL="228600" indent="-228600">
+              <a:buFontTx/>
+              <a:buAutoNum type="arabicPeriod"/>
+            </a:pPr>
+            <a:r>
+              <a:rPr lang="en-US" sz="1600" b="0" dirty="0">
+                <a:effectLst/>
+                <a:latin typeface="Consolas" panose="020B0609020204030204" pitchFamily="49" charset="0"/>
+              </a:rPr>
+              <a:t>Esophagus Cancer Classifier : </a:t>
+            </a:r>
+            <a:r>
+              <a:rPr lang="en-US" sz="1600" b="0" dirty="0">
+                <a:effectLst/>
+                <a:latin typeface="Consolas" panose="020B0609020204030204" pitchFamily="49" charset="0"/>
+                <a:hlinkClick r:id="rId6"/>
+              </a:rPr>
+              <a:t>https://github.com/AnIsAsPe/ClassificadorCancerEsofago</a:t>
+            </a:r>
             <a:endParaRPr lang="en-US" sz="1600" b="0" dirty="0">
               <a:effectLst/>
               <a:latin typeface="Consolas" panose="020B0609020204030204" pitchFamily="49" charset="0"/>
@@ -17454,41 +19429,111 @@
               <a:buFontTx/>
               <a:buAutoNum type="arabicPeriod"/>
             </a:pPr>
-            <a:r>
-              <a:rPr lang="en-US" sz="1600" b="0" dirty="0">
-                <a:effectLst/>
-                <a:latin typeface="Consolas" panose="020B0609020204030204" pitchFamily="49" charset="0"/>
-              </a:rPr>
-              <a:t>Esophagus Cancer Classifier : </a:t>
-            </a:r>
-            <a:r>
-              <a:rPr lang="en-US" sz="1600" b="0" dirty="0">
-                <a:effectLst/>
-                <a:latin typeface="Consolas" panose="020B0609020204030204" pitchFamily="49" charset="0"/>
-                <a:hlinkClick r:id="rId5"/>
-              </a:rPr>
-              <a:t>https://github.com/AnIsAsPe/ClassificadorCancerEsofago</a:t>
-            </a:r>
-            <a:endParaRPr lang="en-US" sz="1600" b="0" dirty="0">
-              <a:effectLst/>
+            <a:endParaRPr lang="en-US" sz="1600" dirty="0">
+              <a:solidFill>
+                <a:schemeClr val="tx1">
+                  <a:lumMod val="95000"/>
+                  <a:lumOff val="5000"/>
+                </a:schemeClr>
+              </a:solidFill>
               <a:latin typeface="Consolas" panose="020B0609020204030204" pitchFamily="49" charset="0"/>
             </a:endParaRPr>
           </a:p>
           <a:p>
-            <a:endParaRPr lang="en-US" sz="1600" dirty="0">
-              <a:latin typeface="Consolas" panose="020B0609020204030204" pitchFamily="49" charset="0"/>
-            </a:endParaRPr>
-          </a:p>
-          <a:p>
+            <a:r>
+              <a:rPr lang="en-US" sz="1600" dirty="0">
+                <a:solidFill>
+                  <a:schemeClr val="tx1">
+                    <a:lumMod val="95000"/>
+                    <a:lumOff val="5000"/>
+                  </a:schemeClr>
+                </a:solidFill>
+                <a:latin typeface="Consolas" panose="020B0609020204030204" pitchFamily="49" charset="0"/>
+              </a:rPr>
+              <a:t>5</a:t>
+            </a:r>
+            <a:r>
+              <a:rPr lang="en-US" sz="1600" dirty="0">
+                <a:solidFill>
+                  <a:srgbClr val="4B69C6"/>
+                </a:solidFill>
+                <a:latin typeface="Consolas" panose="020B0609020204030204" pitchFamily="49" charset="0"/>
+              </a:rPr>
+              <a:t>.</a:t>
+            </a:r>
             <a:r>
               <a:rPr lang="en-US" sz="1600" b="0" dirty="0">
+                <a:solidFill>
+                  <a:schemeClr val="tx1">
+                    <a:lumMod val="95000"/>
+                    <a:lumOff val="5000"/>
+                  </a:schemeClr>
+                </a:solidFill>
                 <a:effectLst/>
                 <a:latin typeface="Consolas" panose="020B0609020204030204" pitchFamily="49" charset="0"/>
               </a:rPr>
-              <a:t>4. Machine Learning for the Working Analyst - Colegio </a:t>
+              <a:t>Machine Learning &amp; IA for the Working Analyst - Colegio de </a:t>
             </a:r>
             <a:r>
               <a:rPr lang="en-US" sz="1600" b="0" dirty="0" err="1">
+                <a:solidFill>
+                  <a:schemeClr val="tx1">
+                    <a:lumMod val="95000"/>
+                    <a:lumOff val="5000"/>
+                  </a:schemeClr>
+                </a:solidFill>
+                <a:effectLst/>
+                <a:latin typeface="Consolas" panose="020B0609020204030204" pitchFamily="49" charset="0"/>
+              </a:rPr>
+              <a:t>Matem</a:t>
+            </a:r>
+            <a:r>
+              <a:rPr lang="es-AR" sz="1600" b="0" dirty="0">
+                <a:solidFill>
+                  <a:schemeClr val="tx1">
+                    <a:lumMod val="95000"/>
+                    <a:lumOff val="5000"/>
+                  </a:schemeClr>
+                </a:solidFill>
+                <a:effectLst/>
+                <a:latin typeface="Consolas" panose="020B0609020204030204" pitchFamily="49" charset="0"/>
+              </a:rPr>
+              <a:t>á</a:t>
+            </a:r>
+            <a:r>
+              <a:rPr lang="en-US" sz="1600" b="0" dirty="0" err="1">
+                <a:solidFill>
+                  <a:schemeClr val="tx1">
+                    <a:lumMod val="95000"/>
+                    <a:lumOff val="5000"/>
+                  </a:schemeClr>
+                </a:solidFill>
+                <a:effectLst/>
+                <a:latin typeface="Consolas" panose="020B0609020204030204" pitchFamily="49" charset="0"/>
+              </a:rPr>
+              <a:t>ticas</a:t>
+            </a:r>
+            <a:r>
+              <a:rPr lang="en-US" sz="1600" b="0" dirty="0">
+                <a:solidFill>
+                  <a:schemeClr val="tx1">
+                    <a:lumMod val="95000"/>
+                    <a:lumOff val="5000"/>
+                  </a:schemeClr>
+                </a:solidFill>
+                <a:effectLst/>
+                <a:latin typeface="Consolas" panose="020B0609020204030204" pitchFamily="49" charset="0"/>
+              </a:rPr>
+              <a:t> </a:t>
+            </a:r>
+            <a:r>
+              <a:rPr lang="en-US" sz="1600" b="0" dirty="0" err="1">
+                <a:solidFill>
+                  <a:schemeClr val="tx1">
+                    <a:lumMod val="95000"/>
+                    <a:lumOff val="5000"/>
+                  </a:schemeClr>
+                </a:solidFill>
                 <a:effectLst/>
                 <a:latin typeface="Consolas" panose="020B0609020204030204" pitchFamily="49" charset="0"/>
               </a:rPr>
@@ -17496,10 +19541,31 @@
             </a:r>
             <a:r>
               <a:rPr lang="en-US" sz="1600" b="0" dirty="0">
+                <a:solidFill>
+                  <a:schemeClr val="tx1">
+                    <a:lumMod val="95000"/>
+                    <a:lumOff val="5000"/>
+                  </a:schemeClr>
+                </a:solidFill>
                 <a:effectLst/>
                 <a:latin typeface="Consolas" panose="020B0609020204030204" pitchFamily="49" charset="0"/>
               </a:rPr>
-              <a:t>, Mexico</a:t>
+              <a:t> - Mexico</a:t>
+            </a:r>
+          </a:p>
+          <a:p>
+            <a:r>
+              <a:rPr lang="en-US" sz="1600" b="0" dirty="0">
+                <a:solidFill>
+                  <a:schemeClr val="tx1">
+                    <a:lumMod val="95000"/>
+                    <a:lumOff val="5000"/>
+                  </a:schemeClr>
+                </a:solidFill>
+                <a:effectLst/>
+                <a:latin typeface="Consolas" panose="020B0609020204030204" pitchFamily="49" charset="0"/>
+              </a:rPr>
+              <a:t>- https://www.colegio-bourbaki.com/</a:t>
             </a:r>
           </a:p>
           <a:p>
@@ -17509,33 +19575,125 @@
             </a:pPr>
             <a:r>
               <a:rPr lang="en-US" sz="1600" b="0" dirty="0">
+                <a:solidFill>
+                  <a:schemeClr val="tx1">
+                    <a:lumMod val="95000"/>
+                    <a:lumOff val="5000"/>
+                  </a:schemeClr>
+                </a:solidFill>
                 <a:effectLst/>
                 <a:latin typeface="Consolas" panose="020B0609020204030204" pitchFamily="49" charset="0"/>
-                <a:hlinkClick r:id="rId6"/>
               </a:rPr>
-              <a:t>https://www.colegio-bourbaki.com</a:t>
+              <a:t>LinkedIn: Colegio </a:t>
+            </a:r>
+            <a:r>
+              <a:rPr lang="en-US" sz="1600" b="0" dirty="0" err="1">
+                <a:solidFill>
+                  <a:schemeClr val="tx1">
+                    <a:lumMod val="95000"/>
+                    <a:lumOff val="5000"/>
+                  </a:schemeClr>
+                </a:solidFill>
+                <a:effectLst/>
+                <a:latin typeface="Consolas" panose="020B0609020204030204" pitchFamily="49" charset="0"/>
+              </a:rPr>
+              <a:t>Bourbaki</a:t>
             </a:r>
             <a:endParaRPr lang="en-US" sz="1600" b="0" dirty="0">
+              <a:solidFill>
+                <a:schemeClr val="tx1">
+                  <a:lumMod val="95000"/>
+                  <a:lumOff val="5000"/>
+                </a:schemeClr>
+              </a:solidFill>
               <a:effectLst/>
               <a:latin typeface="Consolas" panose="020B0609020204030204" pitchFamily="49" charset="0"/>
             </a:endParaRPr>
           </a:p>
           <a:p>
+            <a:endParaRPr lang="en-US" sz="1600" b="0" dirty="0">
+              <a:solidFill>
+                <a:schemeClr val="tx1">
+                  <a:lumMod val="95000"/>
+                  <a:lumOff val="5000"/>
+                </a:schemeClr>
+              </a:solidFill>
+              <a:effectLst/>
+              <a:latin typeface="Consolas" panose="020B0609020204030204" pitchFamily="49" charset="0"/>
+            </a:endParaRPr>
+          </a:p>
+          <a:p>
+            <a:r>
+              <a:rPr lang="en-US" sz="1600" dirty="0">
+                <a:solidFill>
+                  <a:schemeClr val="tx1">
+                    <a:lumMod val="95000"/>
+                    <a:lumOff val="5000"/>
+                  </a:schemeClr>
+                </a:solidFill>
+                <a:latin typeface="Consolas" panose="020B0609020204030204" pitchFamily="49" charset="0"/>
+              </a:rPr>
+              <a:t>6</a:t>
+            </a:r>
             <a:r>
               <a:rPr lang="en-US" sz="1600" b="0" dirty="0">
+                <a:solidFill>
+                  <a:schemeClr val="tx1">
+                    <a:lumMod val="95000"/>
+                    <a:lumOff val="5000"/>
+                  </a:schemeClr>
+                </a:solidFill>
                 <a:effectLst/>
                 <a:latin typeface="Consolas" panose="020B0609020204030204" pitchFamily="49" charset="0"/>
               </a:rPr>
-              <a:t>- LinkedIn: Colegio </a:t>
-            </a:r>
-            <a:r>
-              <a:rPr lang="en-US" sz="1600" b="0">
+              <a:t>. </a:t>
+            </a:r>
+            <a:r>
+              <a:rPr lang="en-US" sz="1600" b="0" dirty="0" err="1">
+                <a:solidFill>
+                  <a:schemeClr val="tx1">
+                    <a:lumMod val="95000"/>
+                    <a:lumOff val="5000"/>
+                  </a:schemeClr>
+                </a:solidFill>
                 <a:effectLst/>
                 <a:latin typeface="Consolas" panose="020B0609020204030204" pitchFamily="49" charset="0"/>
               </a:rPr>
-              <a:t>Bourbaki</a:t>
-            </a:r>
-            <a:endParaRPr lang="en-US" sz="1200" b="0" dirty="0">
+              <a:t>Qiskit</a:t>
+            </a:r>
+            <a:r>
+              <a:rPr lang="en-US" sz="1600" b="0" dirty="0">
+                <a:solidFill>
+                  <a:schemeClr val="tx1">
+                    <a:lumMod val="95000"/>
+                    <a:lumOff val="5000"/>
+                  </a:schemeClr>
+                </a:solidFill>
+                <a:effectLst/>
+                <a:latin typeface="Consolas" panose="020B0609020204030204" pitchFamily="49" charset="0"/>
+              </a:rPr>
+              <a:t> Slack Channel (qiskit.slack.com) - Special Thanks to Owen Lockwood &amp; Anton </a:t>
+            </a:r>
+            <a:r>
+              <a:rPr lang="en-US" sz="1600" b="0" dirty="0" err="1">
+                <a:solidFill>
+                  <a:schemeClr val="tx1">
+                    <a:lumMod val="95000"/>
+                    <a:lumOff val="5000"/>
+                  </a:schemeClr>
+                </a:solidFill>
+                <a:effectLst/>
+                <a:latin typeface="Consolas" panose="020B0609020204030204" pitchFamily="49" charset="0"/>
+              </a:rPr>
+              <a:t>Dekusar</a:t>
+            </a:r>
+            <a:endParaRPr lang="en-US" sz="1600" b="0" dirty="0">
+              <a:solidFill>
+                <a:schemeClr val="tx1">
+                  <a:lumMod val="95000"/>
+                  <a:lumOff val="5000"/>
+                </a:schemeClr>
+              </a:solidFill>
               <a:effectLst/>
               <a:latin typeface="Consolas" panose="020B0609020204030204" pitchFamily="49" charset="0"/>
             </a:endParaRPr>
@@ -23005,8 +25163,8 @@
         </p:nvSpPr>
         <p:spPr>
           <a:xfrm>
-            <a:off x="-22827" y="0"/>
-            <a:ext cx="6643087" cy="676505"/>
+            <a:off x="375920" y="90593"/>
+            <a:ext cx="8361680" cy="676505"/>
           </a:xfrm>
         </p:spPr>
         <p:txBody>
@@ -23022,7 +25180,7 @@
             </a:pPr>
             <a:r>
               <a:rPr lang="es-AR" sz="4200" dirty="0"/>
-              <a:t>Resultados QCNN</a:t>
+              <a:t>Circuito Nodo Cuántico</a:t>
             </a:r>
             <a:endParaRPr lang="en-US" sz="4200" dirty="0"/>
           </a:p>
@@ -23030,10 +25188,10 @@
       </p:sp>
       <p:sp>
         <p:nvSpPr>
-          <p:cNvPr id="5" name="Subtitle 2">
+          <p:cNvPr id="3" name="Subtitle 2">
             <a:extLst>
               <a:ext uri="{FF2B5EF4-FFF2-40B4-BE49-F238E27FC236}">
-                <a16:creationId xmlns:a16="http://schemas.microsoft.com/office/drawing/2014/main" id="{A2972125-BB9D-916B-D4EC-4930A34E0533}"/>
+                <a16:creationId xmlns:a16="http://schemas.microsoft.com/office/drawing/2014/main" id="{73CA6260-6C0F-D08C-E398-A7B28E978324}"/>
               </a:ext>
             </a:extLst>
           </p:cNvPr>
@@ -23044,8 +25202,315 @@
         </p:nvSpPr>
         <p:spPr>
           <a:xfrm>
-            <a:off x="563152" y="6392341"/>
-            <a:ext cx="4323047" cy="325120"/>
+            <a:off x="421673" y="6349415"/>
+            <a:ext cx="5633922" cy="658680"/>
+          </a:xfrm>
+          <a:prstGeom prst="rect">
+            <a:avLst/>
+          </a:prstGeom>
+        </p:spPr>
+        <p:txBody>
+          <a:bodyPr vert="horz" lIns="91440" tIns="45720" rIns="91440" bIns="45720" rtlCol="0">
+            <a:normAutofit fontScale="85000" lnSpcReduction="10000"/>
+          </a:bodyPr>
+          <a:lstStyle>
+            <a:lvl1pPr marL="0" indent="0" algn="l" defTabSz="914400" rtl="0" eaLnBrk="1" latinLnBrk="0" hangingPunct="1">
+              <a:lnSpc>
+                <a:spcPct val="110000"/>
+              </a:lnSpc>
+              <a:spcBef>
+                <a:spcPts val="1000"/>
+              </a:spcBef>
+              <a:buClr>
+                <a:schemeClr val="tx2">
+                  <a:lumMod val="50000"/>
+                  <a:lumOff val="50000"/>
+                </a:schemeClr>
+              </a:buClr>
+              <a:buSzPct val="75000"/>
+              <a:buFont typeface="Wingdings" panose="05000000000000000000" pitchFamily="2" charset="2"/>
+              <a:buNone/>
+              <a:defRPr sz="2400" kern="1200">
+                <a:solidFill>
+                  <a:schemeClr val="tx2"/>
+                </a:solidFill>
+                <a:latin typeface="+mn-lt"/>
+                <a:ea typeface="+mn-ea"/>
+                <a:cs typeface="+mn-cs"/>
+              </a:defRPr>
+            </a:lvl1pPr>
+            <a:lvl2pPr marL="457200" indent="0" algn="ctr" defTabSz="914400" rtl="0" eaLnBrk="1" latinLnBrk="0" hangingPunct="1">
+              <a:lnSpc>
+                <a:spcPct val="110000"/>
+              </a:lnSpc>
+              <a:spcBef>
+                <a:spcPts val="500"/>
+              </a:spcBef>
+              <a:buClr>
+                <a:schemeClr val="tx2">
+                  <a:lumMod val="50000"/>
+                  <a:lumOff val="50000"/>
+                </a:schemeClr>
+              </a:buClr>
+              <a:buSzPct val="75000"/>
+              <a:buFont typeface="Wingdings" panose="05000000000000000000" pitchFamily="2" charset="2"/>
+              <a:buNone/>
+              <a:defRPr sz="2000" kern="1200">
+                <a:solidFill>
+                  <a:schemeClr val="tx2"/>
+                </a:solidFill>
+                <a:latin typeface="+mn-lt"/>
+                <a:ea typeface="+mn-ea"/>
+                <a:cs typeface="+mn-cs"/>
+              </a:defRPr>
+            </a:lvl2pPr>
+            <a:lvl3pPr marL="914400" indent="0" algn="ctr" defTabSz="914400" rtl="0" eaLnBrk="1" latinLnBrk="0" hangingPunct="1">
+              <a:lnSpc>
+                <a:spcPct val="110000"/>
+              </a:lnSpc>
+              <a:spcBef>
+                <a:spcPts val="500"/>
+              </a:spcBef>
+              <a:buClr>
+                <a:schemeClr val="tx2">
+                  <a:lumMod val="50000"/>
+                  <a:lumOff val="50000"/>
+                </a:schemeClr>
+              </a:buClr>
+              <a:buSzPct val="75000"/>
+              <a:buFont typeface="Wingdings" panose="05000000000000000000" pitchFamily="2" charset="2"/>
+              <a:buNone/>
+              <a:defRPr sz="1800" kern="1200">
+                <a:solidFill>
+                  <a:schemeClr val="tx2"/>
+                </a:solidFill>
+                <a:latin typeface="+mn-lt"/>
+                <a:ea typeface="+mn-ea"/>
+                <a:cs typeface="+mn-cs"/>
+              </a:defRPr>
+            </a:lvl3pPr>
+            <a:lvl4pPr marL="1371600" indent="0" algn="ctr" defTabSz="914400" rtl="0" eaLnBrk="1" latinLnBrk="0" hangingPunct="1">
+              <a:lnSpc>
+                <a:spcPct val="110000"/>
+              </a:lnSpc>
+              <a:spcBef>
+                <a:spcPts val="500"/>
+              </a:spcBef>
+              <a:buClr>
+                <a:schemeClr val="tx2">
+                  <a:lumMod val="50000"/>
+                  <a:lumOff val="50000"/>
+                </a:schemeClr>
+              </a:buClr>
+              <a:buSzPct val="75000"/>
+              <a:buFont typeface="Wingdings" panose="05000000000000000000" pitchFamily="2" charset="2"/>
+              <a:buNone/>
+              <a:defRPr sz="1600" kern="1200">
+                <a:solidFill>
+                  <a:schemeClr val="tx2"/>
+                </a:solidFill>
+                <a:latin typeface="+mn-lt"/>
+                <a:ea typeface="+mn-ea"/>
+                <a:cs typeface="+mn-cs"/>
+              </a:defRPr>
+            </a:lvl4pPr>
+            <a:lvl5pPr marL="1828800" indent="0" algn="ctr" defTabSz="914400" rtl="0" eaLnBrk="1" latinLnBrk="0" hangingPunct="1">
+              <a:lnSpc>
+                <a:spcPct val="110000"/>
+              </a:lnSpc>
+              <a:spcBef>
+                <a:spcPts val="500"/>
+              </a:spcBef>
+              <a:buClr>
+                <a:schemeClr val="tx2">
+                  <a:lumMod val="50000"/>
+                  <a:lumOff val="50000"/>
+                </a:schemeClr>
+              </a:buClr>
+              <a:buSzPct val="75000"/>
+              <a:buFont typeface="Wingdings" panose="05000000000000000000" pitchFamily="2" charset="2"/>
+              <a:buNone/>
+              <a:defRPr sz="1600" kern="1200">
+                <a:solidFill>
+                  <a:schemeClr val="tx2"/>
+                </a:solidFill>
+                <a:latin typeface="+mn-lt"/>
+                <a:ea typeface="+mn-ea"/>
+                <a:cs typeface="+mn-cs"/>
+              </a:defRPr>
+            </a:lvl5pPr>
+            <a:lvl6pPr marL="2286000" indent="0" algn="ctr" defTabSz="914400" rtl="0" eaLnBrk="1" latinLnBrk="0" hangingPunct="1">
+              <a:lnSpc>
+                <a:spcPct val="90000"/>
+              </a:lnSpc>
+              <a:spcBef>
+                <a:spcPts val="500"/>
+              </a:spcBef>
+              <a:buFont typeface="Arial" panose="020B0604020202020204" pitchFamily="34" charset="0"/>
+              <a:buNone/>
+              <a:defRPr sz="1600" kern="1200">
+                <a:solidFill>
+                  <a:schemeClr val="tx1"/>
+                </a:solidFill>
+                <a:latin typeface="+mn-lt"/>
+                <a:ea typeface="+mn-ea"/>
+                <a:cs typeface="+mn-cs"/>
+              </a:defRPr>
+            </a:lvl6pPr>
+            <a:lvl7pPr marL="2743200" indent="0" algn="ctr" defTabSz="914400" rtl="0" eaLnBrk="1" latinLnBrk="0" hangingPunct="1">
+              <a:lnSpc>
+                <a:spcPct val="90000"/>
+              </a:lnSpc>
+              <a:spcBef>
+                <a:spcPts val="500"/>
+              </a:spcBef>
+              <a:buFont typeface="Arial" panose="020B0604020202020204" pitchFamily="34" charset="0"/>
+              <a:buNone/>
+              <a:defRPr sz="1600" kern="1200">
+                <a:solidFill>
+                  <a:schemeClr val="tx1"/>
+                </a:solidFill>
+                <a:latin typeface="+mn-lt"/>
+                <a:ea typeface="+mn-ea"/>
+                <a:cs typeface="+mn-cs"/>
+              </a:defRPr>
+            </a:lvl7pPr>
+            <a:lvl8pPr marL="3200400" indent="0" algn="ctr" defTabSz="914400" rtl="0" eaLnBrk="1" latinLnBrk="0" hangingPunct="1">
+              <a:lnSpc>
+                <a:spcPct val="90000"/>
+              </a:lnSpc>
+              <a:spcBef>
+                <a:spcPts val="500"/>
+              </a:spcBef>
+              <a:buFont typeface="Arial" panose="020B0604020202020204" pitchFamily="34" charset="0"/>
+              <a:buNone/>
+              <a:defRPr sz="1600" kern="1200">
+                <a:solidFill>
+                  <a:schemeClr val="tx1"/>
+                </a:solidFill>
+                <a:latin typeface="+mn-lt"/>
+                <a:ea typeface="+mn-ea"/>
+                <a:cs typeface="+mn-cs"/>
+              </a:defRPr>
+            </a:lvl8pPr>
+            <a:lvl9pPr marL="3657600" indent="0" algn="ctr" defTabSz="914400" rtl="0" eaLnBrk="1" latinLnBrk="0" hangingPunct="1">
+              <a:lnSpc>
+                <a:spcPct val="90000"/>
+              </a:lnSpc>
+              <a:spcBef>
+                <a:spcPts val="500"/>
+              </a:spcBef>
+              <a:buFont typeface="Arial" panose="020B0604020202020204" pitchFamily="34" charset="0"/>
+              <a:buNone/>
+              <a:defRPr sz="1600" kern="1200">
+                <a:solidFill>
+                  <a:schemeClr val="tx1"/>
+                </a:solidFill>
+                <a:latin typeface="+mn-lt"/>
+                <a:ea typeface="+mn-ea"/>
+                <a:cs typeface="+mn-cs"/>
+              </a:defRPr>
+            </a:lvl9pPr>
+          </a:lstStyle>
+          <a:p>
+            <a:r>
+              <a:rPr lang="es-AR" dirty="0"/>
+              <a:t>Machine </a:t>
+            </a:r>
+            <a:r>
+              <a:rPr lang="es-AR" dirty="0" err="1"/>
+              <a:t>Learning</a:t>
+            </a:r>
+            <a:r>
+              <a:rPr lang="es-AR" dirty="0"/>
+              <a:t> &amp; Quantum Deep </a:t>
+            </a:r>
+            <a:r>
+              <a:rPr lang="es-AR" dirty="0" err="1"/>
+              <a:t>Learning</a:t>
+            </a:r>
+            <a:endParaRPr lang="en-US" dirty="0"/>
+          </a:p>
+        </p:txBody>
+      </p:sp>
+      <p:pic>
+        <p:nvPicPr>
+          <p:cNvPr id="6" name="Picture 5">
+            <a:extLst>
+              <a:ext uri="{FF2B5EF4-FFF2-40B4-BE49-F238E27FC236}">
+                <a16:creationId xmlns:a16="http://schemas.microsoft.com/office/drawing/2014/main" id="{69EAD21F-9E3F-75C7-4BBA-3C4FF0739C48}"/>
+              </a:ext>
+            </a:extLst>
+          </p:cNvPr>
+          <p:cNvPicPr>
+            <a:picLocks noChangeAspect="1"/>
+          </p:cNvPicPr>
+          <p:nvPr/>
+        </p:nvPicPr>
+        <p:blipFill>
+          <a:blip r:embed="rId3"/>
+          <a:stretch>
+            <a:fillRect/>
+          </a:stretch>
+        </p:blipFill>
+        <p:spPr>
+          <a:xfrm>
+            <a:off x="375920" y="1874518"/>
+            <a:ext cx="6810375" cy="1171575"/>
+          </a:xfrm>
+          <a:prstGeom prst="rect">
+            <a:avLst/>
+          </a:prstGeom>
+        </p:spPr>
+      </p:pic>
+      <p:pic>
+        <p:nvPicPr>
+          <p:cNvPr id="10" name="Picture 9">
+            <a:extLst>
+              <a:ext uri="{FF2B5EF4-FFF2-40B4-BE49-F238E27FC236}">
+                <a16:creationId xmlns:a16="http://schemas.microsoft.com/office/drawing/2014/main" id="{D7996572-373A-6F3C-3B73-084A38974613}"/>
+              </a:ext>
+            </a:extLst>
+          </p:cNvPr>
+          <p:cNvPicPr>
+            <a:picLocks noChangeAspect="1"/>
+          </p:cNvPicPr>
+          <p:nvPr/>
+        </p:nvPicPr>
+        <p:blipFill>
+          <a:blip r:embed="rId4"/>
+          <a:stretch>
+            <a:fillRect/>
+          </a:stretch>
+        </p:blipFill>
+        <p:spPr>
+          <a:xfrm>
+            <a:off x="421673" y="4148933"/>
+            <a:ext cx="2057400" cy="1171575"/>
+          </a:xfrm>
+          <a:prstGeom prst="rect">
+            <a:avLst/>
+          </a:prstGeom>
+        </p:spPr>
+      </p:pic>
+      <p:sp>
+        <p:nvSpPr>
+          <p:cNvPr id="13" name="Subtitle 2">
+            <a:extLst>
+              <a:ext uri="{FF2B5EF4-FFF2-40B4-BE49-F238E27FC236}">
+                <a16:creationId xmlns:a16="http://schemas.microsoft.com/office/drawing/2014/main" id="{775E34DD-87FF-7722-4A54-12AC24F5E17F}"/>
+              </a:ext>
+            </a:extLst>
+          </p:cNvPr>
+          <p:cNvSpPr txBox="1">
+            <a:spLocks/>
+          </p:cNvSpPr>
+          <p:nvPr/>
+        </p:nvSpPr>
+        <p:spPr>
+          <a:xfrm>
+            <a:off x="706153" y="1215838"/>
+            <a:ext cx="5633922" cy="658680"/>
           </a:xfrm>
           <a:prstGeom prst="rect">
             <a:avLst/>
@@ -23255,121 +25720,13 @@
             </a:lvl9pPr>
           </a:lstStyle>
           <a:p>
-            <a:pPr>
-              <a:lnSpc>
-                <a:spcPct val="100000"/>
-              </a:lnSpc>
-            </a:pPr>
-            <a:r>
-              <a:rPr lang="es-AR" sz="1500" dirty="0"/>
-              <a:t>Machine </a:t>
-            </a:r>
-            <a:r>
-              <a:rPr lang="es-AR" sz="1500" dirty="0" err="1"/>
-              <a:t>Learning</a:t>
-            </a:r>
-            <a:r>
-              <a:rPr lang="es-AR" sz="1500" dirty="0"/>
-              <a:t> &amp; Quantum Machine </a:t>
-            </a:r>
-            <a:r>
-              <a:rPr lang="es-AR" sz="1500" dirty="0" err="1"/>
-              <a:t>Learning</a:t>
-            </a:r>
-            <a:endParaRPr lang="en-US" sz="1500" dirty="0"/>
-          </a:p>
-        </p:txBody>
-      </p:sp>
-      <p:sp>
-        <p:nvSpPr>
-          <p:cNvPr id="8" name="TextBox 7">
-            <a:extLst>
-              <a:ext uri="{FF2B5EF4-FFF2-40B4-BE49-F238E27FC236}">
-                <a16:creationId xmlns:a16="http://schemas.microsoft.com/office/drawing/2014/main" id="{559363E2-45A2-F53A-3515-66D6F8AC1017}"/>
-              </a:ext>
-            </a:extLst>
-          </p:cNvPr>
-          <p:cNvSpPr txBox="1"/>
-          <p:nvPr/>
-        </p:nvSpPr>
-        <p:spPr>
-          <a:xfrm>
-            <a:off x="199916" y="720555"/>
-            <a:ext cx="6197600" cy="1200329"/>
-          </a:xfrm>
-          <a:prstGeom prst="rect">
-            <a:avLst/>
-          </a:prstGeom>
-          <a:noFill/>
-        </p:spPr>
-        <p:txBody>
-          <a:bodyPr wrap="square">
-            <a:spAutoFit/>
-          </a:bodyPr>
-          <a:lstStyle/>
-          <a:p>
-            <a:r>
-              <a:rPr lang="en-US" b="0" i="0" dirty="0">
-                <a:effectLst/>
-                <a:latin typeface="Consolas" panose="020B0609020204030204" pitchFamily="49" charset="0"/>
-              </a:rPr>
-              <a:t>Training set:</a:t>
-            </a:r>
-          </a:p>
-          <a:p>
-            <a:r>
-              <a:rPr lang="en-US" dirty="0">
-                <a:latin typeface="Consolas" panose="020B0609020204030204" pitchFamily="49" charset="0"/>
-              </a:rPr>
-              <a:t>3291 </a:t>
-            </a:r>
-            <a:r>
-              <a:rPr lang="en-US" dirty="0" err="1">
-                <a:latin typeface="Consolas" panose="020B0609020204030204" pitchFamily="49" charset="0"/>
-              </a:rPr>
-              <a:t>imágenes</a:t>
-            </a:r>
-            <a:r>
-              <a:rPr lang="en-US" dirty="0">
-                <a:latin typeface="Consolas" panose="020B0609020204030204" pitchFamily="49" charset="0"/>
-              </a:rPr>
-              <a:t>. Tensor de entrada [3, 260, 260]</a:t>
-            </a:r>
-            <a:r>
-              <a:rPr lang="en-US" b="0" i="0" dirty="0">
-                <a:effectLst/>
-                <a:latin typeface="Consolas" panose="020B0609020204030204" pitchFamily="49" charset="0"/>
-              </a:rPr>
-              <a:t> </a:t>
-            </a:r>
-          </a:p>
-          <a:p>
-            <a:r>
-              <a:rPr lang="en-US" b="0" i="0" dirty="0">
-                <a:effectLst/>
-                <a:latin typeface="Consolas" panose="020B0609020204030204" pitchFamily="49" charset="0"/>
-              </a:rPr>
-              <a:t>Test set: </a:t>
-            </a:r>
-          </a:p>
-          <a:p>
-            <a:r>
-              <a:rPr lang="en-US" dirty="0">
-                <a:latin typeface="Consolas" panose="020B0609020204030204" pitchFamily="49" charset="0"/>
-              </a:rPr>
-              <a:t>1772 </a:t>
-            </a:r>
-            <a:r>
-              <a:rPr lang="en-US" dirty="0" err="1">
-                <a:latin typeface="Consolas" panose="020B0609020204030204" pitchFamily="49" charset="0"/>
-              </a:rPr>
-              <a:t>imágenes</a:t>
-            </a:r>
-            <a:r>
-              <a:rPr lang="en-US" dirty="0">
-                <a:latin typeface="Consolas" panose="020B0609020204030204" pitchFamily="49" charset="0"/>
-              </a:rPr>
-              <a:t>. Tensor de entrada [3, 260, 260]</a:t>
+            <a:r>
+              <a:rPr lang="es-AR" dirty="0"/>
+              <a:t>Gráfico </a:t>
+            </a:r>
+            <a:r>
+              <a:rPr lang="es-AR" dirty="0" err="1"/>
+              <a:t>ZZFeatureMap</a:t>
             </a:r>
             <a:endParaRPr lang="en-US" dirty="0"/>
           </a:p>
@@ -23377,164 +25734,247 @@
       </p:sp>
       <p:sp>
         <p:nvSpPr>
-          <p:cNvPr id="10" name="TextBox 9">
+          <p:cNvPr id="14" name="Subtitle 2">
             <a:extLst>
               <a:ext uri="{FF2B5EF4-FFF2-40B4-BE49-F238E27FC236}">
-                <a16:creationId xmlns:a16="http://schemas.microsoft.com/office/drawing/2014/main" id="{4B055D39-1EC5-B688-0285-8870F6F340AD}"/>
+                <a16:creationId xmlns:a16="http://schemas.microsoft.com/office/drawing/2014/main" id="{2EC928D8-C373-DEEE-FD16-CDA1AB0E90AF}"/>
               </a:ext>
             </a:extLst>
           </p:cNvPr>
-          <p:cNvSpPr txBox="1"/>
+          <p:cNvSpPr txBox="1">
+            <a:spLocks/>
+          </p:cNvSpPr>
           <p:nvPr/>
         </p:nvSpPr>
         <p:spPr>
           <a:xfrm>
-            <a:off x="199916" y="4270869"/>
-            <a:ext cx="6197600" cy="646331"/>
-          </a:xfrm>
-          <a:prstGeom prst="rect">
-            <a:avLst/>
-          </a:prstGeom>
-          <a:noFill/>
-        </p:spPr>
-        <p:txBody>
-          <a:bodyPr wrap="square">
-            <a:spAutoFit/>
-          </a:bodyPr>
-          <a:lstStyle/>
-          <a:p>
-            <a:r>
-              <a:rPr lang="es-ES" b="0" i="0" dirty="0">
-                <a:effectLst/>
-                <a:latin typeface="Consolas" panose="020B0609020204030204" pitchFamily="49" charset="0"/>
-              </a:rPr>
-              <a:t>Precisión conjunto entrenamiento: </a:t>
-            </a:r>
-            <a:r>
-              <a:rPr lang="es-ES" dirty="0">
-                <a:latin typeface="Consolas" panose="020B0609020204030204" pitchFamily="49" charset="0"/>
-              </a:rPr>
-              <a:t>99.82</a:t>
-            </a:r>
-            <a:r>
-              <a:rPr lang="es-ES" b="0" i="0" dirty="0">
-                <a:effectLst/>
-                <a:latin typeface="Consolas" panose="020B0609020204030204" pitchFamily="49" charset="0"/>
-              </a:rPr>
-              <a:t>%</a:t>
-            </a:r>
-          </a:p>
-          <a:p>
-            <a:r>
-              <a:rPr lang="es-ES" b="0" i="0" dirty="0">
-                <a:effectLst/>
-                <a:latin typeface="Consolas" panose="020B0609020204030204" pitchFamily="49" charset="0"/>
-              </a:rPr>
-              <a:t>Precisión conjunto prueba: </a:t>
-            </a:r>
-            <a:r>
-              <a:rPr lang="es-ES" dirty="0">
-                <a:latin typeface="Consolas" panose="020B0609020204030204" pitchFamily="49" charset="0"/>
-              </a:rPr>
-              <a:t>98.8</a:t>
-            </a:r>
-            <a:r>
-              <a:rPr lang="es-ES" b="0" i="0" dirty="0">
-                <a:effectLst/>
-                <a:latin typeface="Consolas" panose="020B0609020204030204" pitchFamily="49" charset="0"/>
-              </a:rPr>
-              <a:t>%</a:t>
-            </a:r>
-          </a:p>
-        </p:txBody>
-      </p:sp>
-      <p:sp>
-        <p:nvSpPr>
-          <p:cNvPr id="3" name="TextBox 2">
-            <a:extLst>
-              <a:ext uri="{FF2B5EF4-FFF2-40B4-BE49-F238E27FC236}">
-                <a16:creationId xmlns:a16="http://schemas.microsoft.com/office/drawing/2014/main" id="{A6E6325C-D4E9-2412-641B-732F153ECEE6}"/>
-              </a:ext>
-            </a:extLst>
-          </p:cNvPr>
-          <p:cNvSpPr txBox="1"/>
-          <p:nvPr/>
-        </p:nvSpPr>
-        <p:spPr>
-          <a:xfrm>
-            <a:off x="199916" y="2205006"/>
-            <a:ext cx="6197600" cy="369332"/>
-          </a:xfrm>
-          <a:prstGeom prst="rect">
-            <a:avLst/>
-          </a:prstGeom>
-          <a:noFill/>
-        </p:spPr>
-        <p:txBody>
-          <a:bodyPr wrap="square">
-            <a:spAutoFit/>
-          </a:bodyPr>
-          <a:lstStyle/>
-          <a:p>
-            <a:r>
-              <a:rPr lang="es-ES" b="0" i="0" dirty="0" err="1">
-                <a:effectLst/>
-                <a:latin typeface="Consolas" panose="020B0609020204030204" pitchFamily="49" charset="0"/>
-              </a:rPr>
-              <a:t>Predicted</a:t>
-            </a:r>
-            <a:r>
-              <a:rPr lang="es-ES" b="0" i="0" dirty="0">
-                <a:effectLst/>
-                <a:latin typeface="Consolas" panose="020B0609020204030204" pitchFamily="49" charset="0"/>
-              </a:rPr>
-              <a:t> Output</a:t>
-            </a:r>
-            <a:r>
-              <a:rPr lang="en-US" b="0" i="0" dirty="0">
-                <a:effectLst/>
-                <a:latin typeface="Consolas" panose="020B0609020204030204" pitchFamily="49" charset="0"/>
-              </a:rPr>
-              <a:t>:</a:t>
-            </a:r>
-            <a:endParaRPr lang="en-US" dirty="0"/>
-          </a:p>
-        </p:txBody>
-      </p:sp>
-      <p:pic>
-        <p:nvPicPr>
-          <p:cNvPr id="6" name="Picture 5">
-            <a:extLst>
-              <a:ext uri="{FF2B5EF4-FFF2-40B4-BE49-F238E27FC236}">
-                <a16:creationId xmlns:a16="http://schemas.microsoft.com/office/drawing/2014/main" id="{AC3A6F07-D578-F41F-749F-71A59D53F90F}"/>
-              </a:ext>
-            </a:extLst>
-          </p:cNvPr>
-          <p:cNvPicPr>
-            <a:picLocks noChangeAspect="1"/>
-          </p:cNvPicPr>
-          <p:nvPr/>
-        </p:nvPicPr>
-        <p:blipFill>
-          <a:blip r:embed="rId3"/>
-          <a:stretch>
-            <a:fillRect/>
-          </a:stretch>
-        </p:blipFill>
-        <p:spPr>
-          <a:xfrm>
-            <a:off x="199916" y="2642865"/>
-            <a:ext cx="5476875" cy="1076325"/>
+            <a:off x="706153" y="3558524"/>
+            <a:ext cx="5633922" cy="658680"/>
           </a:xfrm>
           <a:prstGeom prst="rect">
             <a:avLst/>
           </a:prstGeom>
         </p:spPr>
-      </p:pic>
+        <p:txBody>
+          <a:bodyPr vert="horz" lIns="91440" tIns="45720" rIns="91440" bIns="45720" rtlCol="0">
+            <a:normAutofit/>
+          </a:bodyPr>
+          <a:lstStyle>
+            <a:lvl1pPr marL="0" indent="0" algn="l" defTabSz="914400" rtl="0" eaLnBrk="1" latinLnBrk="0" hangingPunct="1">
+              <a:lnSpc>
+                <a:spcPct val="110000"/>
+              </a:lnSpc>
+              <a:spcBef>
+                <a:spcPts val="1000"/>
+              </a:spcBef>
+              <a:buClr>
+                <a:schemeClr val="tx2">
+                  <a:lumMod val="50000"/>
+                  <a:lumOff val="50000"/>
+                </a:schemeClr>
+              </a:buClr>
+              <a:buSzPct val="75000"/>
+              <a:buFont typeface="Wingdings" panose="05000000000000000000" pitchFamily="2" charset="2"/>
+              <a:buNone/>
+              <a:defRPr sz="2400" kern="1200">
+                <a:solidFill>
+                  <a:schemeClr val="tx2"/>
+                </a:solidFill>
+                <a:latin typeface="+mn-lt"/>
+                <a:ea typeface="+mn-ea"/>
+                <a:cs typeface="+mn-cs"/>
+              </a:defRPr>
+            </a:lvl1pPr>
+            <a:lvl2pPr marL="457200" indent="0" algn="ctr" defTabSz="914400" rtl="0" eaLnBrk="1" latinLnBrk="0" hangingPunct="1">
+              <a:lnSpc>
+                <a:spcPct val="110000"/>
+              </a:lnSpc>
+              <a:spcBef>
+                <a:spcPts val="500"/>
+              </a:spcBef>
+              <a:buClr>
+                <a:schemeClr val="tx2">
+                  <a:lumMod val="50000"/>
+                  <a:lumOff val="50000"/>
+                </a:schemeClr>
+              </a:buClr>
+              <a:buSzPct val="75000"/>
+              <a:buFont typeface="Wingdings" panose="05000000000000000000" pitchFamily="2" charset="2"/>
+              <a:buNone/>
+              <a:defRPr sz="2000" kern="1200">
+                <a:solidFill>
+                  <a:schemeClr val="tx2"/>
+                </a:solidFill>
+                <a:latin typeface="+mn-lt"/>
+                <a:ea typeface="+mn-ea"/>
+                <a:cs typeface="+mn-cs"/>
+              </a:defRPr>
+            </a:lvl2pPr>
+            <a:lvl3pPr marL="914400" indent="0" algn="ctr" defTabSz="914400" rtl="0" eaLnBrk="1" latinLnBrk="0" hangingPunct="1">
+              <a:lnSpc>
+                <a:spcPct val="110000"/>
+              </a:lnSpc>
+              <a:spcBef>
+                <a:spcPts val="500"/>
+              </a:spcBef>
+              <a:buClr>
+                <a:schemeClr val="tx2">
+                  <a:lumMod val="50000"/>
+                  <a:lumOff val="50000"/>
+                </a:schemeClr>
+              </a:buClr>
+              <a:buSzPct val="75000"/>
+              <a:buFont typeface="Wingdings" panose="05000000000000000000" pitchFamily="2" charset="2"/>
+              <a:buNone/>
+              <a:defRPr sz="1800" kern="1200">
+                <a:solidFill>
+                  <a:schemeClr val="tx2"/>
+                </a:solidFill>
+                <a:latin typeface="+mn-lt"/>
+                <a:ea typeface="+mn-ea"/>
+                <a:cs typeface="+mn-cs"/>
+              </a:defRPr>
+            </a:lvl3pPr>
+            <a:lvl4pPr marL="1371600" indent="0" algn="ctr" defTabSz="914400" rtl="0" eaLnBrk="1" latinLnBrk="0" hangingPunct="1">
+              <a:lnSpc>
+                <a:spcPct val="110000"/>
+              </a:lnSpc>
+              <a:spcBef>
+                <a:spcPts val="500"/>
+              </a:spcBef>
+              <a:buClr>
+                <a:schemeClr val="tx2">
+                  <a:lumMod val="50000"/>
+                  <a:lumOff val="50000"/>
+                </a:schemeClr>
+              </a:buClr>
+              <a:buSzPct val="75000"/>
+              <a:buFont typeface="Wingdings" panose="05000000000000000000" pitchFamily="2" charset="2"/>
+              <a:buNone/>
+              <a:defRPr sz="1600" kern="1200">
+                <a:solidFill>
+                  <a:schemeClr val="tx2"/>
+                </a:solidFill>
+                <a:latin typeface="+mn-lt"/>
+                <a:ea typeface="+mn-ea"/>
+                <a:cs typeface="+mn-cs"/>
+              </a:defRPr>
+            </a:lvl4pPr>
+            <a:lvl5pPr marL="1828800" indent="0" algn="ctr" defTabSz="914400" rtl="0" eaLnBrk="1" latinLnBrk="0" hangingPunct="1">
+              <a:lnSpc>
+                <a:spcPct val="110000"/>
+              </a:lnSpc>
+              <a:spcBef>
+                <a:spcPts val="500"/>
+              </a:spcBef>
+              <a:buClr>
+                <a:schemeClr val="tx2">
+                  <a:lumMod val="50000"/>
+                  <a:lumOff val="50000"/>
+                </a:schemeClr>
+              </a:buClr>
+              <a:buSzPct val="75000"/>
+              <a:buFont typeface="Wingdings" panose="05000000000000000000" pitchFamily="2" charset="2"/>
+              <a:buNone/>
+              <a:defRPr sz="1600" kern="1200">
+                <a:solidFill>
+                  <a:schemeClr val="tx2"/>
+                </a:solidFill>
+                <a:latin typeface="+mn-lt"/>
+                <a:ea typeface="+mn-ea"/>
+                <a:cs typeface="+mn-cs"/>
+              </a:defRPr>
+            </a:lvl5pPr>
+            <a:lvl6pPr marL="2286000" indent="0" algn="ctr" defTabSz="914400" rtl="0" eaLnBrk="1" latinLnBrk="0" hangingPunct="1">
+              <a:lnSpc>
+                <a:spcPct val="90000"/>
+              </a:lnSpc>
+              <a:spcBef>
+                <a:spcPts val="500"/>
+              </a:spcBef>
+              <a:buFont typeface="Arial" panose="020B0604020202020204" pitchFamily="34" charset="0"/>
+              <a:buNone/>
+              <a:defRPr sz="1600" kern="1200">
+                <a:solidFill>
+                  <a:schemeClr val="tx1"/>
+                </a:solidFill>
+                <a:latin typeface="+mn-lt"/>
+                <a:ea typeface="+mn-ea"/>
+                <a:cs typeface="+mn-cs"/>
+              </a:defRPr>
+            </a:lvl6pPr>
+            <a:lvl7pPr marL="2743200" indent="0" algn="ctr" defTabSz="914400" rtl="0" eaLnBrk="1" latinLnBrk="0" hangingPunct="1">
+              <a:lnSpc>
+                <a:spcPct val="90000"/>
+              </a:lnSpc>
+              <a:spcBef>
+                <a:spcPts val="500"/>
+              </a:spcBef>
+              <a:buFont typeface="Arial" panose="020B0604020202020204" pitchFamily="34" charset="0"/>
+              <a:buNone/>
+              <a:defRPr sz="1600" kern="1200">
+                <a:solidFill>
+                  <a:schemeClr val="tx1"/>
+                </a:solidFill>
+                <a:latin typeface="+mn-lt"/>
+                <a:ea typeface="+mn-ea"/>
+                <a:cs typeface="+mn-cs"/>
+              </a:defRPr>
+            </a:lvl7pPr>
+            <a:lvl8pPr marL="3200400" indent="0" algn="ctr" defTabSz="914400" rtl="0" eaLnBrk="1" latinLnBrk="0" hangingPunct="1">
+              <a:lnSpc>
+                <a:spcPct val="90000"/>
+              </a:lnSpc>
+              <a:spcBef>
+                <a:spcPts val="500"/>
+              </a:spcBef>
+              <a:buFont typeface="Arial" panose="020B0604020202020204" pitchFamily="34" charset="0"/>
+              <a:buNone/>
+              <a:defRPr sz="1600" kern="1200">
+                <a:solidFill>
+                  <a:schemeClr val="tx1"/>
+                </a:solidFill>
+                <a:latin typeface="+mn-lt"/>
+                <a:ea typeface="+mn-ea"/>
+                <a:cs typeface="+mn-cs"/>
+              </a:defRPr>
+            </a:lvl8pPr>
+            <a:lvl9pPr marL="3657600" indent="0" algn="ctr" defTabSz="914400" rtl="0" eaLnBrk="1" latinLnBrk="0" hangingPunct="1">
+              <a:lnSpc>
+                <a:spcPct val="90000"/>
+              </a:lnSpc>
+              <a:spcBef>
+                <a:spcPts val="500"/>
+              </a:spcBef>
+              <a:buFont typeface="Arial" panose="020B0604020202020204" pitchFamily="34" charset="0"/>
+              <a:buNone/>
+              <a:defRPr sz="1600" kern="1200">
+                <a:solidFill>
+                  <a:schemeClr val="tx1"/>
+                </a:solidFill>
+                <a:latin typeface="+mn-lt"/>
+                <a:ea typeface="+mn-ea"/>
+                <a:cs typeface="+mn-cs"/>
+              </a:defRPr>
+            </a:lvl9pPr>
+          </a:lstStyle>
+          <a:p>
+            <a:r>
+              <a:rPr lang="es-AR" dirty="0"/>
+              <a:t>Gráfico </a:t>
+            </a:r>
+            <a:r>
+              <a:rPr lang="es-AR" dirty="0" err="1"/>
+              <a:t>RealAmplitudes</a:t>
+            </a:r>
+            <a:endParaRPr lang="en-US" dirty="0"/>
+          </a:p>
+        </p:txBody>
+      </p:sp>
     </p:spTree>
     <p:extLst>
       <p:ext uri="{BB962C8B-B14F-4D97-AF65-F5344CB8AC3E}">
-        <p14:creationId xmlns:p14="http://schemas.microsoft.com/office/powerpoint/2010/main" val="582208953"/>
+        <p14:creationId xmlns:p14="http://schemas.microsoft.com/office/powerpoint/2010/main" val="1834565688"/>
       </p:ext>
     </p:extLst>
   </p:cSld>

</xml_diff>